<commit_message>
Added the URL and first steps
</commit_message>
<xml_diff>
--- a/Processing_Presentation_TF3_DE_notes.pptx
+++ b/Processing_Presentation_TF3_DE_notes.pptx
@@ -5202,10 +5202,10 @@
           <a:lstStyle/>
           <a:p>
             <a:r>
-              <a:rPr lang="en-US" smtClean="0"/>
+              <a:rPr lang="en-US" dirty="0" smtClean="0"/>
               <a:t>Getting Started</a:t>
             </a:r>
-            <a:endParaRPr lang="en-US"/>
+            <a:endParaRPr lang="en-US" dirty="0"/>
           </a:p>
         </p:txBody>
       </p:sp>
@@ -5224,7 +5224,54 @@
           <a:bodyPr/>
           <a:lstStyle/>
           <a:p>
-            <a:endParaRPr lang="en-US"/>
+            <a:r>
+              <a:rPr lang="en-US" dirty="0" smtClean="0"/>
+              <a:t>The Processing website has lots of information:</a:t>
+            </a:r>
+          </a:p>
+          <a:p>
+            <a:pPr lvl="1"/>
+            <a:r>
+              <a:rPr lang="en-US" dirty="0" smtClean="0"/>
+              <a:t>Tutorials</a:t>
+            </a:r>
+          </a:p>
+          <a:p>
+            <a:pPr lvl="1"/>
+            <a:r>
+              <a:rPr lang="en-US" dirty="0" smtClean="0"/>
+              <a:t>Examples</a:t>
+            </a:r>
+          </a:p>
+          <a:p>
+            <a:pPr lvl="1"/>
+            <a:r>
+              <a:rPr lang="en-US" dirty="0" smtClean="0"/>
+              <a:t>Exhibits</a:t>
+            </a:r>
+          </a:p>
+          <a:p>
+            <a:r>
+              <a:rPr lang="en-US" dirty="0"/>
+              <a:t>See </a:t>
+            </a:r>
+            <a:r>
+              <a:rPr lang="en-US" dirty="0">
+                <a:hlinkClick r:id="rId2"/>
+              </a:rPr>
+              <a:t>https://</a:t>
+            </a:r>
+            <a:r>
+              <a:rPr lang="en-US" dirty="0" smtClean="0">
+                <a:hlinkClick r:id="rId2"/>
+              </a:rPr>
+              <a:t>processing.org</a:t>
+            </a:r>
+            <a:r>
+              <a:rPr lang="en-US" dirty="0" smtClean="0"/>
+              <a:t> </a:t>
+            </a:r>
+            <a:endParaRPr lang="en-US" dirty="0"/>
           </a:p>
         </p:txBody>
       </p:sp>

</xml_diff>

<commit_message>
Added introduction to color, shapes; brief bibliography for Part 1
</commit_message>
<xml_diff>
--- a/Processing_Presentation_TF3_DE_notes.pptx
+++ b/Processing_Presentation_TF3_DE_notes.pptx
@@ -9,6 +9,21 @@
     <p:sldId id="257" r:id="rId3"/>
     <p:sldId id="258" r:id="rId4"/>
     <p:sldId id="259" r:id="rId5"/>
+    <p:sldId id="260" r:id="rId6"/>
+    <p:sldId id="261" r:id="rId7"/>
+    <p:sldId id="262" r:id="rId8"/>
+    <p:sldId id="263" r:id="rId9"/>
+    <p:sldId id="264" r:id="rId10"/>
+    <p:sldId id="265" r:id="rId11"/>
+    <p:sldId id="266" r:id="rId12"/>
+    <p:sldId id="268" r:id="rId13"/>
+    <p:sldId id="267" r:id="rId14"/>
+    <p:sldId id="269" r:id="rId15"/>
+    <p:sldId id="270" r:id="rId16"/>
+    <p:sldId id="271" r:id="rId17"/>
+    <p:sldId id="272" r:id="rId18"/>
+    <p:sldId id="273" r:id="rId19"/>
+    <p:sldId id="274" r:id="rId20"/>
   </p:sldIdLst>
   <p:sldSz cx="9144000" cy="6858000" type="screen4x3"/>
   <p:notesSz cx="6858000" cy="9144000"/>
@@ -449,7 +464,7 @@
           <a:p>
             <a:fld id="{49AE121B-3902-2145-B971-053F2626F9D9}" type="datetimeFigureOut">
               <a:rPr lang="en-US" smtClean="0"/>
-              <a:t>7/29/15</a:t>
+              <a:t>8/10/15</a:t>
             </a:fld>
             <a:endParaRPr lang="en-US"/>
           </a:p>
@@ -802,7 +817,7 @@
           <a:p>
             <a:fld id="{49AE121B-3902-2145-B971-053F2626F9D9}" type="datetimeFigureOut">
               <a:rPr lang="en-US" smtClean="0"/>
-              <a:t>7/29/15</a:t>
+              <a:t>8/10/15</a:t>
             </a:fld>
             <a:endParaRPr lang="en-US"/>
           </a:p>
@@ -1177,7 +1192,7 @@
           <a:p>
             <a:fld id="{49AE121B-3902-2145-B971-053F2626F9D9}" type="datetimeFigureOut">
               <a:rPr lang="en-US" smtClean="0"/>
-              <a:t>7/29/15</a:t>
+              <a:t>8/10/15</a:t>
             </a:fld>
             <a:endParaRPr lang="en-US"/>
           </a:p>
@@ -1410,7 +1425,7 @@
           <a:p>
             <a:fld id="{49AE121B-3902-2145-B971-053F2626F9D9}" type="datetimeFigureOut">
               <a:rPr lang="en-US" smtClean="0"/>
-              <a:t>7/29/15</a:t>
+              <a:t>8/10/15</a:t>
             </a:fld>
             <a:endParaRPr lang="en-US"/>
           </a:p>
@@ -1653,7 +1668,7 @@
           <a:p>
             <a:fld id="{49AE121B-3902-2145-B971-053F2626F9D9}" type="datetimeFigureOut">
               <a:rPr lang="en-US" smtClean="0"/>
-              <a:t>7/29/15</a:t>
+              <a:t>8/10/15</a:t>
             </a:fld>
             <a:endParaRPr lang="en-US"/>
           </a:p>
@@ -1886,7 +1901,7 @@
           <a:p>
             <a:fld id="{49AE121B-3902-2145-B971-053F2626F9D9}" type="datetimeFigureOut">
               <a:rPr lang="en-US" smtClean="0"/>
-              <a:t>7/29/15</a:t>
+              <a:t>8/10/15</a:t>
             </a:fld>
             <a:endParaRPr lang="en-US"/>
           </a:p>
@@ -2281,7 +2296,7 @@
           <a:p>
             <a:fld id="{49AE121B-3902-2145-B971-053F2626F9D9}" type="datetimeFigureOut">
               <a:rPr lang="en-US" smtClean="0"/>
-              <a:t>7/29/15</a:t>
+              <a:t>8/10/15</a:t>
             </a:fld>
             <a:endParaRPr lang="en-US"/>
           </a:p>
@@ -2621,7 +2636,7 @@
           <a:p>
             <a:fld id="{49AE121B-3902-2145-B971-053F2626F9D9}" type="datetimeFigureOut">
               <a:rPr lang="en-US" smtClean="0"/>
-              <a:t>7/29/15</a:t>
+              <a:t>8/10/15</a:t>
             </a:fld>
             <a:endParaRPr lang="en-US"/>
           </a:p>
@@ -3124,7 +3139,7 @@
           <a:p>
             <a:fld id="{49AE121B-3902-2145-B971-053F2626F9D9}" type="datetimeFigureOut">
               <a:rPr lang="en-US" smtClean="0"/>
-              <a:t>7/29/15</a:t>
+              <a:t>8/10/15</a:t>
             </a:fld>
             <a:endParaRPr lang="en-US"/>
           </a:p>
@@ -3633,7 +3648,7 @@
           <a:p>
             <a:fld id="{49AE121B-3902-2145-B971-053F2626F9D9}" type="datetimeFigureOut">
               <a:rPr lang="en-US" smtClean="0"/>
-              <a:t>7/29/15</a:t>
+              <a:t>8/10/15</a:t>
             </a:fld>
             <a:endParaRPr lang="en-US"/>
           </a:p>
@@ -3872,7 +3887,7 @@
           <a:p>
             <a:fld id="{49AE121B-3902-2145-B971-053F2626F9D9}" type="datetimeFigureOut">
               <a:rPr lang="en-US" smtClean="0"/>
-              <a:t>7/29/15</a:t>
+              <a:t>8/10/15</a:t>
             </a:fld>
             <a:endParaRPr lang="en-US"/>
           </a:p>
@@ -3986,7 +4001,7 @@
           <a:p>
             <a:fld id="{49AE121B-3902-2145-B971-053F2626F9D9}" type="datetimeFigureOut">
               <a:rPr lang="en-US" smtClean="0"/>
-              <a:t>7/29/15</a:t>
+              <a:t>8/10/15</a:t>
             </a:fld>
             <a:endParaRPr lang="en-US"/>
           </a:p>
@@ -4332,7 +4347,7 @@
           <a:p>
             <a:fld id="{49AE121B-3902-2145-B971-053F2626F9D9}" type="datetimeFigureOut">
               <a:rPr lang="en-US" smtClean="0"/>
-              <a:t>7/29/15</a:t>
+              <a:t>8/10/15</a:t>
             </a:fld>
             <a:endParaRPr lang="en-US"/>
           </a:p>
@@ -4565,7 +4580,7 @@
           <a:p>
             <a:fld id="{49AE121B-3902-2145-B971-053F2626F9D9}" type="datetimeFigureOut">
               <a:rPr lang="en-US" smtClean="0"/>
-              <a:t>7/29/15</a:t>
+              <a:t>8/10/15</a:t>
             </a:fld>
             <a:endParaRPr lang="en-US"/>
           </a:p>
@@ -4995,7 +5010,11 @@
           <a:p>
             <a:r>
               <a:rPr lang="en-US" dirty="0" smtClean="0"/>
-              <a:t>Introduction to Processing</a:t>
+              <a:t>Introduction to </a:t>
+            </a:r>
+            <a:r>
+              <a:rPr lang="en-US" dirty="0" smtClean="0"/>
+              <a:t>Processing: Part I</a:t>
             </a:r>
             <a:endParaRPr lang="en-US" dirty="0"/>
           </a:p>
@@ -5009,12 +5028,243 @@
           </p:cNvSpPr>
           <p:nvPr>
             <p:ph type="subTitle" idx="1"/>
+          </p:nvPr>
+        </p:nvSpPr>
+        <p:spPr/>
+        <p:txBody>
+          <a:bodyPr/>
+          <a:lstStyle/>
+          <a:p>
+            <a:r>
+              <a:rPr lang="en-US" dirty="0" smtClean="0"/>
+              <a:t>Tech Focus 3</a:t>
+            </a:r>
+          </a:p>
+          <a:p>
+            <a:r>
+              <a:rPr lang="en-US" dirty="0" smtClean="0"/>
+              <a:t>September 26, 2015</a:t>
+            </a:r>
+            <a:endParaRPr lang="en-US" dirty="0"/>
+          </a:p>
+        </p:txBody>
+      </p:sp>
+    </p:spTree>
+    <p:extLst>
+      <p:ext uri="{BB962C8B-B14F-4D97-AF65-F5344CB8AC3E}">
+        <p14:creationId xmlns:p14="http://schemas.microsoft.com/office/powerpoint/2010/main" val="4267731961"/>
+      </p:ext>
+    </p:extLst>
+  </p:cSld>
+  <p:clrMapOvr>
+    <a:masterClrMapping/>
+  </p:clrMapOvr>
+</p:sld>
+</file>
+
+<file path=ppt/slides/slide10.xml><?xml version="1.0" encoding="utf-8"?>
+<p:sld xmlns:a="http://schemas.openxmlformats.org/drawingml/2006/main" xmlns:r="http://schemas.openxmlformats.org/officeDocument/2006/relationships" xmlns:p="http://schemas.openxmlformats.org/presentationml/2006/main">
+  <p:cSld>
+    <p:spTree>
+      <p:nvGrpSpPr>
+        <p:cNvPr id="1" name=""/>
+        <p:cNvGrpSpPr/>
+        <p:nvPr/>
+      </p:nvGrpSpPr>
+      <p:grpSpPr>
+        <a:xfrm>
+          <a:off x="0" y="0"/>
+          <a:ext cx="0" cy="0"/>
+          <a:chOff x="0" y="0"/>
+          <a:chExt cx="0" cy="0"/>
+        </a:xfrm>
+      </p:grpSpPr>
+      <p:sp>
+        <p:nvSpPr>
+          <p:cNvPr id="2" name="Title 1"/>
+          <p:cNvSpPr>
+            <a:spLocks noGrp="1"/>
+          </p:cNvSpPr>
+          <p:nvPr>
+            <p:ph type="title"/>
+          </p:nvPr>
+        </p:nvSpPr>
+        <p:spPr/>
+        <p:txBody>
+          <a:bodyPr/>
+          <a:lstStyle/>
+          <a:p>
+            <a:endParaRPr lang="en-US" dirty="0"/>
+          </a:p>
+        </p:txBody>
+      </p:sp>
+      <p:sp>
+        <p:nvSpPr>
+          <p:cNvPr id="3" name="Content Placeholder 2"/>
+          <p:cNvSpPr>
+            <a:spLocks noGrp="1"/>
+          </p:cNvSpPr>
+          <p:nvPr>
+            <p:ph idx="1"/>
+          </p:nvPr>
+        </p:nvSpPr>
+        <p:spPr/>
+        <p:txBody>
+          <a:bodyPr/>
+          <a:lstStyle/>
+          <a:p>
+            <a:r>
+              <a:rPr lang="en-US" dirty="0" smtClean="0"/>
+              <a:t>If you add the following code:</a:t>
+            </a:r>
+          </a:p>
+          <a:p>
+            <a:pPr marL="692150" lvl="2" indent="0">
+              <a:buNone/>
+            </a:pPr>
+            <a:r>
+              <a:rPr lang="en-US" dirty="0">
+                <a:latin typeface="Courier New"/>
+                <a:cs typeface="Courier New"/>
+              </a:rPr>
+              <a:t>background(0);</a:t>
+            </a:r>
+          </a:p>
+          <a:p>
+            <a:pPr marL="692150" lvl="2" indent="0">
+              <a:buNone/>
+            </a:pPr>
+            <a:r>
+              <a:rPr lang="en-US" dirty="0">
+                <a:latin typeface="Courier New"/>
+                <a:cs typeface="Courier New"/>
+              </a:rPr>
+              <a:t>stroke(255);</a:t>
+            </a:r>
+          </a:p>
+          <a:p>
+            <a:pPr marL="692150" lvl="2" indent="0">
+              <a:buNone/>
+            </a:pPr>
+            <a:r>
+              <a:rPr lang="en-US" dirty="0">
+                <a:latin typeface="Courier New"/>
+                <a:cs typeface="Courier New"/>
+              </a:rPr>
+              <a:t>line(0,0,200,200);</a:t>
+            </a:r>
+          </a:p>
+          <a:p>
+            <a:r>
+              <a:rPr lang="en-US" dirty="0" smtClean="0"/>
+              <a:t>… here is your new sketch:</a:t>
+            </a:r>
+          </a:p>
+          <a:p>
+            <a:endParaRPr lang="en-US" dirty="0"/>
+          </a:p>
+        </p:txBody>
+      </p:sp>
+      <p:pic>
+        <p:nvPicPr>
+          <p:cNvPr id="4" name="Picture 3"/>
+          <p:cNvPicPr/>
+          <p:nvPr/>
+        </p:nvPicPr>
+        <p:blipFill>
+          <a:blip r:embed="rId2">
+            <a:extLst>
+              <a:ext uri="{28A0092B-C50C-407E-A947-70E740481C1C}">
+                <a14:useLocalDpi xmlns:a14="http://schemas.microsoft.com/office/drawing/2010/main" val="0"/>
+              </a:ext>
+            </a:extLst>
+          </a:blip>
+          <a:srcRect/>
+          <a:stretch>
+            <a:fillRect/>
+          </a:stretch>
+        </p:blipFill>
+        <p:spPr bwMode="auto">
+          <a:xfrm>
+            <a:off x="3714432" y="4444862"/>
+            <a:ext cx="1715135" cy="1965960"/>
+          </a:xfrm>
+          <a:prstGeom prst="rect">
+            <a:avLst/>
+          </a:prstGeom>
+          <a:noFill/>
+          <a:ln>
+            <a:noFill/>
+          </a:ln>
+        </p:spPr>
+      </p:pic>
+    </p:spTree>
+    <p:extLst>
+      <p:ext uri="{BB962C8B-B14F-4D97-AF65-F5344CB8AC3E}">
+        <p14:creationId xmlns:p14="http://schemas.microsoft.com/office/powerpoint/2010/main" val="1047666436"/>
+      </p:ext>
+    </p:extLst>
+  </p:cSld>
+  <p:clrMapOvr>
+    <a:masterClrMapping/>
+  </p:clrMapOvr>
+</p:sld>
+</file>
+
+<file path=ppt/slides/slide11.xml><?xml version="1.0" encoding="utf-8"?>
+<p:sld xmlns:a="http://schemas.openxmlformats.org/drawingml/2006/main" xmlns:r="http://schemas.openxmlformats.org/officeDocument/2006/relationships" xmlns:p="http://schemas.openxmlformats.org/presentationml/2006/main">
+  <p:cSld>
+    <p:spTree>
+      <p:nvGrpSpPr>
+        <p:cNvPr id="1" name=""/>
+        <p:cNvGrpSpPr/>
+        <p:nvPr/>
+      </p:nvGrpSpPr>
+      <p:grpSpPr>
+        <a:xfrm>
+          <a:off x="0" y="0"/>
+          <a:ext cx="0" cy="0"/>
+          <a:chOff x="0" y="0"/>
+          <a:chExt cx="0" cy="0"/>
+        </a:xfrm>
+      </p:grpSpPr>
+      <p:sp>
+        <p:nvSpPr>
+          <p:cNvPr id="2" name="Title 1"/>
+          <p:cNvSpPr>
+            <a:spLocks noGrp="1"/>
+          </p:cNvSpPr>
+          <p:nvPr>
+            <p:ph type="title"/>
+          </p:nvPr>
+        </p:nvSpPr>
+        <p:spPr/>
+        <p:txBody>
+          <a:bodyPr/>
+          <a:lstStyle/>
+          <a:p>
+            <a:r>
+              <a:rPr lang="en-US" dirty="0" smtClean="0"/>
+              <a:t>But if we change the colors …and the size:</a:t>
+            </a:r>
+            <a:endParaRPr lang="en-US" dirty="0"/>
+          </a:p>
+        </p:txBody>
+      </p:sp>
+      <p:sp>
+        <p:nvSpPr>
+          <p:cNvPr id="9" name="Content Placeholder 8"/>
+          <p:cNvSpPr>
+            <a:spLocks noGrp="1"/>
+          </p:cNvSpPr>
+          <p:nvPr>
+            <p:ph idx="1"/>
           </p:nvPr>
         </p:nvSpPr>
         <p:spPr>
           <a:xfrm>
-            <a:off x="1854200" y="5204011"/>
-            <a:ext cx="5446713" cy="1277536"/>
+            <a:off x="792162" y="1761565"/>
+            <a:ext cx="7930288" cy="4672202"/>
           </a:xfrm>
         </p:spPr>
         <p:txBody>
@@ -5025,29 +5275,1442 @@
           <a:p>
             <a:r>
               <a:rPr lang="en-US" dirty="0" smtClean="0"/>
-              <a:t>Tech Focus 3</a:t>
-            </a:r>
-          </a:p>
-          <a:p>
-            <a:r>
-              <a:rPr lang="en-US" dirty="0" smtClean="0"/>
-              <a:t>September 26, 2015</a:t>
+              <a:t>The following code gives you:</a:t>
+            </a:r>
+          </a:p>
+          <a:p>
+            <a:pPr marL="692150" lvl="2" indent="0">
+              <a:buNone/>
+            </a:pPr>
+            <a:r>
+              <a:rPr lang="en-US" sz="1800" dirty="0">
+                <a:latin typeface="Courier New"/>
+                <a:cs typeface="Courier New"/>
+              </a:rPr>
+              <a:t>size(400,400)</a:t>
+            </a:r>
+            <a:r>
+              <a:rPr lang="en-US" sz="1800" dirty="0" smtClean="0">
+                <a:latin typeface="Courier New"/>
+                <a:cs typeface="Courier New"/>
+              </a:rPr>
+              <a:t>;    </a:t>
+            </a:r>
+            <a:endParaRPr lang="en-US" sz="1800" dirty="0">
+              <a:latin typeface="Courier New"/>
+              <a:cs typeface="Courier New"/>
+            </a:endParaRPr>
+          </a:p>
+          <a:p>
+            <a:pPr marL="692150" lvl="2" indent="0">
+              <a:buNone/>
+            </a:pPr>
+            <a:r>
+              <a:rPr lang="en-US" sz="1800" dirty="0">
+                <a:latin typeface="Courier New"/>
+                <a:cs typeface="Courier New"/>
+              </a:rPr>
+              <a:t>background(255)</a:t>
+            </a:r>
+            <a:r>
+              <a:rPr lang="en-US" sz="1800" dirty="0" smtClean="0">
+                <a:latin typeface="Courier New"/>
+                <a:cs typeface="Courier New"/>
+              </a:rPr>
+              <a:t>; </a:t>
+            </a:r>
+          </a:p>
+          <a:p>
+            <a:pPr marL="692150" lvl="2" indent="0">
+              <a:buNone/>
+            </a:pPr>
+            <a:r>
+              <a:rPr lang="en-US" sz="1800" dirty="0" smtClean="0">
+                <a:latin typeface="Courier New"/>
+                <a:cs typeface="Courier New"/>
+              </a:rPr>
+              <a:t>stroke</a:t>
+            </a:r>
+            <a:r>
+              <a:rPr lang="en-US" sz="1800" dirty="0">
+                <a:latin typeface="Courier New"/>
+                <a:cs typeface="Courier New"/>
+              </a:rPr>
+              <a:t>(0)</a:t>
+            </a:r>
+            <a:r>
+              <a:rPr lang="en-US" sz="1800" dirty="0" smtClean="0">
+                <a:latin typeface="Courier New"/>
+                <a:cs typeface="Courier New"/>
+              </a:rPr>
+              <a:t>; </a:t>
+            </a:r>
+          </a:p>
+          <a:p>
+            <a:pPr marL="692150" lvl="2" indent="0">
+              <a:buNone/>
+            </a:pPr>
+            <a:r>
+              <a:rPr lang="en-US" sz="1800" dirty="0" smtClean="0">
+                <a:latin typeface="Courier New"/>
+                <a:cs typeface="Courier New"/>
+              </a:rPr>
+              <a:t>fill</a:t>
+            </a:r>
+            <a:r>
+              <a:rPr lang="en-US" sz="1800" dirty="0">
+                <a:latin typeface="Courier New"/>
+                <a:cs typeface="Courier New"/>
+              </a:rPr>
+              <a:t>(150,0,150)</a:t>
+            </a:r>
+            <a:r>
+              <a:rPr lang="en-US" sz="1800" dirty="0" smtClean="0">
+                <a:latin typeface="Courier New"/>
+                <a:cs typeface="Courier New"/>
+              </a:rPr>
+              <a:t>; </a:t>
+            </a:r>
+          </a:p>
+          <a:p>
+            <a:pPr marL="692150" lvl="2" indent="0">
+              <a:buNone/>
+            </a:pPr>
+            <a:r>
+              <a:rPr lang="en-US" sz="1800" dirty="0" smtClean="0">
+                <a:latin typeface="Courier New"/>
+                <a:cs typeface="Courier New"/>
+              </a:rPr>
+              <a:t>line</a:t>
+            </a:r>
+            <a:r>
+              <a:rPr lang="en-US" sz="1800" dirty="0">
+                <a:latin typeface="Courier New"/>
+                <a:cs typeface="Courier New"/>
+              </a:rPr>
+              <a:t>(0,0,400,400)</a:t>
+            </a:r>
+            <a:r>
+              <a:rPr lang="en-US" sz="1800" dirty="0" smtClean="0">
+                <a:latin typeface="Courier New"/>
+                <a:cs typeface="Courier New"/>
+              </a:rPr>
+              <a:t>; </a:t>
+            </a:r>
+          </a:p>
+          <a:p>
+            <a:pPr marL="692150" lvl="2" indent="0">
+              <a:buNone/>
+            </a:pPr>
+            <a:r>
+              <a:rPr lang="en-US" sz="1800" dirty="0" smtClean="0">
+                <a:latin typeface="Courier New"/>
+                <a:cs typeface="Courier New"/>
+              </a:rPr>
+              <a:t>ellipse</a:t>
+            </a:r>
+            <a:r>
+              <a:rPr lang="en-US" sz="1800" dirty="0">
+                <a:latin typeface="Courier New"/>
+                <a:cs typeface="Courier New"/>
+              </a:rPr>
+              <a:t>(200,200,100,100)</a:t>
+            </a:r>
+            <a:r>
+              <a:rPr lang="en-US" sz="1800" dirty="0" smtClean="0">
+                <a:latin typeface="Courier New"/>
+                <a:cs typeface="Courier New"/>
+              </a:rPr>
+              <a:t>;  </a:t>
             </a:r>
             <a:endParaRPr lang="en-US" dirty="0"/>
           </a:p>
-          <a:p>
-            <a:r>
-              <a:rPr lang="en-US" dirty="0" smtClean="0"/>
-              <a:t>Deena Engel</a:t>
-            </a:r>
-            <a:endParaRPr lang="en-US" dirty="0"/>
-          </a:p>
-        </p:txBody>
-      </p:sp>
+        </p:txBody>
+      </p:sp>
+      <p:pic>
+        <p:nvPicPr>
+          <p:cNvPr id="10" name="Picture 9"/>
+          <p:cNvPicPr/>
+          <p:nvPr/>
+        </p:nvPicPr>
+        <p:blipFill>
+          <a:blip r:embed="rId2">
+            <a:extLst>
+              <a:ext uri="{28A0092B-C50C-407E-A947-70E740481C1C}">
+                <a14:useLocalDpi xmlns:a14="http://schemas.microsoft.com/office/drawing/2010/main" val="0"/>
+              </a:ext>
+            </a:extLst>
+          </a:blip>
+          <a:srcRect/>
+          <a:stretch>
+            <a:fillRect/>
+          </a:stretch>
+        </p:blipFill>
+        <p:spPr bwMode="auto">
+          <a:xfrm>
+            <a:off x="5746295" y="4814333"/>
+            <a:ext cx="1148715" cy="1216025"/>
+          </a:xfrm>
+          <a:prstGeom prst="rect">
+            <a:avLst/>
+          </a:prstGeom>
+          <a:noFill/>
+          <a:ln>
+            <a:noFill/>
+          </a:ln>
+        </p:spPr>
+      </p:pic>
     </p:spTree>
     <p:extLst>
       <p:ext uri="{BB962C8B-B14F-4D97-AF65-F5344CB8AC3E}">
-        <p14:creationId xmlns:p14="http://schemas.microsoft.com/office/powerpoint/2010/main" val="4267731961"/>
+        <p14:creationId xmlns:p14="http://schemas.microsoft.com/office/powerpoint/2010/main" val="773993378"/>
+      </p:ext>
+    </p:extLst>
+  </p:cSld>
+  <p:clrMapOvr>
+    <a:masterClrMapping/>
+  </p:clrMapOvr>
+</p:sld>
+</file>
+
+<file path=ppt/slides/slide12.xml><?xml version="1.0" encoding="utf-8"?>
+<p:sld xmlns:a="http://schemas.openxmlformats.org/drawingml/2006/main" xmlns:r="http://schemas.openxmlformats.org/officeDocument/2006/relationships" xmlns:p="http://schemas.openxmlformats.org/presentationml/2006/main">
+  <p:cSld>
+    <p:spTree>
+      <p:nvGrpSpPr>
+        <p:cNvPr id="1" name=""/>
+        <p:cNvGrpSpPr/>
+        <p:nvPr/>
+      </p:nvGrpSpPr>
+      <p:grpSpPr>
+        <a:xfrm>
+          <a:off x="0" y="0"/>
+          <a:ext cx="0" cy="0"/>
+          <a:chOff x="0" y="0"/>
+          <a:chExt cx="0" cy="0"/>
+        </a:xfrm>
+      </p:grpSpPr>
+      <p:sp>
+        <p:nvSpPr>
+          <p:cNvPr id="2" name="Title 1"/>
+          <p:cNvSpPr>
+            <a:spLocks noGrp="1"/>
+          </p:cNvSpPr>
+          <p:nvPr>
+            <p:ph type="title"/>
+          </p:nvPr>
+        </p:nvSpPr>
+        <p:spPr/>
+        <p:txBody>
+          <a:bodyPr/>
+          <a:lstStyle/>
+          <a:p>
+            <a:r>
+              <a:rPr lang="en-US" sz="4800" i="1" dirty="0" smtClean="0"/>
+              <a:t>Notice that we can annotate the code using comments.</a:t>
+            </a:r>
+            <a:endParaRPr lang="en-US" sz="4800" i="1" dirty="0"/>
+          </a:p>
+        </p:txBody>
+      </p:sp>
+      <p:sp>
+        <p:nvSpPr>
+          <p:cNvPr id="9" name="Content Placeholder 8"/>
+          <p:cNvSpPr>
+            <a:spLocks noGrp="1"/>
+          </p:cNvSpPr>
+          <p:nvPr>
+            <p:ph idx="1"/>
+          </p:nvPr>
+        </p:nvSpPr>
+        <p:spPr>
+          <a:xfrm>
+            <a:off x="792162" y="1761564"/>
+            <a:ext cx="7930288" cy="4880415"/>
+          </a:xfrm>
+        </p:spPr>
+        <p:txBody>
+          <a:bodyPr>
+            <a:normAutofit/>
+          </a:bodyPr>
+          <a:lstStyle/>
+          <a:p>
+            <a:r>
+              <a:rPr lang="en-US" dirty="0" smtClean="0"/>
+              <a:t>The following code gives you:</a:t>
+            </a:r>
+          </a:p>
+          <a:p>
+            <a:pPr marL="692150" lvl="2" indent="0">
+              <a:buNone/>
+            </a:pPr>
+            <a:r>
+              <a:rPr lang="en-US" sz="1800" dirty="0">
+                <a:latin typeface="Courier New"/>
+                <a:cs typeface="Courier New"/>
+              </a:rPr>
+              <a:t>size(400,400)</a:t>
+            </a:r>
+            <a:r>
+              <a:rPr lang="en-US" sz="1800" dirty="0" smtClean="0">
+                <a:latin typeface="Courier New"/>
+                <a:cs typeface="Courier New"/>
+              </a:rPr>
+              <a:t>;    // set up the size of the window</a:t>
+            </a:r>
+            <a:endParaRPr lang="en-US" sz="1800" dirty="0">
+              <a:latin typeface="Courier New"/>
+              <a:cs typeface="Courier New"/>
+            </a:endParaRPr>
+          </a:p>
+          <a:p>
+            <a:pPr marL="692150" lvl="2" indent="0">
+              <a:buNone/>
+            </a:pPr>
+            <a:r>
+              <a:rPr lang="en-US" sz="1800" dirty="0">
+                <a:latin typeface="Courier New"/>
+                <a:cs typeface="Courier New"/>
+              </a:rPr>
+              <a:t>background(255)</a:t>
+            </a:r>
+            <a:r>
+              <a:rPr lang="en-US" sz="1800" dirty="0" smtClean="0">
+                <a:latin typeface="Courier New"/>
+                <a:cs typeface="Courier New"/>
+              </a:rPr>
+              <a:t>;  // the background is white</a:t>
+            </a:r>
+            <a:endParaRPr lang="en-US" sz="1800" dirty="0">
+              <a:latin typeface="Courier New"/>
+              <a:cs typeface="Courier New"/>
+            </a:endParaRPr>
+          </a:p>
+          <a:p>
+            <a:pPr marL="692150" lvl="2" indent="0">
+              <a:buNone/>
+            </a:pPr>
+            <a:r>
+              <a:rPr lang="en-US" sz="1800" dirty="0">
+                <a:latin typeface="Courier New"/>
+                <a:cs typeface="Courier New"/>
+              </a:rPr>
+              <a:t>stroke(0)</a:t>
+            </a:r>
+            <a:r>
+              <a:rPr lang="en-US" sz="1800" dirty="0" smtClean="0">
+                <a:latin typeface="Courier New"/>
+                <a:cs typeface="Courier New"/>
+              </a:rPr>
+              <a:t>; // lines and outlines are in black</a:t>
+            </a:r>
+            <a:endParaRPr lang="en-US" sz="1800" dirty="0">
+              <a:latin typeface="Courier New"/>
+              <a:cs typeface="Courier New"/>
+            </a:endParaRPr>
+          </a:p>
+          <a:p>
+            <a:pPr marL="692150" lvl="2" indent="0">
+              <a:buNone/>
+            </a:pPr>
+            <a:r>
+              <a:rPr lang="en-US" sz="1800" dirty="0">
+                <a:latin typeface="Courier New"/>
+                <a:cs typeface="Courier New"/>
+              </a:rPr>
+              <a:t>fill(150,0,150)</a:t>
+            </a:r>
+            <a:r>
+              <a:rPr lang="en-US" sz="1800" dirty="0" smtClean="0">
+                <a:latin typeface="Courier New"/>
+                <a:cs typeface="Courier New"/>
+              </a:rPr>
+              <a:t>;   // fill shapes in purple</a:t>
+            </a:r>
+            <a:endParaRPr lang="en-US" sz="1800" dirty="0">
+              <a:latin typeface="Courier New"/>
+              <a:cs typeface="Courier New"/>
+            </a:endParaRPr>
+          </a:p>
+          <a:p>
+            <a:pPr marL="692150" lvl="2" indent="0">
+              <a:buNone/>
+            </a:pPr>
+            <a:r>
+              <a:rPr lang="en-US" sz="1800" dirty="0">
+                <a:latin typeface="Courier New"/>
+                <a:cs typeface="Courier New"/>
+              </a:rPr>
+              <a:t>line(0,0,400,400)</a:t>
+            </a:r>
+            <a:r>
+              <a:rPr lang="en-US" sz="1800" dirty="0" smtClean="0">
+                <a:latin typeface="Courier New"/>
+                <a:cs typeface="Courier New"/>
+              </a:rPr>
+              <a:t>; // draw a diagonal in black</a:t>
+            </a:r>
+            <a:endParaRPr lang="en-US" sz="1800" dirty="0">
+              <a:latin typeface="Courier New"/>
+              <a:cs typeface="Courier New"/>
+            </a:endParaRPr>
+          </a:p>
+          <a:p>
+            <a:pPr marL="692150" lvl="2" indent="0">
+              <a:buNone/>
+            </a:pPr>
+            <a:r>
+              <a:rPr lang="en-US" sz="1800" dirty="0">
+                <a:latin typeface="Courier New"/>
+                <a:cs typeface="Courier New"/>
+              </a:rPr>
+              <a:t>ellipse(200,200,100,100)</a:t>
+            </a:r>
+            <a:r>
+              <a:rPr lang="en-US" sz="1800" dirty="0" smtClean="0">
+                <a:latin typeface="Courier New"/>
+                <a:cs typeface="Courier New"/>
+              </a:rPr>
+              <a:t>;  //draw a purple circle</a:t>
+            </a:r>
+          </a:p>
+          <a:p>
+            <a:pPr marL="692150" lvl="2" indent="0">
+              <a:buNone/>
+            </a:pPr>
+            <a:endParaRPr lang="en-US" dirty="0" smtClean="0"/>
+          </a:p>
+          <a:p>
+            <a:pPr marL="692150" lvl="2" indent="0">
+              <a:buNone/>
+            </a:pPr>
+            <a:endParaRPr lang="en-US" dirty="0"/>
+          </a:p>
+          <a:p>
+            <a:r>
+              <a:rPr lang="en-US" dirty="0" smtClean="0"/>
+              <a:t>Comments are for human readers only … the computer ignores them!</a:t>
+            </a:r>
+            <a:endParaRPr lang="en-US" dirty="0"/>
+          </a:p>
+        </p:txBody>
+      </p:sp>
+      <p:pic>
+        <p:nvPicPr>
+          <p:cNvPr id="10" name="Picture 9"/>
+          <p:cNvPicPr/>
+          <p:nvPr/>
+        </p:nvPicPr>
+        <p:blipFill>
+          <a:blip r:embed="rId2">
+            <a:extLst>
+              <a:ext uri="{28A0092B-C50C-407E-A947-70E740481C1C}">
+                <a14:useLocalDpi xmlns:a14="http://schemas.microsoft.com/office/drawing/2010/main" val="0"/>
+              </a:ext>
+            </a:extLst>
+          </a:blip>
+          <a:srcRect/>
+          <a:stretch>
+            <a:fillRect/>
+          </a:stretch>
+        </p:blipFill>
+        <p:spPr bwMode="auto">
+          <a:xfrm>
+            <a:off x="7422408" y="4518215"/>
+            <a:ext cx="940542" cy="866692"/>
+          </a:xfrm>
+          <a:prstGeom prst="rect">
+            <a:avLst/>
+          </a:prstGeom>
+          <a:noFill/>
+          <a:ln>
+            <a:noFill/>
+          </a:ln>
+        </p:spPr>
+      </p:pic>
+    </p:spTree>
+    <p:extLst>
+      <p:ext uri="{BB962C8B-B14F-4D97-AF65-F5344CB8AC3E}">
+        <p14:creationId xmlns:p14="http://schemas.microsoft.com/office/powerpoint/2010/main" val="1227956839"/>
+      </p:ext>
+    </p:extLst>
+  </p:cSld>
+  <p:clrMapOvr>
+    <a:masterClrMapping/>
+  </p:clrMapOvr>
+</p:sld>
+</file>
+
+<file path=ppt/slides/slide13.xml><?xml version="1.0" encoding="utf-8"?>
+<p:sld xmlns:a="http://schemas.openxmlformats.org/drawingml/2006/main" xmlns:r="http://schemas.openxmlformats.org/officeDocument/2006/relationships" xmlns:p="http://schemas.openxmlformats.org/presentationml/2006/main">
+  <p:cSld>
+    <p:spTree>
+      <p:nvGrpSpPr>
+        <p:cNvPr id="1" name=""/>
+        <p:cNvGrpSpPr/>
+        <p:nvPr/>
+      </p:nvGrpSpPr>
+      <p:grpSpPr>
+        <a:xfrm>
+          <a:off x="0" y="0"/>
+          <a:ext cx="0" cy="0"/>
+          <a:chOff x="0" y="0"/>
+          <a:chExt cx="0" cy="0"/>
+        </a:xfrm>
+      </p:grpSpPr>
+      <p:sp>
+        <p:nvSpPr>
+          <p:cNvPr id="2" name="Title 1"/>
+          <p:cNvSpPr>
+            <a:spLocks noGrp="1"/>
+          </p:cNvSpPr>
+          <p:nvPr>
+            <p:ph type="title"/>
+          </p:nvPr>
+        </p:nvSpPr>
+        <p:spPr/>
+        <p:txBody>
+          <a:bodyPr/>
+          <a:lstStyle/>
+          <a:p>
+            <a:r>
+              <a:rPr lang="en-US" sz="4800" i="1" dirty="0" smtClean="0"/>
+              <a:t>Its time to do a sketch of your own! Try the following:</a:t>
+            </a:r>
+            <a:endParaRPr lang="en-US" sz="4800" i="1" dirty="0"/>
+          </a:p>
+        </p:txBody>
+      </p:sp>
+      <p:sp>
+        <p:nvSpPr>
+          <p:cNvPr id="3" name="Content Placeholder 2"/>
+          <p:cNvSpPr>
+            <a:spLocks noGrp="1"/>
+          </p:cNvSpPr>
+          <p:nvPr>
+            <p:ph idx="1"/>
+          </p:nvPr>
+        </p:nvSpPr>
+        <p:spPr/>
+        <p:txBody>
+          <a:bodyPr>
+            <a:normAutofit fontScale="92500" lnSpcReduction="10000"/>
+          </a:bodyPr>
+          <a:lstStyle/>
+          <a:p>
+            <a:r>
+              <a:rPr lang="en-US" dirty="0" smtClean="0"/>
+              <a:t>Line: </a:t>
+            </a:r>
+            <a:r>
+              <a:rPr lang="en-US" i="1" dirty="0" smtClean="0"/>
+              <a:t>line (</a:t>
+            </a:r>
+            <a:r>
+              <a:rPr lang="en-US" i="1" dirty="0" err="1" smtClean="0"/>
+              <a:t>a,b,c,d</a:t>
+            </a:r>
+            <a:r>
+              <a:rPr lang="en-US" i="1" dirty="0" smtClean="0"/>
+              <a:t>)</a:t>
+            </a:r>
+            <a:r>
+              <a:rPr lang="en-US" dirty="0" smtClean="0"/>
+              <a:t> where </a:t>
+            </a:r>
+            <a:r>
+              <a:rPr lang="en-US" i="1" dirty="0" smtClean="0"/>
+              <a:t>(</a:t>
+            </a:r>
+            <a:r>
+              <a:rPr lang="en-US" i="1" dirty="0" err="1" smtClean="0"/>
+              <a:t>a,b</a:t>
+            </a:r>
+            <a:r>
+              <a:rPr lang="en-US" i="1" dirty="0" smtClean="0"/>
+              <a:t>)</a:t>
+            </a:r>
+            <a:r>
+              <a:rPr lang="en-US" dirty="0" smtClean="0"/>
+              <a:t> is the first point and </a:t>
+            </a:r>
+            <a:r>
+              <a:rPr lang="en-US" i="1" dirty="0" smtClean="0"/>
+              <a:t>(</a:t>
+            </a:r>
+            <a:r>
+              <a:rPr lang="en-US" i="1" dirty="0" err="1" smtClean="0"/>
+              <a:t>c,d</a:t>
+            </a:r>
+            <a:r>
+              <a:rPr lang="en-US" i="1" dirty="0" smtClean="0"/>
+              <a:t>)</a:t>
+            </a:r>
+            <a:r>
+              <a:rPr lang="en-US" dirty="0" smtClean="0"/>
+              <a:t> is the second point.</a:t>
+            </a:r>
+          </a:p>
+          <a:p>
+            <a:r>
+              <a:rPr lang="en-US" dirty="0" smtClean="0"/>
+              <a:t>Rectangle: </a:t>
+            </a:r>
+            <a:r>
+              <a:rPr lang="en-US" i="1" dirty="0" err="1" smtClean="0"/>
+              <a:t>rect</a:t>
+            </a:r>
+            <a:r>
+              <a:rPr lang="en-US" i="1" dirty="0" smtClean="0"/>
+              <a:t>(</a:t>
+            </a:r>
+            <a:r>
+              <a:rPr lang="en-US" i="1" dirty="0" err="1" smtClean="0"/>
+              <a:t>a,b,c,d</a:t>
+            </a:r>
+            <a:r>
+              <a:rPr lang="en-US" i="1" dirty="0" smtClean="0"/>
+              <a:t>)</a:t>
+            </a:r>
+            <a:r>
+              <a:rPr lang="en-US" dirty="0" smtClean="0"/>
+              <a:t> where </a:t>
+            </a:r>
+            <a:r>
+              <a:rPr lang="en-US" i="1" dirty="0" smtClean="0"/>
+              <a:t>(</a:t>
+            </a:r>
+            <a:r>
+              <a:rPr lang="en-US" i="1" dirty="0" err="1" smtClean="0"/>
+              <a:t>a,b</a:t>
+            </a:r>
+            <a:r>
+              <a:rPr lang="en-US" i="1" dirty="0" smtClean="0"/>
+              <a:t>)</a:t>
+            </a:r>
+            <a:r>
+              <a:rPr lang="en-US" dirty="0" smtClean="0"/>
+              <a:t> is the upper left corner; </a:t>
+            </a:r>
+            <a:r>
+              <a:rPr lang="en-US" i="1" dirty="0" smtClean="0"/>
+              <a:t>c</a:t>
+            </a:r>
+            <a:r>
+              <a:rPr lang="en-US" dirty="0" smtClean="0"/>
+              <a:t> is the width and </a:t>
+            </a:r>
+            <a:r>
+              <a:rPr lang="en-US" i="1" dirty="0" smtClean="0"/>
+              <a:t>d</a:t>
+            </a:r>
+            <a:r>
+              <a:rPr lang="en-US" dirty="0" smtClean="0"/>
+              <a:t> is the height.</a:t>
+            </a:r>
+          </a:p>
+          <a:p>
+            <a:r>
+              <a:rPr lang="en-US" dirty="0" smtClean="0"/>
+              <a:t>Ellipse: </a:t>
+            </a:r>
+            <a:r>
+              <a:rPr lang="en-US" i="1" dirty="0" smtClean="0"/>
+              <a:t>ellipse(</a:t>
+            </a:r>
+            <a:r>
+              <a:rPr lang="en-US" i="1" dirty="0" err="1" smtClean="0"/>
+              <a:t>a,b,c,d</a:t>
+            </a:r>
+            <a:r>
+              <a:rPr lang="en-US" i="1" dirty="0" smtClean="0"/>
+              <a:t>)</a:t>
+            </a:r>
+            <a:r>
+              <a:rPr lang="en-US" dirty="0" smtClean="0"/>
+              <a:t> where </a:t>
+            </a:r>
+            <a:r>
+              <a:rPr lang="en-US" i="1" dirty="0" smtClean="0"/>
+              <a:t>(</a:t>
+            </a:r>
+            <a:r>
+              <a:rPr lang="en-US" i="1" dirty="0" err="1" smtClean="0"/>
+              <a:t>a,b</a:t>
+            </a:r>
+            <a:r>
+              <a:rPr lang="en-US" i="1" dirty="0" smtClean="0"/>
+              <a:t>)</a:t>
+            </a:r>
+            <a:r>
+              <a:rPr lang="en-US" dirty="0" smtClean="0"/>
+              <a:t> is the center point; </a:t>
+            </a:r>
+            <a:r>
+              <a:rPr lang="en-US" i="1" dirty="0" smtClean="0"/>
+              <a:t>c</a:t>
+            </a:r>
+            <a:r>
+              <a:rPr lang="en-US" dirty="0" smtClean="0"/>
+              <a:t> is the width and </a:t>
+            </a:r>
+            <a:r>
+              <a:rPr lang="en-US" i="1" dirty="0" smtClean="0"/>
+              <a:t>d</a:t>
+            </a:r>
+            <a:r>
+              <a:rPr lang="en-US" dirty="0" smtClean="0"/>
+              <a:t> is the height. Note that if </a:t>
+            </a:r>
+            <a:r>
+              <a:rPr lang="en-US" i="1" dirty="0" smtClean="0"/>
+              <a:t>c</a:t>
+            </a:r>
+            <a:r>
+              <a:rPr lang="en-US" dirty="0" smtClean="0"/>
+              <a:t> is equal to </a:t>
+            </a:r>
+            <a:r>
+              <a:rPr lang="en-US" i="1" dirty="0" smtClean="0"/>
+              <a:t>d</a:t>
+            </a:r>
+            <a:r>
+              <a:rPr lang="en-US" dirty="0" smtClean="0"/>
+              <a:t>, </a:t>
+            </a:r>
+            <a:r>
+              <a:rPr lang="en-US" i="1" dirty="0" err="1" smtClean="0"/>
+              <a:t>elipse</a:t>
+            </a:r>
+            <a:r>
+              <a:rPr lang="en-US" dirty="0" smtClean="0"/>
+              <a:t> draws a circle.</a:t>
+            </a:r>
+          </a:p>
+          <a:p>
+            <a:r>
+              <a:rPr lang="en-US" dirty="0" smtClean="0"/>
+              <a:t>Triangle: </a:t>
+            </a:r>
+            <a:r>
+              <a:rPr lang="en-US" i="1" dirty="0" smtClean="0"/>
+              <a:t>triangle(</a:t>
+            </a:r>
+            <a:r>
+              <a:rPr lang="en-US" i="1" dirty="0" err="1" smtClean="0"/>
+              <a:t>a,b,c,d,e,f</a:t>
+            </a:r>
+            <a:r>
+              <a:rPr lang="en-US" i="1" dirty="0" smtClean="0"/>
+              <a:t>) </a:t>
+            </a:r>
+            <a:r>
+              <a:rPr lang="en-US" dirty="0" smtClean="0"/>
+              <a:t>where </a:t>
+            </a:r>
+            <a:r>
+              <a:rPr lang="en-US" i="1" dirty="0" smtClean="0"/>
+              <a:t>(</a:t>
+            </a:r>
+            <a:r>
+              <a:rPr lang="en-US" i="1" dirty="0" err="1" smtClean="0"/>
+              <a:t>a,b</a:t>
+            </a:r>
+            <a:r>
+              <a:rPr lang="en-US" i="1" dirty="0" smtClean="0"/>
+              <a:t>)</a:t>
+            </a:r>
+            <a:r>
+              <a:rPr lang="en-US" dirty="0" smtClean="0"/>
+              <a:t>, </a:t>
+            </a:r>
+            <a:r>
+              <a:rPr lang="en-US" i="1" dirty="0" smtClean="0"/>
+              <a:t>(</a:t>
+            </a:r>
+            <a:r>
+              <a:rPr lang="en-US" i="1" dirty="0" err="1" smtClean="0"/>
+              <a:t>c,d</a:t>
+            </a:r>
+            <a:r>
+              <a:rPr lang="en-US" i="1" dirty="0" smtClean="0"/>
+              <a:t>)</a:t>
+            </a:r>
+            <a:r>
+              <a:rPr lang="en-US" dirty="0" smtClean="0"/>
+              <a:t> and </a:t>
+            </a:r>
+            <a:r>
+              <a:rPr lang="en-US" i="1" dirty="0" smtClean="0"/>
+              <a:t>(</a:t>
+            </a:r>
+            <a:r>
+              <a:rPr lang="en-US" i="1" dirty="0" err="1" smtClean="0"/>
+              <a:t>e,f</a:t>
+            </a:r>
+            <a:r>
+              <a:rPr lang="en-US" i="1" dirty="0" smtClean="0"/>
+              <a:t>)</a:t>
+            </a:r>
+            <a:r>
+              <a:rPr lang="en-US" dirty="0" smtClean="0"/>
+              <a:t> are the points that create the triangle.</a:t>
+            </a:r>
+          </a:p>
+          <a:p>
+            <a:endParaRPr lang="en-US" dirty="0"/>
+          </a:p>
+        </p:txBody>
+      </p:sp>
+    </p:spTree>
+    <p:extLst>
+      <p:ext uri="{BB962C8B-B14F-4D97-AF65-F5344CB8AC3E}">
+        <p14:creationId xmlns:p14="http://schemas.microsoft.com/office/powerpoint/2010/main" val="91583783"/>
+      </p:ext>
+    </p:extLst>
+  </p:cSld>
+  <p:clrMapOvr>
+    <a:masterClrMapping/>
+  </p:clrMapOvr>
+</p:sld>
+</file>
+
+<file path=ppt/slides/slide14.xml><?xml version="1.0" encoding="utf-8"?>
+<p:sld xmlns:a="http://schemas.openxmlformats.org/drawingml/2006/main" xmlns:r="http://schemas.openxmlformats.org/officeDocument/2006/relationships" xmlns:p="http://schemas.openxmlformats.org/presentationml/2006/main">
+  <p:cSld>
+    <p:spTree>
+      <p:nvGrpSpPr>
+        <p:cNvPr id="1" name=""/>
+        <p:cNvGrpSpPr/>
+        <p:nvPr/>
+      </p:nvGrpSpPr>
+      <p:grpSpPr>
+        <a:xfrm>
+          <a:off x="0" y="0"/>
+          <a:ext cx="0" cy="0"/>
+          <a:chOff x="0" y="0"/>
+          <a:chExt cx="0" cy="0"/>
+        </a:xfrm>
+      </p:grpSpPr>
+      <p:sp>
+        <p:nvSpPr>
+          <p:cNvPr id="2" name="Title 1"/>
+          <p:cNvSpPr>
+            <a:spLocks noGrp="1"/>
+          </p:cNvSpPr>
+          <p:nvPr>
+            <p:ph type="ctrTitle"/>
+          </p:nvPr>
+        </p:nvSpPr>
+        <p:spPr/>
+        <p:txBody>
+          <a:bodyPr/>
+          <a:lstStyle/>
+          <a:p>
+            <a:r>
+              <a:rPr lang="en-US" dirty="0" smtClean="0"/>
+              <a:t>Introduction to </a:t>
+            </a:r>
+            <a:r>
+              <a:rPr lang="en-US" dirty="0" smtClean="0"/>
+              <a:t>Processing: Part 2</a:t>
+            </a:r>
+            <a:endParaRPr lang="en-US" dirty="0"/>
+          </a:p>
+        </p:txBody>
+      </p:sp>
+      <p:sp>
+        <p:nvSpPr>
+          <p:cNvPr id="3" name="Subtitle 2"/>
+          <p:cNvSpPr>
+            <a:spLocks noGrp="1"/>
+          </p:cNvSpPr>
+          <p:nvPr>
+            <p:ph type="subTitle" idx="1"/>
+          </p:nvPr>
+        </p:nvSpPr>
+        <p:spPr/>
+        <p:txBody>
+          <a:bodyPr/>
+          <a:lstStyle/>
+          <a:p>
+            <a:r>
+              <a:rPr lang="en-US" dirty="0" smtClean="0"/>
+              <a:t>Tech Focus 3</a:t>
+            </a:r>
+          </a:p>
+          <a:p>
+            <a:r>
+              <a:rPr lang="en-US" dirty="0" smtClean="0"/>
+              <a:t>September 26, 2015</a:t>
+            </a:r>
+            <a:endParaRPr lang="en-US" dirty="0"/>
+          </a:p>
+        </p:txBody>
+      </p:sp>
+    </p:spTree>
+    <p:extLst>
+      <p:ext uri="{BB962C8B-B14F-4D97-AF65-F5344CB8AC3E}">
+        <p14:creationId xmlns:p14="http://schemas.microsoft.com/office/powerpoint/2010/main" val="250366495"/>
+      </p:ext>
+    </p:extLst>
+  </p:cSld>
+  <p:clrMapOvr>
+    <a:masterClrMapping/>
+  </p:clrMapOvr>
+</p:sld>
+</file>
+
+<file path=ppt/slides/slide15.xml><?xml version="1.0" encoding="utf-8"?>
+<p:sld xmlns:a="http://schemas.openxmlformats.org/drawingml/2006/main" xmlns:r="http://schemas.openxmlformats.org/officeDocument/2006/relationships" xmlns:p="http://schemas.openxmlformats.org/presentationml/2006/main">
+  <p:cSld>
+    <p:spTree>
+      <p:nvGrpSpPr>
+        <p:cNvPr id="1" name=""/>
+        <p:cNvGrpSpPr/>
+        <p:nvPr/>
+      </p:nvGrpSpPr>
+      <p:grpSpPr>
+        <a:xfrm>
+          <a:off x="0" y="0"/>
+          <a:ext cx="0" cy="0"/>
+          <a:chOff x="0" y="0"/>
+          <a:chExt cx="0" cy="0"/>
+        </a:xfrm>
+      </p:grpSpPr>
+      <p:sp>
+        <p:nvSpPr>
+          <p:cNvPr id="2" name="Title 1"/>
+          <p:cNvSpPr>
+            <a:spLocks noGrp="1"/>
+          </p:cNvSpPr>
+          <p:nvPr>
+            <p:ph type="title"/>
+          </p:nvPr>
+        </p:nvSpPr>
+        <p:spPr/>
+        <p:txBody>
+          <a:bodyPr/>
+          <a:lstStyle/>
+          <a:p>
+            <a:endParaRPr lang="en-US"/>
+          </a:p>
+        </p:txBody>
+      </p:sp>
+      <p:sp>
+        <p:nvSpPr>
+          <p:cNvPr id="3" name="Content Placeholder 2"/>
+          <p:cNvSpPr>
+            <a:spLocks noGrp="1"/>
+          </p:cNvSpPr>
+          <p:nvPr>
+            <p:ph idx="1"/>
+          </p:nvPr>
+        </p:nvSpPr>
+        <p:spPr/>
+        <p:txBody>
+          <a:bodyPr/>
+          <a:lstStyle/>
+          <a:p>
+            <a:endParaRPr lang="en-US"/>
+          </a:p>
+        </p:txBody>
+      </p:sp>
+    </p:spTree>
+    <p:extLst>
+      <p:ext uri="{BB962C8B-B14F-4D97-AF65-F5344CB8AC3E}">
+        <p14:creationId xmlns:p14="http://schemas.microsoft.com/office/powerpoint/2010/main" val="968812114"/>
+      </p:ext>
+    </p:extLst>
+  </p:cSld>
+  <p:clrMapOvr>
+    <a:masterClrMapping/>
+  </p:clrMapOvr>
+</p:sld>
+</file>
+
+<file path=ppt/slides/slide16.xml><?xml version="1.0" encoding="utf-8"?>
+<p:sld xmlns:a="http://schemas.openxmlformats.org/drawingml/2006/main" xmlns:r="http://schemas.openxmlformats.org/officeDocument/2006/relationships" xmlns:p="http://schemas.openxmlformats.org/presentationml/2006/main">
+  <p:cSld>
+    <p:spTree>
+      <p:nvGrpSpPr>
+        <p:cNvPr id="1" name=""/>
+        <p:cNvGrpSpPr/>
+        <p:nvPr/>
+      </p:nvGrpSpPr>
+      <p:grpSpPr>
+        <a:xfrm>
+          <a:off x="0" y="0"/>
+          <a:ext cx="0" cy="0"/>
+          <a:chOff x="0" y="0"/>
+          <a:chExt cx="0" cy="0"/>
+        </a:xfrm>
+      </p:grpSpPr>
+      <p:sp>
+        <p:nvSpPr>
+          <p:cNvPr id="2" name="Title 1"/>
+          <p:cNvSpPr>
+            <a:spLocks noGrp="1"/>
+          </p:cNvSpPr>
+          <p:nvPr>
+            <p:ph type="title"/>
+          </p:nvPr>
+        </p:nvSpPr>
+        <p:spPr/>
+        <p:txBody>
+          <a:bodyPr/>
+          <a:lstStyle/>
+          <a:p>
+            <a:endParaRPr lang="en-US"/>
+          </a:p>
+        </p:txBody>
+      </p:sp>
+      <p:sp>
+        <p:nvSpPr>
+          <p:cNvPr id="3" name="Content Placeholder 2"/>
+          <p:cNvSpPr>
+            <a:spLocks noGrp="1"/>
+          </p:cNvSpPr>
+          <p:nvPr>
+            <p:ph idx="1"/>
+          </p:nvPr>
+        </p:nvSpPr>
+        <p:spPr/>
+        <p:txBody>
+          <a:bodyPr/>
+          <a:lstStyle/>
+          <a:p>
+            <a:endParaRPr lang="en-US"/>
+          </a:p>
+        </p:txBody>
+      </p:sp>
+    </p:spTree>
+    <p:extLst>
+      <p:ext uri="{BB962C8B-B14F-4D97-AF65-F5344CB8AC3E}">
+        <p14:creationId xmlns:p14="http://schemas.microsoft.com/office/powerpoint/2010/main" val="3643397802"/>
+      </p:ext>
+    </p:extLst>
+  </p:cSld>
+  <p:clrMapOvr>
+    <a:masterClrMapping/>
+  </p:clrMapOvr>
+</p:sld>
+</file>
+
+<file path=ppt/slides/slide17.xml><?xml version="1.0" encoding="utf-8"?>
+<p:sld xmlns:a="http://schemas.openxmlformats.org/drawingml/2006/main" xmlns:r="http://schemas.openxmlformats.org/officeDocument/2006/relationships" xmlns:p="http://schemas.openxmlformats.org/presentationml/2006/main">
+  <p:cSld>
+    <p:spTree>
+      <p:nvGrpSpPr>
+        <p:cNvPr id="1" name=""/>
+        <p:cNvGrpSpPr/>
+        <p:nvPr/>
+      </p:nvGrpSpPr>
+      <p:grpSpPr>
+        <a:xfrm>
+          <a:off x="0" y="0"/>
+          <a:ext cx="0" cy="0"/>
+          <a:chOff x="0" y="0"/>
+          <a:chExt cx="0" cy="0"/>
+        </a:xfrm>
+      </p:grpSpPr>
+      <p:sp>
+        <p:nvSpPr>
+          <p:cNvPr id="2" name="Title 1"/>
+          <p:cNvSpPr>
+            <a:spLocks noGrp="1"/>
+          </p:cNvSpPr>
+          <p:nvPr>
+            <p:ph type="title"/>
+          </p:nvPr>
+        </p:nvSpPr>
+        <p:spPr/>
+        <p:txBody>
+          <a:bodyPr/>
+          <a:lstStyle/>
+          <a:p>
+            <a:endParaRPr lang="en-US"/>
+          </a:p>
+        </p:txBody>
+      </p:sp>
+      <p:sp>
+        <p:nvSpPr>
+          <p:cNvPr id="3" name="Content Placeholder 2"/>
+          <p:cNvSpPr>
+            <a:spLocks noGrp="1"/>
+          </p:cNvSpPr>
+          <p:nvPr>
+            <p:ph idx="1"/>
+          </p:nvPr>
+        </p:nvSpPr>
+        <p:spPr/>
+        <p:txBody>
+          <a:bodyPr/>
+          <a:lstStyle/>
+          <a:p>
+            <a:endParaRPr lang="en-US"/>
+          </a:p>
+        </p:txBody>
+      </p:sp>
+    </p:spTree>
+    <p:extLst>
+      <p:ext uri="{BB962C8B-B14F-4D97-AF65-F5344CB8AC3E}">
+        <p14:creationId xmlns:p14="http://schemas.microsoft.com/office/powerpoint/2010/main" val="528213199"/>
+      </p:ext>
+    </p:extLst>
+  </p:cSld>
+  <p:clrMapOvr>
+    <a:masterClrMapping/>
+  </p:clrMapOvr>
+</p:sld>
+</file>
+
+<file path=ppt/slides/slide18.xml><?xml version="1.0" encoding="utf-8"?>
+<p:sld xmlns:a="http://schemas.openxmlformats.org/drawingml/2006/main" xmlns:r="http://schemas.openxmlformats.org/officeDocument/2006/relationships" xmlns:p="http://schemas.openxmlformats.org/presentationml/2006/main">
+  <p:cSld>
+    <p:spTree>
+      <p:nvGrpSpPr>
+        <p:cNvPr id="1" name=""/>
+        <p:cNvGrpSpPr/>
+        <p:nvPr/>
+      </p:nvGrpSpPr>
+      <p:grpSpPr>
+        <a:xfrm>
+          <a:off x="0" y="0"/>
+          <a:ext cx="0" cy="0"/>
+          <a:chOff x="0" y="0"/>
+          <a:chExt cx="0" cy="0"/>
+        </a:xfrm>
+      </p:grpSpPr>
+      <p:sp>
+        <p:nvSpPr>
+          <p:cNvPr id="2" name="Title 1"/>
+          <p:cNvSpPr>
+            <a:spLocks noGrp="1"/>
+          </p:cNvSpPr>
+          <p:nvPr>
+            <p:ph type="title"/>
+          </p:nvPr>
+        </p:nvSpPr>
+        <p:spPr/>
+        <p:txBody>
+          <a:bodyPr/>
+          <a:lstStyle/>
+          <a:p>
+            <a:r>
+              <a:rPr lang="en-US" dirty="0" smtClean="0"/>
+              <a:t>Bibliography</a:t>
+            </a:r>
+            <a:endParaRPr lang="en-US" dirty="0"/>
+          </a:p>
+        </p:txBody>
+      </p:sp>
+      <p:sp>
+        <p:nvSpPr>
+          <p:cNvPr id="3" name="Content Placeholder 2"/>
+          <p:cNvSpPr>
+            <a:spLocks noGrp="1"/>
+          </p:cNvSpPr>
+          <p:nvPr>
+            <p:ph idx="1"/>
+          </p:nvPr>
+        </p:nvSpPr>
+        <p:spPr/>
+        <p:txBody>
+          <a:bodyPr>
+            <a:normAutofit lnSpcReduction="10000"/>
+          </a:bodyPr>
+          <a:lstStyle/>
+          <a:p>
+            <a:pPr marL="0" indent="0" algn="ctr">
+              <a:buNone/>
+            </a:pPr>
+            <a:r>
+              <a:rPr lang="en-US" b="1" dirty="0" smtClean="0"/>
+              <a:t>The Processing Site:</a:t>
+            </a:r>
+          </a:p>
+          <a:p>
+            <a:r>
+              <a:rPr lang="en-US" dirty="0"/>
+              <a:t>Opening Page </a:t>
+            </a:r>
+            <a:r>
+              <a:rPr lang="en-US" dirty="0">
+                <a:hlinkClick r:id="rId2"/>
+              </a:rPr>
+              <a:t>https://</a:t>
+            </a:r>
+            <a:r>
+              <a:rPr lang="en-US" dirty="0" smtClean="0">
+                <a:hlinkClick r:id="rId2"/>
+              </a:rPr>
+              <a:t>processing.org</a:t>
+            </a:r>
+            <a:endParaRPr lang="en-US" dirty="0" smtClean="0"/>
+          </a:p>
+          <a:p>
+            <a:r>
+              <a:rPr lang="en-US" dirty="0"/>
+              <a:t>Tutorials </a:t>
+            </a:r>
+            <a:r>
+              <a:rPr lang="en-US" dirty="0">
+                <a:hlinkClick r:id="rId3"/>
+              </a:rPr>
+              <a:t>https://processing.org/tutorials</a:t>
+            </a:r>
+            <a:r>
+              <a:rPr lang="en-US" dirty="0" smtClean="0">
+                <a:hlinkClick r:id="rId3"/>
+              </a:rPr>
+              <a:t>/</a:t>
+            </a:r>
+            <a:r>
+              <a:rPr lang="en-US" dirty="0" smtClean="0"/>
+              <a:t> </a:t>
+            </a:r>
+          </a:p>
+          <a:p>
+            <a:r>
+              <a:rPr lang="en-US" dirty="0"/>
+              <a:t>Examples </a:t>
+            </a:r>
+            <a:r>
+              <a:rPr lang="en-US" dirty="0">
+                <a:hlinkClick r:id="rId4"/>
+              </a:rPr>
+              <a:t>https://processing.org/examples</a:t>
+            </a:r>
+            <a:r>
+              <a:rPr lang="en-US" dirty="0" smtClean="0">
+                <a:hlinkClick r:id="rId4"/>
+              </a:rPr>
+              <a:t>/</a:t>
+            </a:r>
+            <a:r>
+              <a:rPr lang="en-US" dirty="0" smtClean="0"/>
+              <a:t> or … </a:t>
+            </a:r>
+            <a:r>
+              <a:rPr lang="en-US" i="1" dirty="0" smtClean="0"/>
+              <a:t>open </a:t>
+            </a:r>
+            <a:r>
+              <a:rPr lang="en-US" i="1" dirty="0"/>
+              <a:t>Processing and </a:t>
+            </a:r>
+            <a:r>
+              <a:rPr lang="en-US" i="1" dirty="0" err="1"/>
+              <a:t>naviage</a:t>
+            </a:r>
+            <a:r>
+              <a:rPr lang="en-US" i="1" dirty="0"/>
+              <a:t> to FILE / </a:t>
+            </a:r>
+            <a:r>
+              <a:rPr lang="en-US" i="1" dirty="0" smtClean="0"/>
+              <a:t>EXAMPLES.</a:t>
+            </a:r>
+          </a:p>
+          <a:p>
+            <a:r>
+              <a:rPr lang="en-US" dirty="0"/>
+              <a:t>Exhibition</a:t>
+            </a:r>
+            <a:r>
+              <a:rPr lang="en-US" i="1" dirty="0"/>
+              <a:t> </a:t>
+            </a:r>
+            <a:r>
+              <a:rPr lang="en-US" i="1" dirty="0">
+                <a:hlinkClick r:id="rId5"/>
+              </a:rPr>
+              <a:t>https://processing.org/exhibition</a:t>
+            </a:r>
+            <a:r>
+              <a:rPr lang="en-US" i="1" dirty="0" smtClean="0">
+                <a:hlinkClick r:id="rId5"/>
+              </a:rPr>
+              <a:t>/</a:t>
+            </a:r>
+            <a:r>
+              <a:rPr lang="en-US" i="1" dirty="0" smtClean="0"/>
+              <a:t> </a:t>
+            </a:r>
+            <a:endParaRPr lang="en-US" i="1" dirty="0"/>
+          </a:p>
+        </p:txBody>
+      </p:sp>
+    </p:spTree>
+    <p:extLst>
+      <p:ext uri="{BB962C8B-B14F-4D97-AF65-F5344CB8AC3E}">
+        <p14:creationId xmlns:p14="http://schemas.microsoft.com/office/powerpoint/2010/main" val="325812743"/>
+      </p:ext>
+    </p:extLst>
+  </p:cSld>
+  <p:clrMapOvr>
+    <a:masterClrMapping/>
+  </p:clrMapOvr>
+</p:sld>
+</file>
+
+<file path=ppt/slides/slide19.xml><?xml version="1.0" encoding="utf-8"?>
+<p:sld xmlns:a="http://schemas.openxmlformats.org/drawingml/2006/main" xmlns:r="http://schemas.openxmlformats.org/officeDocument/2006/relationships" xmlns:p="http://schemas.openxmlformats.org/presentationml/2006/main">
+  <p:cSld>
+    <p:spTree>
+      <p:nvGrpSpPr>
+        <p:cNvPr id="1" name=""/>
+        <p:cNvGrpSpPr/>
+        <p:nvPr/>
+      </p:nvGrpSpPr>
+      <p:grpSpPr>
+        <a:xfrm>
+          <a:off x="0" y="0"/>
+          <a:ext cx="0" cy="0"/>
+          <a:chOff x="0" y="0"/>
+          <a:chExt cx="0" cy="0"/>
+        </a:xfrm>
+      </p:grpSpPr>
+      <p:sp>
+        <p:nvSpPr>
+          <p:cNvPr id="2" name="Title 1"/>
+          <p:cNvSpPr>
+            <a:spLocks noGrp="1"/>
+          </p:cNvSpPr>
+          <p:nvPr>
+            <p:ph type="title"/>
+          </p:nvPr>
+        </p:nvSpPr>
+        <p:spPr/>
+        <p:txBody>
+          <a:bodyPr/>
+          <a:lstStyle/>
+          <a:p>
+            <a:r>
+              <a:rPr lang="en-US" dirty="0" smtClean="0"/>
+              <a:t>Bibliography</a:t>
+            </a:r>
+            <a:endParaRPr lang="en-US" dirty="0"/>
+          </a:p>
+        </p:txBody>
+      </p:sp>
+      <p:sp>
+        <p:nvSpPr>
+          <p:cNvPr id="3" name="Content Placeholder 2"/>
+          <p:cNvSpPr>
+            <a:spLocks noGrp="1"/>
+          </p:cNvSpPr>
+          <p:nvPr>
+            <p:ph idx="1"/>
+          </p:nvPr>
+        </p:nvSpPr>
+        <p:spPr/>
+        <p:txBody>
+          <a:bodyPr>
+            <a:normAutofit lnSpcReduction="10000"/>
+          </a:bodyPr>
+          <a:lstStyle/>
+          <a:p>
+            <a:pPr marL="0" indent="0" algn="ctr">
+              <a:buNone/>
+            </a:pPr>
+            <a:r>
+              <a:rPr lang="en-US" b="1" dirty="0" smtClean="0"/>
+              <a:t>Exhibitions and Inspiration</a:t>
+            </a:r>
+          </a:p>
+          <a:p>
+            <a:r>
+              <a:rPr lang="en-US" dirty="0" err="1" smtClean="0"/>
+              <a:t>OpenProcessing</a:t>
+            </a:r>
+            <a:r>
+              <a:rPr lang="en-US" dirty="0"/>
+              <a:t> </a:t>
+            </a:r>
+            <a:r>
+              <a:rPr lang="en-US" dirty="0">
+                <a:hlinkClick r:id="rId2"/>
+              </a:rPr>
+              <a:t>http://</a:t>
+            </a:r>
+            <a:r>
+              <a:rPr lang="en-US" dirty="0" smtClean="0">
+                <a:hlinkClick r:id="rId2"/>
+              </a:rPr>
+              <a:t>www.openprocessing.org</a:t>
+            </a:r>
+            <a:r>
+              <a:rPr lang="en-US" dirty="0" smtClean="0"/>
+              <a:t> </a:t>
+            </a:r>
+          </a:p>
+          <a:p>
+            <a:r>
+              <a:rPr lang="en-US" dirty="0" err="1" smtClean="0"/>
+              <a:t>OpenProcessing</a:t>
+            </a:r>
+            <a:r>
+              <a:rPr lang="en-US" dirty="0" smtClean="0"/>
+              <a:t> </a:t>
+            </a:r>
+            <a:r>
+              <a:rPr lang="en-US" dirty="0"/>
+              <a:t>Data Visualizations </a:t>
+            </a:r>
+            <a:r>
+              <a:rPr lang="en-US" dirty="0">
+                <a:hlinkClick r:id="rId3"/>
+              </a:rPr>
+              <a:t>http://www.openprocessing.org/collection/</a:t>
+            </a:r>
+            <a:r>
+              <a:rPr lang="en-US" dirty="0" smtClean="0">
+                <a:hlinkClick r:id="rId3"/>
+              </a:rPr>
+              <a:t>1122</a:t>
+            </a:r>
+            <a:r>
+              <a:rPr lang="en-US" dirty="0" smtClean="0"/>
+              <a:t> </a:t>
+            </a:r>
+          </a:p>
+          <a:p>
+            <a:r>
+              <a:rPr lang="en-US" dirty="0" smtClean="0"/>
+              <a:t>Ben Fry’s </a:t>
+            </a:r>
+            <a:r>
+              <a:rPr lang="en-US" dirty="0"/>
+              <a:t>Project Page </a:t>
+            </a:r>
+            <a:r>
+              <a:rPr lang="en-US" dirty="0">
+                <a:hlinkClick r:id="rId4"/>
+              </a:rPr>
+              <a:t>http://benfry.com/projects</a:t>
+            </a:r>
+            <a:r>
+              <a:rPr lang="en-US" dirty="0" smtClean="0">
+                <a:hlinkClick r:id="rId4"/>
+              </a:rPr>
+              <a:t>/</a:t>
+            </a:r>
+            <a:r>
+              <a:rPr lang="en-US" dirty="0" smtClean="0"/>
+              <a:t> </a:t>
+            </a:r>
+          </a:p>
+          <a:p>
+            <a:endParaRPr lang="en-US" i="1" dirty="0"/>
+          </a:p>
+        </p:txBody>
+      </p:sp>
+    </p:spTree>
+    <p:extLst>
+      <p:ext uri="{BB962C8B-B14F-4D97-AF65-F5344CB8AC3E}">
+        <p14:creationId xmlns:p14="http://schemas.microsoft.com/office/powerpoint/2010/main" val="168351568"/>
       </p:ext>
     </p:extLst>
   </p:cSld>
@@ -5218,7 +6881,7 @@
           <a:p>
             <a:r>
               <a:rPr lang="en-US" dirty="0" smtClean="0"/>
-              <a:t>Resources</a:t>
+              <a:t>Pointillism … </a:t>
             </a:r>
             <a:endParaRPr lang="en-US" dirty="0"/>
           </a:p>
@@ -5226,108 +6889,86 @@
       </p:sp>
       <p:sp>
         <p:nvSpPr>
-          <p:cNvPr id="3" name="Content Placeholder 2"/>
-          <p:cNvSpPr>
-            <a:spLocks noGrp="1"/>
-          </p:cNvSpPr>
-          <p:nvPr>
-            <p:ph idx="1"/>
-          </p:nvPr>
-        </p:nvSpPr>
-        <p:spPr/>
-        <p:txBody>
-          <a:bodyPr>
-            <a:normAutofit fontScale="92500" lnSpcReduction="20000"/>
+          <p:cNvPr id="11" name="TextBox 10"/>
+          <p:cNvSpPr txBox="1"/>
+          <p:nvPr/>
+        </p:nvSpPr>
+        <p:spPr>
+          <a:xfrm>
+            <a:off x="688077" y="6113640"/>
+            <a:ext cx="7805384" cy="369332"/>
+          </a:xfrm>
+          <a:prstGeom prst="rect">
+            <a:avLst/>
+          </a:prstGeom>
+          <a:noFill/>
+        </p:spPr>
+        <p:txBody>
+          <a:bodyPr wrap="square" rtlCol="0">
+            <a:spAutoFit/>
           </a:bodyPr>
           <a:lstStyle/>
           <a:p>
             <a:r>
-              <a:rPr lang="en-US" dirty="0" smtClean="0"/>
-              <a:t>The Processing website has lots of information:</a:t>
-            </a:r>
-          </a:p>
-          <a:p>
-            <a:pPr lvl="1"/>
-            <a:r>
               <a:rPr lang="en-US" i="1" dirty="0" smtClean="0"/>
-              <a:t>Tutorials</a:t>
-            </a:r>
-          </a:p>
-          <a:p>
-            <a:pPr lvl="1"/>
-            <a:r>
-              <a:rPr lang="en-US" i="1" dirty="0" smtClean="0"/>
-              <a:t>Examples</a:t>
-            </a:r>
-          </a:p>
-          <a:p>
-            <a:pPr lvl="1"/>
-            <a:r>
-              <a:rPr lang="en-US" i="1" dirty="0" smtClean="0"/>
-              <a:t>Exhibits</a:t>
-            </a:r>
-          </a:p>
-          <a:p>
-            <a:r>
-              <a:rPr lang="en-US" dirty="0"/>
-              <a:t>See </a:t>
-            </a:r>
-            <a:r>
-              <a:rPr lang="en-US" dirty="0">
+              <a:t>Paul Signac: </a:t>
+            </a:r>
+            <a:r>
+              <a:rPr lang="en-US" i="1" dirty="0" smtClean="0">
                 <a:hlinkClick r:id="rId2"/>
               </a:rPr>
-              <a:t>https://</a:t>
-            </a:r>
-            <a:r>
-              <a:rPr lang="en-US" dirty="0" smtClean="0">
+              <a:t>The </a:t>
+            </a:r>
+            <a:r>
+              <a:rPr lang="en-US" i="1" dirty="0">
                 <a:hlinkClick r:id="rId2"/>
               </a:rPr>
-              <a:t>processing.org</a:t>
-            </a:r>
-            <a:r>
-              <a:rPr lang="en-US" dirty="0" smtClean="0"/>
-              <a:t> </a:t>
-            </a:r>
-          </a:p>
-          <a:p>
-            <a:r>
-              <a:rPr lang="en-US" dirty="0" smtClean="0"/>
-              <a:t>There are also many good books and sites on the subject!</a:t>
-            </a:r>
-          </a:p>
-          <a:p>
-            <a:r>
-              <a:rPr lang="en-US" dirty="0" smtClean="0"/>
-              <a:t>You can also share your work on sites like </a:t>
+              <a:t>Papal Palace, Avignon</a:t>
             </a:r>
             <a:r>
               <a:rPr lang="en-US" dirty="0"/>
-              <a:t>Open Processing: </a:t>
-            </a:r>
-            <a:r>
-              <a:rPr lang="en-US" dirty="0">
-                <a:hlinkClick r:id="rId3"/>
-              </a:rPr>
-              <a:t>http://</a:t>
-            </a:r>
-            <a:r>
-              <a:rPr lang="en-US" dirty="0" smtClean="0">
-                <a:hlinkClick r:id="rId3"/>
-              </a:rPr>
-              <a:t>www.openprocessing.org</a:t>
-            </a:r>
-            <a:r>
-              <a:rPr lang="en-US" smtClean="0"/>
-              <a:t> </a:t>
-            </a:r>
-            <a:endParaRPr lang="en-US" dirty="0"/>
-          </a:p>
-        </p:txBody>
-      </p:sp>
+              <a:t>, oil on canvas, 1909, </a:t>
+            </a:r>
+            <a:r>
+              <a:rPr lang="en-US" dirty="0" err="1"/>
+              <a:t>Musée</a:t>
+            </a:r>
+            <a:r>
+              <a:rPr lang="en-US" dirty="0"/>
+              <a:t> d'Orsay, Paris</a:t>
+            </a:r>
+          </a:p>
+        </p:txBody>
+      </p:sp>
+      <p:pic>
+        <p:nvPicPr>
+          <p:cNvPr id="13" name="Content Placeholder 12" descr="signac_papalPalace.jpg"/>
+          <p:cNvPicPr>
+            <a:picLocks noGrp="1" noChangeAspect="1"/>
+          </p:cNvPicPr>
+          <p:nvPr>
+            <p:ph idx="1"/>
+          </p:nvPr>
+        </p:nvPicPr>
+        <p:blipFill>
+          <a:blip r:embed="rId3">
+            <a:extLst>
+              <a:ext uri="{28A0092B-C50C-407E-A947-70E740481C1C}">
+                <a14:useLocalDpi xmlns:a14="http://schemas.microsoft.com/office/drawing/2010/main" val="0"/>
+              </a:ext>
+            </a:extLst>
+          </a:blip>
+          <a:srcRect t="13707" b="13707"/>
+          <a:stretch>
+            <a:fillRect/>
+          </a:stretch>
+        </p:blipFill>
+        <p:spPr/>
+      </p:pic>
     </p:spTree>
     <p:extLst>
       <p:ext uri="{BB962C8B-B14F-4D97-AF65-F5344CB8AC3E}">
-        <p14:creationId xmlns:p14="http://schemas.microsoft.com/office/powerpoint/2010/main" val="1217273505"/>
+        <p14:creationId xmlns:p14="http://schemas.microsoft.com/office/powerpoint/2010/main" val="3490467120"/>
       </p:ext>
     </p:extLst>
   </p:cSld>
@@ -5371,49 +7012,1157 @@
           <a:p>
             <a:r>
               <a:rPr lang="en-US" dirty="0" smtClean="0"/>
-              <a:t>Let’s </a:t>
-            </a:r>
-            <a:r>
-              <a:rPr lang="en-US" smtClean="0"/>
-              <a:t>Get Started!</a:t>
-            </a:r>
-            <a:endParaRPr lang="en-US"/>
-          </a:p>
-        </p:txBody>
-      </p:sp>
-      <p:sp>
-        <p:nvSpPr>
-          <p:cNvPr id="3" name="Content Placeholder 2"/>
-          <p:cNvSpPr>
-            <a:spLocks noGrp="1"/>
-          </p:cNvSpPr>
+              <a:t>… and pixels</a:t>
+            </a:r>
+            <a:endParaRPr lang="en-US" dirty="0"/>
+          </a:p>
+        </p:txBody>
+      </p:sp>
+      <p:pic>
+        <p:nvPicPr>
+          <p:cNvPr id="4" name="Content Placeholder 3" descr="signac_papalPalace_pixels.jpg"/>
+          <p:cNvPicPr>
+            <a:picLocks noGrp="1" noChangeAspect="1"/>
+          </p:cNvPicPr>
           <p:nvPr>
             <p:ph idx="1"/>
           </p:nvPr>
-        </p:nvSpPr>
+        </p:nvPicPr>
+        <p:blipFill>
+          <a:blip r:embed="rId2">
+            <a:extLst>
+              <a:ext uri="{28A0092B-C50C-407E-A947-70E740481C1C}">
+                <a14:useLocalDpi xmlns:a14="http://schemas.microsoft.com/office/drawing/2010/main" val="0"/>
+              </a:ext>
+            </a:extLst>
+          </a:blip>
+          <a:srcRect l="494" r="494"/>
+          <a:stretch>
+            <a:fillRect/>
+          </a:stretch>
+        </p:blipFill>
         <p:spPr/>
-        <p:txBody>
-          <a:bodyPr/>
+      </p:pic>
+      <p:sp>
+        <p:nvSpPr>
+          <p:cNvPr id="5" name="TextBox 4"/>
+          <p:cNvSpPr txBox="1"/>
+          <p:nvPr/>
+        </p:nvSpPr>
+        <p:spPr>
+          <a:xfrm>
+            <a:off x="688077" y="6113640"/>
+            <a:ext cx="7805384" cy="646331"/>
+          </a:xfrm>
+          <a:prstGeom prst="rect">
+            <a:avLst/>
+          </a:prstGeom>
+          <a:noFill/>
+        </p:spPr>
+        <p:txBody>
+          <a:bodyPr wrap="square" rtlCol="0">
+            <a:spAutoFit/>
+          </a:bodyPr>
           <a:lstStyle/>
           <a:p>
-            <a:r>
-              <a:rPr lang="en-US" dirty="0" smtClean="0"/>
-              <a:t>Drawing </a:t>
-            </a:r>
-            <a:r>
-              <a:rPr lang="en-US" smtClean="0"/>
-              <a:t>a line:</a:t>
-            </a:r>
-          </a:p>
-          <a:p>
-            <a:endParaRPr lang="en-US"/>
+            <a:pPr algn="ctr"/>
+            <a:r>
+              <a:rPr lang="en-US" i="1" dirty="0" smtClean="0"/>
+              <a:t>Detail at 800%: Paul Signac: </a:t>
+            </a:r>
+            <a:r>
+              <a:rPr lang="en-US" i="1" dirty="0" smtClean="0">
+                <a:hlinkClick r:id="rId3"/>
+              </a:rPr>
+              <a:t>The </a:t>
+            </a:r>
+            <a:r>
+              <a:rPr lang="en-US" i="1" dirty="0">
+                <a:hlinkClick r:id="rId3"/>
+              </a:rPr>
+              <a:t>Papal Palace, Avignon</a:t>
+            </a:r>
+            <a:r>
+              <a:rPr lang="en-US" dirty="0"/>
+              <a:t>, oil on canvas, 1909, </a:t>
+            </a:r>
+            <a:r>
+              <a:rPr lang="en-US" dirty="0" err="1"/>
+              <a:t>Musée</a:t>
+            </a:r>
+            <a:r>
+              <a:rPr lang="en-US" dirty="0"/>
+              <a:t> d'Orsay, Paris</a:t>
+            </a:r>
           </a:p>
         </p:txBody>
       </p:sp>
     </p:spTree>
     <p:extLst>
       <p:ext uri="{BB962C8B-B14F-4D97-AF65-F5344CB8AC3E}">
-        <p14:creationId xmlns:p14="http://schemas.microsoft.com/office/powerpoint/2010/main" val="3581965342"/>
+        <p14:creationId xmlns:p14="http://schemas.microsoft.com/office/powerpoint/2010/main" val="3876705392"/>
+      </p:ext>
+    </p:extLst>
+  </p:cSld>
+  <p:clrMapOvr>
+    <a:masterClrMapping/>
+  </p:clrMapOvr>
+</p:sld>
+</file>
+
+<file path=ppt/slides/slide5.xml><?xml version="1.0" encoding="utf-8"?>
+<p:sld xmlns:a="http://schemas.openxmlformats.org/drawingml/2006/main" xmlns:r="http://schemas.openxmlformats.org/officeDocument/2006/relationships" xmlns:p="http://schemas.openxmlformats.org/presentationml/2006/main">
+  <p:cSld>
+    <p:spTree>
+      <p:nvGrpSpPr>
+        <p:cNvPr id="1" name=""/>
+        <p:cNvGrpSpPr/>
+        <p:nvPr/>
+      </p:nvGrpSpPr>
+      <p:grpSpPr>
+        <a:xfrm>
+          <a:off x="0" y="0"/>
+          <a:ext cx="0" cy="0"/>
+          <a:chOff x="0" y="0"/>
+          <a:chExt cx="0" cy="0"/>
+        </a:xfrm>
+      </p:grpSpPr>
+      <p:sp>
+        <p:nvSpPr>
+          <p:cNvPr id="2" name="Title 1"/>
+          <p:cNvSpPr>
+            <a:spLocks noGrp="1"/>
+          </p:cNvSpPr>
+          <p:nvPr>
+            <p:ph type="title"/>
+          </p:nvPr>
+        </p:nvSpPr>
+        <p:spPr/>
+        <p:txBody>
+          <a:bodyPr/>
+          <a:lstStyle/>
+          <a:p>
+            <a:r>
+              <a:rPr lang="en-US" dirty="0" smtClean="0"/>
+              <a:t>The Grid</a:t>
+            </a:r>
+            <a:endParaRPr lang="en-US" dirty="0"/>
+          </a:p>
+        </p:txBody>
+      </p:sp>
+      <p:sp>
+        <p:nvSpPr>
+          <p:cNvPr id="3" name="Content Placeholder 2"/>
+          <p:cNvSpPr>
+            <a:spLocks noGrp="1"/>
+          </p:cNvSpPr>
+          <p:nvPr>
+            <p:ph idx="1"/>
+          </p:nvPr>
+        </p:nvSpPr>
+        <p:spPr>
+          <a:xfrm>
+            <a:off x="792162" y="1761565"/>
+            <a:ext cx="7570787" cy="4713844"/>
+          </a:xfrm>
+        </p:spPr>
+        <p:txBody>
+          <a:bodyPr/>
+          <a:lstStyle/>
+          <a:p>
+            <a:r>
+              <a:rPr lang="en-US" dirty="0" smtClean="0"/>
+              <a:t>Every pixel has an x-coordinate, a y-coordinate and a color.</a:t>
+            </a:r>
+          </a:p>
+          <a:p>
+            <a:endParaRPr lang="en-US" dirty="0" smtClean="0"/>
+          </a:p>
+          <a:p>
+            <a:endParaRPr lang="en-US" dirty="0"/>
+          </a:p>
+        </p:txBody>
+      </p:sp>
+      <p:cxnSp>
+        <p:nvCxnSpPr>
+          <p:cNvPr id="9" name="Straight Connector 8"/>
+          <p:cNvCxnSpPr/>
+          <p:nvPr/>
+        </p:nvCxnSpPr>
+        <p:spPr>
+          <a:xfrm flipV="1">
+            <a:off x="4400550" y="4057650"/>
+            <a:ext cx="2781419" cy="19624"/>
+          </a:xfrm>
+          <a:prstGeom prst="line">
+            <a:avLst/>
+          </a:prstGeom>
+        </p:spPr>
+        <p:style>
+          <a:lnRef idx="2">
+            <a:schemeClr val="accent1"/>
+          </a:lnRef>
+          <a:fillRef idx="0">
+            <a:schemeClr val="accent1"/>
+          </a:fillRef>
+          <a:effectRef idx="1">
+            <a:schemeClr val="accent1"/>
+          </a:effectRef>
+          <a:fontRef idx="minor">
+            <a:schemeClr val="tx1"/>
+          </a:fontRef>
+        </p:style>
+      </p:cxnSp>
+      <p:cxnSp>
+        <p:nvCxnSpPr>
+          <p:cNvPr id="10" name="Straight Connector 9"/>
+          <p:cNvCxnSpPr/>
+          <p:nvPr/>
+        </p:nvCxnSpPr>
+        <p:spPr>
+          <a:xfrm>
+            <a:off x="4400550" y="4057650"/>
+            <a:ext cx="0" cy="1993526"/>
+          </a:xfrm>
+          <a:prstGeom prst="line">
+            <a:avLst/>
+          </a:prstGeom>
+        </p:spPr>
+        <p:style>
+          <a:lnRef idx="2">
+            <a:schemeClr val="accent1"/>
+          </a:lnRef>
+          <a:fillRef idx="0">
+            <a:schemeClr val="accent1"/>
+          </a:fillRef>
+          <a:effectRef idx="1">
+            <a:schemeClr val="accent1"/>
+          </a:effectRef>
+          <a:fontRef idx="minor">
+            <a:schemeClr val="tx1"/>
+          </a:fontRef>
+        </p:style>
+      </p:cxnSp>
+      <p:sp>
+        <p:nvSpPr>
+          <p:cNvPr id="11" name="Text Box 3"/>
+          <p:cNvSpPr txBox="1"/>
+          <p:nvPr/>
+        </p:nvSpPr>
+        <p:spPr>
+          <a:xfrm>
+            <a:off x="3771900" y="3734374"/>
+            <a:ext cx="571500" cy="342900"/>
+          </a:xfrm>
+          <a:prstGeom prst="rect">
+            <a:avLst/>
+          </a:prstGeom>
+          <a:noFill/>
+          <a:ln>
+            <a:noFill/>
+          </a:ln>
+          <a:effectLst/>
+          <a:extLst>
+            <a:ext uri="{C572A759-6A51-4108-AA02-DFA0A04FC94B}">
+              <ma14:wrappingTextBoxFlag xmlns:ma14="http://schemas.microsoft.com/office/mac/drawingml/2011/main"/>
+            </a:ext>
+          </a:extLst>
+        </p:spPr>
+        <p:style>
+          <a:lnRef idx="0">
+            <a:schemeClr val="accent1"/>
+          </a:lnRef>
+          <a:fillRef idx="0">
+            <a:schemeClr val="accent1"/>
+          </a:fillRef>
+          <a:effectRef idx="0">
+            <a:schemeClr val="accent1"/>
+          </a:effectRef>
+          <a:fontRef idx="minor">
+            <a:schemeClr val="dk1"/>
+          </a:fontRef>
+        </p:style>
+        <p:txBody>
+          <a:bodyPr rot="0" spcFirstLastPara="0" vert="horz" wrap="square" lIns="91440" tIns="45720" rIns="91440" bIns="45720" numCol="1" spcCol="0" rtlCol="0" fromWordArt="0" anchor="t" anchorCtr="0" forceAA="0" compatLnSpc="1">
+            <a:prstTxWarp prst="textNoShape">
+              <a:avLst/>
+            </a:prstTxWarp>
+            <a:noAutofit/>
+          </a:bodyPr>
+          <a:lstStyle/>
+          <a:p>
+            <a:pPr marL="0" marR="0">
+              <a:spcBef>
+                <a:spcPts val="0"/>
+              </a:spcBef>
+              <a:spcAft>
+                <a:spcPts val="0"/>
+              </a:spcAft>
+            </a:pPr>
+            <a:r>
+              <a:rPr lang="en-US" sz="1200" dirty="0">
+                <a:effectLst/>
+                <a:ea typeface="ＭＳ 明朝"/>
+                <a:cs typeface="Times New Roman"/>
+              </a:rPr>
+              <a:t>(0,0)</a:t>
+            </a:r>
+          </a:p>
+        </p:txBody>
+      </p:sp>
+      <p:cxnSp>
+        <p:nvCxnSpPr>
+          <p:cNvPr id="12" name="Straight Arrow Connector 11"/>
+          <p:cNvCxnSpPr/>
+          <p:nvPr/>
+        </p:nvCxnSpPr>
+        <p:spPr>
+          <a:xfrm>
+            <a:off x="5378562" y="3829150"/>
+            <a:ext cx="1257300" cy="0"/>
+          </a:xfrm>
+          <a:prstGeom prst="straightConnector1">
+            <a:avLst/>
+          </a:prstGeom>
+          <a:ln>
+            <a:headEnd type="arrow"/>
+            <a:tailEnd type="arrow"/>
+          </a:ln>
+        </p:spPr>
+        <p:style>
+          <a:lnRef idx="2">
+            <a:schemeClr val="accent1"/>
+          </a:lnRef>
+          <a:fillRef idx="0">
+            <a:schemeClr val="accent1"/>
+          </a:fillRef>
+          <a:effectRef idx="1">
+            <a:schemeClr val="accent1"/>
+          </a:effectRef>
+          <a:fontRef idx="minor">
+            <a:schemeClr val="tx1"/>
+          </a:fontRef>
+        </p:style>
+      </p:cxnSp>
+      <p:cxnSp>
+        <p:nvCxnSpPr>
+          <p:cNvPr id="13" name="Straight Arrow Connector 12"/>
+          <p:cNvCxnSpPr/>
+          <p:nvPr/>
+        </p:nvCxnSpPr>
+        <p:spPr>
+          <a:xfrm>
+            <a:off x="4057650" y="4828896"/>
+            <a:ext cx="0" cy="914400"/>
+          </a:xfrm>
+          <a:prstGeom prst="straightConnector1">
+            <a:avLst/>
+          </a:prstGeom>
+          <a:ln>
+            <a:headEnd type="arrow"/>
+            <a:tailEnd type="arrow"/>
+          </a:ln>
+        </p:spPr>
+        <p:style>
+          <a:lnRef idx="2">
+            <a:schemeClr val="accent1"/>
+          </a:lnRef>
+          <a:fillRef idx="0">
+            <a:schemeClr val="accent1"/>
+          </a:fillRef>
+          <a:effectRef idx="1">
+            <a:schemeClr val="accent1"/>
+          </a:effectRef>
+          <a:fontRef idx="minor">
+            <a:schemeClr val="tx1"/>
+          </a:fontRef>
+        </p:style>
+      </p:cxnSp>
+      <p:sp>
+        <p:nvSpPr>
+          <p:cNvPr id="14" name="Text Box 7"/>
+          <p:cNvSpPr txBox="1"/>
+          <p:nvPr/>
+        </p:nvSpPr>
+        <p:spPr>
+          <a:xfrm>
+            <a:off x="5835762" y="3382907"/>
+            <a:ext cx="571500" cy="342900"/>
+          </a:xfrm>
+          <a:prstGeom prst="rect">
+            <a:avLst/>
+          </a:prstGeom>
+          <a:noFill/>
+          <a:ln>
+            <a:noFill/>
+          </a:ln>
+          <a:effectLst/>
+          <a:extLst>
+            <a:ext uri="{C572A759-6A51-4108-AA02-DFA0A04FC94B}">
+              <ma14:wrappingTextBoxFlag xmlns:ma14="http://schemas.microsoft.com/office/mac/drawingml/2011/main"/>
+            </a:ext>
+          </a:extLst>
+        </p:spPr>
+        <p:style>
+          <a:lnRef idx="0">
+            <a:schemeClr val="accent1"/>
+          </a:lnRef>
+          <a:fillRef idx="0">
+            <a:schemeClr val="accent1"/>
+          </a:fillRef>
+          <a:effectRef idx="0">
+            <a:schemeClr val="accent1"/>
+          </a:effectRef>
+          <a:fontRef idx="minor">
+            <a:schemeClr val="dk1"/>
+          </a:fontRef>
+        </p:style>
+        <p:txBody>
+          <a:bodyPr rot="0" spcFirstLastPara="0" vert="horz" wrap="square" lIns="91440" tIns="45720" rIns="91440" bIns="45720" numCol="1" spcCol="0" rtlCol="0" fromWordArt="0" anchor="t" anchorCtr="0" forceAA="0" compatLnSpc="1">
+            <a:prstTxWarp prst="textNoShape">
+              <a:avLst/>
+            </a:prstTxWarp>
+            <a:noAutofit/>
+          </a:bodyPr>
+          <a:lstStyle/>
+          <a:p>
+            <a:pPr marL="0" marR="0">
+              <a:spcBef>
+                <a:spcPts val="0"/>
+              </a:spcBef>
+              <a:spcAft>
+                <a:spcPts val="0"/>
+              </a:spcAft>
+            </a:pPr>
+            <a:r>
+              <a:rPr lang="en-US" sz="1200" i="1" dirty="0">
+                <a:effectLst/>
+                <a:ea typeface="ＭＳ 明朝"/>
+                <a:cs typeface="Times New Roman"/>
+              </a:rPr>
+              <a:t>x-axis</a:t>
+            </a:r>
+            <a:endParaRPr lang="en-US" sz="1200" dirty="0">
+              <a:effectLst/>
+              <a:ea typeface="ＭＳ 明朝"/>
+              <a:cs typeface="Times New Roman"/>
+            </a:endParaRPr>
+          </a:p>
+        </p:txBody>
+      </p:sp>
+      <p:sp>
+        <p:nvSpPr>
+          <p:cNvPr id="15" name="Text Box 9"/>
+          <p:cNvSpPr txBox="1"/>
+          <p:nvPr/>
+        </p:nvSpPr>
+        <p:spPr>
+          <a:xfrm>
+            <a:off x="3200400" y="5114646"/>
+            <a:ext cx="571500" cy="342900"/>
+          </a:xfrm>
+          <a:prstGeom prst="rect">
+            <a:avLst/>
+          </a:prstGeom>
+          <a:noFill/>
+          <a:ln>
+            <a:noFill/>
+          </a:ln>
+          <a:effectLst/>
+          <a:extLst>
+            <a:ext uri="{C572A759-6A51-4108-AA02-DFA0A04FC94B}">
+              <ma14:wrappingTextBoxFlag xmlns:ma14="http://schemas.microsoft.com/office/mac/drawingml/2011/main"/>
+            </a:ext>
+          </a:extLst>
+        </p:spPr>
+        <p:style>
+          <a:lnRef idx="0">
+            <a:schemeClr val="accent1"/>
+          </a:lnRef>
+          <a:fillRef idx="0">
+            <a:schemeClr val="accent1"/>
+          </a:fillRef>
+          <a:effectRef idx="0">
+            <a:schemeClr val="accent1"/>
+          </a:effectRef>
+          <a:fontRef idx="minor">
+            <a:schemeClr val="dk1"/>
+          </a:fontRef>
+        </p:style>
+        <p:txBody>
+          <a:bodyPr rot="0" spcFirstLastPara="0" vert="horz" wrap="square" lIns="91440" tIns="45720" rIns="91440" bIns="45720" numCol="1" spcCol="0" rtlCol="0" fromWordArt="0" anchor="t" anchorCtr="0" forceAA="0" compatLnSpc="1">
+            <a:prstTxWarp prst="textNoShape">
+              <a:avLst/>
+            </a:prstTxWarp>
+            <a:noAutofit/>
+          </a:bodyPr>
+          <a:lstStyle/>
+          <a:p>
+            <a:pPr marL="0" marR="0">
+              <a:spcBef>
+                <a:spcPts val="0"/>
+              </a:spcBef>
+              <a:spcAft>
+                <a:spcPts val="0"/>
+              </a:spcAft>
+            </a:pPr>
+            <a:r>
+              <a:rPr lang="en-US" sz="1200" i="1" dirty="0">
+                <a:effectLst/>
+                <a:ea typeface="ＭＳ 明朝"/>
+                <a:cs typeface="Times New Roman"/>
+              </a:rPr>
+              <a:t>y-axis</a:t>
+            </a:r>
+            <a:endParaRPr lang="en-US" sz="1200" dirty="0">
+              <a:effectLst/>
+              <a:ea typeface="ＭＳ 明朝"/>
+              <a:cs typeface="Times New Roman"/>
+            </a:endParaRPr>
+          </a:p>
+        </p:txBody>
+      </p:sp>
+    </p:spTree>
+    <p:extLst>
+      <p:ext uri="{BB962C8B-B14F-4D97-AF65-F5344CB8AC3E}">
+        <p14:creationId xmlns:p14="http://schemas.microsoft.com/office/powerpoint/2010/main" val="2674702615"/>
+      </p:ext>
+    </p:extLst>
+  </p:cSld>
+  <p:clrMapOvr>
+    <a:masterClrMapping/>
+  </p:clrMapOvr>
+</p:sld>
+</file>
+
+<file path=ppt/slides/slide6.xml><?xml version="1.0" encoding="utf-8"?>
+<p:sld xmlns:a="http://schemas.openxmlformats.org/drawingml/2006/main" xmlns:r="http://schemas.openxmlformats.org/officeDocument/2006/relationships" xmlns:p="http://schemas.openxmlformats.org/presentationml/2006/main">
+  <p:cSld>
+    <p:spTree>
+      <p:nvGrpSpPr>
+        <p:cNvPr id="1" name=""/>
+        <p:cNvGrpSpPr/>
+        <p:nvPr/>
+      </p:nvGrpSpPr>
+      <p:grpSpPr>
+        <a:xfrm>
+          <a:off x="0" y="0"/>
+          <a:ext cx="0" cy="0"/>
+          <a:chOff x="0" y="0"/>
+          <a:chExt cx="0" cy="0"/>
+        </a:xfrm>
+      </p:grpSpPr>
+      <p:sp>
+        <p:nvSpPr>
+          <p:cNvPr id="2" name="Title 1"/>
+          <p:cNvSpPr>
+            <a:spLocks noGrp="1"/>
+          </p:cNvSpPr>
+          <p:nvPr>
+            <p:ph type="title"/>
+          </p:nvPr>
+        </p:nvSpPr>
+        <p:spPr/>
+        <p:txBody>
+          <a:bodyPr/>
+          <a:lstStyle/>
+          <a:p>
+            <a:r>
+              <a:rPr lang="en-US" dirty="0" smtClean="0"/>
+              <a:t>Processing</a:t>
+            </a:r>
+            <a:endParaRPr lang="en-US" dirty="0"/>
+          </a:p>
+        </p:txBody>
+      </p:sp>
+      <p:sp>
+        <p:nvSpPr>
+          <p:cNvPr id="12" name="Content Placeholder 11"/>
+          <p:cNvSpPr>
+            <a:spLocks noGrp="1"/>
+          </p:cNvSpPr>
+          <p:nvPr>
+            <p:ph idx="1"/>
+          </p:nvPr>
+        </p:nvSpPr>
+        <p:spPr/>
+        <p:txBody>
+          <a:bodyPr/>
+          <a:lstStyle/>
+          <a:p>
+            <a:r>
+              <a:rPr lang="en-US" dirty="0" smtClean="0"/>
+              <a:t>Open </a:t>
+            </a:r>
+            <a:r>
+              <a:rPr lang="en-US" i="1" dirty="0" smtClean="0"/>
+              <a:t>Processing</a:t>
+            </a:r>
+            <a:endParaRPr lang="en-US" dirty="0"/>
+          </a:p>
+        </p:txBody>
+      </p:sp>
+      <p:pic>
+        <p:nvPicPr>
+          <p:cNvPr id="14" name="Picture 13"/>
+          <p:cNvPicPr/>
+          <p:nvPr/>
+        </p:nvPicPr>
+        <p:blipFill>
+          <a:blip r:embed="rId2">
+            <a:extLst>
+              <a:ext uri="{28A0092B-C50C-407E-A947-70E740481C1C}">
+                <a14:useLocalDpi xmlns:a14="http://schemas.microsoft.com/office/drawing/2010/main" val="0"/>
+              </a:ext>
+            </a:extLst>
+          </a:blip>
+          <a:srcRect/>
+          <a:stretch>
+            <a:fillRect/>
+          </a:stretch>
+        </p:blipFill>
+        <p:spPr bwMode="auto">
+          <a:xfrm>
+            <a:off x="3055937" y="2520576"/>
+            <a:ext cx="3032125" cy="3530600"/>
+          </a:xfrm>
+          <a:prstGeom prst="rect">
+            <a:avLst/>
+          </a:prstGeom>
+          <a:noFill/>
+          <a:ln>
+            <a:noFill/>
+          </a:ln>
+        </p:spPr>
+      </p:pic>
+    </p:spTree>
+    <p:extLst>
+      <p:ext uri="{BB962C8B-B14F-4D97-AF65-F5344CB8AC3E}">
+        <p14:creationId xmlns:p14="http://schemas.microsoft.com/office/powerpoint/2010/main" val="2711857015"/>
+      </p:ext>
+    </p:extLst>
+  </p:cSld>
+  <p:clrMapOvr>
+    <a:masterClrMapping/>
+  </p:clrMapOvr>
+</p:sld>
+</file>
+
+<file path=ppt/slides/slide7.xml><?xml version="1.0" encoding="utf-8"?>
+<p:sld xmlns:a="http://schemas.openxmlformats.org/drawingml/2006/main" xmlns:r="http://schemas.openxmlformats.org/officeDocument/2006/relationships" xmlns:p="http://schemas.openxmlformats.org/presentationml/2006/main">
+  <p:cSld>
+    <p:spTree>
+      <p:nvGrpSpPr>
+        <p:cNvPr id="1" name=""/>
+        <p:cNvGrpSpPr/>
+        <p:nvPr/>
+      </p:nvGrpSpPr>
+      <p:grpSpPr>
+        <a:xfrm>
+          <a:off x="0" y="0"/>
+          <a:ext cx="0" cy="0"/>
+          <a:chOff x="0" y="0"/>
+          <a:chExt cx="0" cy="0"/>
+        </a:xfrm>
+      </p:grpSpPr>
+      <p:sp>
+        <p:nvSpPr>
+          <p:cNvPr id="2" name="Title 1"/>
+          <p:cNvSpPr>
+            <a:spLocks noGrp="1"/>
+          </p:cNvSpPr>
+          <p:nvPr>
+            <p:ph type="title"/>
+          </p:nvPr>
+        </p:nvSpPr>
+        <p:spPr/>
+        <p:txBody>
+          <a:bodyPr/>
+          <a:lstStyle/>
+          <a:p>
+            <a:r>
+              <a:rPr lang="en-US" dirty="0" smtClean="0"/>
+              <a:t>Drawing a line: </a:t>
+            </a:r>
+            <a:br>
+              <a:rPr lang="en-US" dirty="0" smtClean="0"/>
+            </a:br>
+            <a:r>
+              <a:rPr lang="en-US" sz="4400" i="1" dirty="0" smtClean="0"/>
+              <a:t>Type this code into your Sketch</a:t>
+            </a:r>
+            <a:endParaRPr lang="en-US" i="1" dirty="0"/>
+          </a:p>
+        </p:txBody>
+      </p:sp>
+      <p:sp>
+        <p:nvSpPr>
+          <p:cNvPr id="3" name="Content Placeholder 2"/>
+          <p:cNvSpPr>
+            <a:spLocks noGrp="1"/>
+          </p:cNvSpPr>
+          <p:nvPr>
+            <p:ph idx="1"/>
+          </p:nvPr>
+        </p:nvSpPr>
+        <p:spPr>
+          <a:xfrm>
+            <a:off x="792162" y="1761565"/>
+            <a:ext cx="7570787" cy="4713844"/>
+          </a:xfrm>
+        </p:spPr>
+        <p:txBody>
+          <a:bodyPr>
+            <a:normAutofit fontScale="92500" lnSpcReduction="20000"/>
+          </a:bodyPr>
+          <a:lstStyle/>
+          <a:p>
+            <a:pPr marL="0" indent="0">
+              <a:buNone/>
+            </a:pPr>
+            <a:r>
+              <a:rPr lang="en-US" dirty="0">
+                <a:latin typeface="Courier New"/>
+                <a:cs typeface="Courier New"/>
+              </a:rPr>
+              <a:t>line(0,0,200,200); </a:t>
+            </a:r>
+            <a:endParaRPr lang="en-US" dirty="0">
+              <a:cs typeface="Courier New"/>
+            </a:endParaRPr>
+          </a:p>
+          <a:p>
+            <a:pPr marL="0" indent="0">
+              <a:buNone/>
+            </a:pPr>
+            <a:r>
+              <a:rPr lang="en-US" dirty="0" smtClean="0">
+                <a:cs typeface="Courier New"/>
+              </a:rPr>
+              <a:t>Then click on the “play” button in yellow:</a:t>
+            </a:r>
+          </a:p>
+          <a:p>
+            <a:pPr marL="0" indent="0">
+              <a:buNone/>
+            </a:pPr>
+            <a:endParaRPr lang="en-US" dirty="0" smtClean="0">
+              <a:cs typeface="Courier New"/>
+            </a:endParaRPr>
+          </a:p>
+          <a:p>
+            <a:pPr marL="0" indent="0">
+              <a:buNone/>
+            </a:pPr>
+            <a:endParaRPr lang="en-US" dirty="0">
+              <a:cs typeface="Courier New"/>
+            </a:endParaRPr>
+          </a:p>
+          <a:p>
+            <a:pPr marL="0" indent="0">
+              <a:buNone/>
+            </a:pPr>
+            <a:r>
+              <a:rPr lang="en-US" dirty="0" smtClean="0">
+                <a:cs typeface="Courier New"/>
+              </a:rPr>
+              <a:t>… and here is your “sketch”: </a:t>
+            </a:r>
+          </a:p>
+          <a:p>
+            <a:pPr marL="0" indent="0">
+              <a:buNone/>
+            </a:pPr>
+            <a:endParaRPr lang="en-US" dirty="0" smtClean="0">
+              <a:cs typeface="Courier New"/>
+            </a:endParaRPr>
+          </a:p>
+          <a:p>
+            <a:pPr marL="0" indent="0">
+              <a:buNone/>
+            </a:pPr>
+            <a:r>
+              <a:rPr lang="en-US" i="1" dirty="0" smtClean="0">
+                <a:cs typeface="Courier New"/>
+              </a:rPr>
+              <a:t>Notice that every statement in Processing ends with a semi-colon (and not a period … or a question mark!)</a:t>
+            </a:r>
+            <a:endParaRPr lang="en-US" i="1" dirty="0">
+              <a:cs typeface="Courier New"/>
+            </a:endParaRPr>
+          </a:p>
+        </p:txBody>
+      </p:sp>
+      <p:pic>
+        <p:nvPicPr>
+          <p:cNvPr id="4" name="Picture 3"/>
+          <p:cNvPicPr/>
+          <p:nvPr/>
+        </p:nvPicPr>
+        <p:blipFill>
+          <a:blip r:embed="rId2">
+            <a:extLst>
+              <a:ext uri="{28A0092B-C50C-407E-A947-70E740481C1C}">
+                <a14:useLocalDpi xmlns:a14="http://schemas.microsoft.com/office/drawing/2010/main" val="0"/>
+              </a:ext>
+            </a:extLst>
+          </a:blip>
+          <a:srcRect/>
+          <a:stretch>
+            <a:fillRect/>
+          </a:stretch>
+        </p:blipFill>
+        <p:spPr bwMode="auto">
+          <a:xfrm>
+            <a:off x="2678835" y="3244114"/>
+            <a:ext cx="2703830" cy="787400"/>
+          </a:xfrm>
+          <a:prstGeom prst="rect">
+            <a:avLst/>
+          </a:prstGeom>
+          <a:noFill/>
+          <a:ln>
+            <a:noFill/>
+          </a:ln>
+        </p:spPr>
+      </p:pic>
+      <p:pic>
+        <p:nvPicPr>
+          <p:cNvPr id="6" name="Picture 5"/>
+          <p:cNvPicPr/>
+          <p:nvPr/>
+        </p:nvPicPr>
+        <p:blipFill>
+          <a:blip r:embed="rId3">
+            <a:extLst>
+              <a:ext uri="{28A0092B-C50C-407E-A947-70E740481C1C}">
+                <a14:useLocalDpi xmlns:a14="http://schemas.microsoft.com/office/drawing/2010/main" val="0"/>
+              </a:ext>
+            </a:extLst>
+          </a:blip>
+          <a:srcRect/>
+          <a:stretch>
+            <a:fillRect/>
+          </a:stretch>
+        </p:blipFill>
+        <p:spPr bwMode="auto">
+          <a:xfrm>
+            <a:off x="6403081" y="3244114"/>
+            <a:ext cx="1663700" cy="1981200"/>
+          </a:xfrm>
+          <a:prstGeom prst="rect">
+            <a:avLst/>
+          </a:prstGeom>
+          <a:noFill/>
+          <a:ln>
+            <a:noFill/>
+          </a:ln>
+        </p:spPr>
+      </p:pic>
+    </p:spTree>
+    <p:extLst>
+      <p:ext uri="{BB962C8B-B14F-4D97-AF65-F5344CB8AC3E}">
+        <p14:creationId xmlns:p14="http://schemas.microsoft.com/office/powerpoint/2010/main" val="3659383246"/>
+      </p:ext>
+    </p:extLst>
+  </p:cSld>
+  <p:clrMapOvr>
+    <a:masterClrMapping/>
+  </p:clrMapOvr>
+</p:sld>
+</file>
+
+<file path=ppt/slides/slide8.xml><?xml version="1.0" encoding="utf-8"?>
+<p:sld xmlns:a="http://schemas.openxmlformats.org/drawingml/2006/main" xmlns:r="http://schemas.openxmlformats.org/officeDocument/2006/relationships" xmlns:p="http://schemas.openxmlformats.org/presentationml/2006/main">
+  <p:cSld>
+    <p:spTree>
+      <p:nvGrpSpPr>
+        <p:cNvPr id="1" name=""/>
+        <p:cNvGrpSpPr/>
+        <p:nvPr/>
+      </p:nvGrpSpPr>
+      <p:grpSpPr>
+        <a:xfrm>
+          <a:off x="0" y="0"/>
+          <a:ext cx="0" cy="0"/>
+          <a:chOff x="0" y="0"/>
+          <a:chExt cx="0" cy="0"/>
+        </a:xfrm>
+      </p:grpSpPr>
+      <p:sp>
+        <p:nvSpPr>
+          <p:cNvPr id="2" name="Title 1"/>
+          <p:cNvSpPr>
+            <a:spLocks noGrp="1"/>
+          </p:cNvSpPr>
+          <p:nvPr>
+            <p:ph type="title"/>
+          </p:nvPr>
+        </p:nvSpPr>
+        <p:spPr/>
+        <p:txBody>
+          <a:bodyPr/>
+          <a:lstStyle/>
+          <a:p>
+            <a:r>
+              <a:rPr lang="en-US" dirty="0" smtClean="0"/>
+              <a:t>Adding to your sketch</a:t>
+            </a:r>
+            <a:endParaRPr lang="en-US" dirty="0"/>
+          </a:p>
+        </p:txBody>
+      </p:sp>
+      <p:sp>
+        <p:nvSpPr>
+          <p:cNvPr id="3" name="Content Placeholder 2"/>
+          <p:cNvSpPr>
+            <a:spLocks noGrp="1"/>
+          </p:cNvSpPr>
+          <p:nvPr>
+            <p:ph idx="1"/>
+          </p:nvPr>
+        </p:nvSpPr>
+        <p:spPr/>
+        <p:txBody>
+          <a:bodyPr/>
+          <a:lstStyle/>
+          <a:p>
+            <a:r>
+              <a:rPr lang="en-US" dirty="0" smtClean="0"/>
+              <a:t>Next let’s add:</a:t>
+            </a:r>
+          </a:p>
+          <a:p>
+            <a:pPr lvl="1"/>
+            <a:r>
+              <a:rPr lang="en-US" dirty="0" smtClean="0"/>
+              <a:t>The size of the drawing in pixels</a:t>
+            </a:r>
+          </a:p>
+          <a:p>
+            <a:pPr lvl="1"/>
+            <a:r>
+              <a:rPr lang="en-US" dirty="0" smtClean="0"/>
+              <a:t>More lines and other shapes</a:t>
+            </a:r>
+          </a:p>
+          <a:p>
+            <a:pPr lvl="1"/>
+            <a:r>
+              <a:rPr lang="en-US" dirty="0" smtClean="0"/>
+              <a:t>Color</a:t>
+            </a:r>
+          </a:p>
+          <a:p>
+            <a:pPr lvl="1"/>
+            <a:r>
+              <a:rPr lang="en-US" dirty="0" smtClean="0"/>
+              <a:t>Comments into our code</a:t>
+            </a:r>
+          </a:p>
+          <a:p>
+            <a:endParaRPr lang="en-US" dirty="0"/>
+          </a:p>
+        </p:txBody>
+      </p:sp>
+    </p:spTree>
+    <p:extLst>
+      <p:ext uri="{BB962C8B-B14F-4D97-AF65-F5344CB8AC3E}">
+        <p14:creationId xmlns:p14="http://schemas.microsoft.com/office/powerpoint/2010/main" val="2185405032"/>
+      </p:ext>
+    </p:extLst>
+  </p:cSld>
+  <p:clrMapOvr>
+    <a:masterClrMapping/>
+  </p:clrMapOvr>
+</p:sld>
+</file>
+
+<file path=ppt/slides/slide9.xml><?xml version="1.0" encoding="utf-8"?>
+<p:sld xmlns:a="http://schemas.openxmlformats.org/drawingml/2006/main" xmlns:r="http://schemas.openxmlformats.org/officeDocument/2006/relationships" xmlns:p="http://schemas.openxmlformats.org/presentationml/2006/main">
+  <p:cSld>
+    <p:spTree>
+      <p:nvGrpSpPr>
+        <p:cNvPr id="1" name=""/>
+        <p:cNvGrpSpPr/>
+        <p:nvPr/>
+      </p:nvGrpSpPr>
+      <p:grpSpPr>
+        <a:xfrm>
+          <a:off x="0" y="0"/>
+          <a:ext cx="0" cy="0"/>
+          <a:chOff x="0" y="0"/>
+          <a:chExt cx="0" cy="0"/>
+        </a:xfrm>
+      </p:grpSpPr>
+      <p:sp>
+        <p:nvSpPr>
+          <p:cNvPr id="2" name="Title 1"/>
+          <p:cNvSpPr>
+            <a:spLocks noGrp="1"/>
+          </p:cNvSpPr>
+          <p:nvPr>
+            <p:ph type="title"/>
+          </p:nvPr>
+        </p:nvSpPr>
+        <p:spPr/>
+        <p:txBody>
+          <a:bodyPr/>
+          <a:lstStyle/>
+          <a:p>
+            <a:r>
+              <a:rPr lang="en-US" dirty="0" smtClean="0"/>
+              <a:t>A Word About Color	</a:t>
+            </a:r>
+            <a:endParaRPr lang="en-US" dirty="0"/>
+          </a:p>
+        </p:txBody>
+      </p:sp>
+      <p:sp>
+        <p:nvSpPr>
+          <p:cNvPr id="3" name="Content Placeholder 2"/>
+          <p:cNvSpPr>
+            <a:spLocks noGrp="1"/>
+          </p:cNvSpPr>
+          <p:nvPr>
+            <p:ph idx="1"/>
+          </p:nvPr>
+        </p:nvSpPr>
+        <p:spPr>
+          <a:xfrm>
+            <a:off x="792162" y="1553355"/>
+            <a:ext cx="7570787" cy="5096435"/>
+          </a:xfrm>
+        </p:spPr>
+        <p:txBody>
+          <a:bodyPr>
+            <a:normAutofit fontScale="92500" lnSpcReduction="20000"/>
+          </a:bodyPr>
+          <a:lstStyle/>
+          <a:p>
+            <a:r>
+              <a:rPr lang="en-US" dirty="0" smtClean="0"/>
+              <a:t>We will be using color today in RGB mode (</a:t>
+            </a:r>
+            <a:r>
+              <a:rPr lang="en-US" i="1" dirty="0" smtClean="0"/>
+              <a:t>red, green, </a:t>
+            </a:r>
+            <a:r>
+              <a:rPr lang="en-US" dirty="0" smtClean="0"/>
+              <a:t>and</a:t>
+            </a:r>
+            <a:r>
+              <a:rPr lang="en-US" i="1" dirty="0" smtClean="0"/>
+              <a:t> blue</a:t>
+            </a:r>
+            <a:r>
+              <a:rPr lang="en-US" dirty="0" smtClean="0"/>
+              <a:t>) and we will measure each of the three colors in a range of 0-255. (</a:t>
+            </a:r>
+            <a:r>
+              <a:rPr lang="en-US" i="1" dirty="0" smtClean="0"/>
+              <a:t>Why??</a:t>
+            </a:r>
+            <a:r>
+              <a:rPr lang="en-US" dirty="0" smtClean="0"/>
+              <a:t>)</a:t>
+            </a:r>
+          </a:p>
+          <a:p>
+            <a:r>
+              <a:rPr lang="en-US" dirty="0" smtClean="0"/>
+              <a:t>Color is defined for both the </a:t>
+            </a:r>
+            <a:r>
+              <a:rPr lang="en-US" b="1" i="1" dirty="0" smtClean="0"/>
+              <a:t>stroke</a:t>
+            </a:r>
+            <a:r>
+              <a:rPr lang="en-US" dirty="0" smtClean="0"/>
+              <a:t> (lines and/or outlines) and </a:t>
+            </a:r>
+            <a:r>
+              <a:rPr lang="en-US" b="1" i="1" dirty="0" smtClean="0"/>
+              <a:t>fill</a:t>
+            </a:r>
+            <a:r>
+              <a:rPr lang="en-US" dirty="0" smtClean="0"/>
+              <a:t> (contents of a shape)</a:t>
+            </a:r>
+          </a:p>
+          <a:p>
+            <a:r>
+              <a:rPr lang="en-US" dirty="0" smtClean="0"/>
+              <a:t>(Hint: use </a:t>
+            </a:r>
+            <a:r>
+              <a:rPr lang="en-US" b="1" i="1" dirty="0" err="1" smtClean="0"/>
+              <a:t>nofill</a:t>
+            </a:r>
+            <a:r>
+              <a:rPr lang="en-US" b="1" i="1" dirty="0" smtClean="0"/>
+              <a:t>()</a:t>
+            </a:r>
+            <a:r>
+              <a:rPr lang="en-US" dirty="0" smtClean="0"/>
+              <a:t> to leave a shape with only an outline!)</a:t>
+            </a:r>
+          </a:p>
+          <a:p>
+            <a:r>
+              <a:rPr lang="en-US" dirty="0" smtClean="0"/>
+              <a:t>Black can be expressed as (0) and white can be expressed as (255).</a:t>
+            </a:r>
+          </a:p>
+          <a:p>
+            <a:r>
+              <a:rPr lang="en-US" dirty="0" smtClean="0"/>
+              <a:t>Note there is </a:t>
+            </a:r>
+            <a:r>
+              <a:rPr lang="en-US" dirty="0" err="1" smtClean="0"/>
+              <a:t>aProcessing</a:t>
+            </a:r>
+            <a:r>
+              <a:rPr lang="en-US" dirty="0" smtClean="0"/>
+              <a:t>  </a:t>
+            </a:r>
+            <a:r>
+              <a:rPr lang="en-US" dirty="0"/>
+              <a:t>tutorial </a:t>
+            </a:r>
+            <a:r>
+              <a:rPr lang="en-US" dirty="0" smtClean="0"/>
+              <a:t>on color posted </a:t>
+            </a:r>
+            <a:r>
+              <a:rPr lang="en-US" dirty="0"/>
+              <a:t>to </a:t>
+            </a:r>
+            <a:r>
+              <a:rPr lang="en-US" dirty="0">
+                <a:hlinkClick r:id="rId2"/>
+              </a:rPr>
+              <a:t>https://www.processing.org/tutorials/color</a:t>
+            </a:r>
+            <a:r>
+              <a:rPr lang="en-US" dirty="0" smtClean="0">
+                <a:hlinkClick r:id="rId2"/>
+              </a:rPr>
+              <a:t>/</a:t>
+            </a:r>
+            <a:r>
+              <a:rPr lang="en-US" dirty="0" smtClean="0"/>
+              <a:t> </a:t>
+            </a:r>
+          </a:p>
+        </p:txBody>
+      </p:sp>
+    </p:spTree>
+    <p:extLst>
+      <p:ext uri="{BB962C8B-B14F-4D97-AF65-F5344CB8AC3E}">
+        <p14:creationId xmlns:p14="http://schemas.microsoft.com/office/powerpoint/2010/main" val="3232505315"/>
       </p:ext>
     </p:extLst>
   </p:cSld>

</xml_diff>

<commit_message>
Fixed a few small errors
</commit_message>
<xml_diff>
--- a/Processing_Presentation_TF3_DE_notes.pptx
+++ b/Processing_Presentation_TF3_DE_notes.pptx
@@ -5010,11 +5010,7 @@
           <a:p>
             <a:r>
               <a:rPr lang="en-US" dirty="0" smtClean="0"/>
-              <a:t>Introduction to </a:t>
-            </a:r>
-            <a:r>
-              <a:rPr lang="en-US" dirty="0" smtClean="0"/>
-              <a:t>Processing: Part I</a:t>
+              <a:t>Introduction to Processing: Part I</a:t>
             </a:r>
             <a:endParaRPr lang="en-US" dirty="0"/>
           </a:p>
@@ -5079,25 +5075,6 @@
           <a:chExt cx="0" cy="0"/>
         </a:xfrm>
       </p:grpSpPr>
-      <p:sp>
-        <p:nvSpPr>
-          <p:cNvPr id="2" name="Title 1"/>
-          <p:cNvSpPr>
-            <a:spLocks noGrp="1"/>
-          </p:cNvSpPr>
-          <p:nvPr>
-            <p:ph type="title"/>
-          </p:nvPr>
-        </p:nvSpPr>
-        <p:spPr/>
-        <p:txBody>
-          <a:bodyPr/>
-          <a:lstStyle/>
-          <a:p>
-            <a:endParaRPr lang="en-US" dirty="0"/>
-          </a:p>
-        </p:txBody>
-      </p:sp>
       <p:sp>
         <p:nvSpPr>
           <p:cNvPr id="3" name="Content Placeholder 2"/>
@@ -5198,6 +5175,34 @@
           </a:ln>
         </p:spPr>
       </p:pic>
+      <p:sp>
+        <p:nvSpPr>
+          <p:cNvPr id="5" name="Title 1"/>
+          <p:cNvSpPr>
+            <a:spLocks noGrp="1"/>
+          </p:cNvSpPr>
+          <p:nvPr>
+            <p:ph type="title"/>
+          </p:nvPr>
+        </p:nvSpPr>
+        <p:spPr>
+          <a:xfrm>
+            <a:off x="792162" y="40341"/>
+            <a:ext cx="7570787" cy="1411941"/>
+          </a:xfrm>
+        </p:spPr>
+        <p:txBody>
+          <a:bodyPr/>
+          <a:lstStyle/>
+          <a:p>
+            <a:r>
+              <a:rPr lang="en-US" dirty="0" smtClean="0"/>
+              <a:t>Your white line on a black background …</a:t>
+            </a:r>
+            <a:endParaRPr lang="en-US" dirty="0"/>
+          </a:p>
+        </p:txBody>
+      </p:sp>
     </p:spTree>
     <p:extLst>
       <p:ext uri="{BB962C8B-B14F-4D97-AF65-F5344CB8AC3E}">
@@ -5448,7 +5453,7 @@
         </p:blipFill>
         <p:spPr bwMode="auto">
           <a:xfrm>
-            <a:off x="5746295" y="4814333"/>
+            <a:off x="6644000" y="3508596"/>
             <a:ext cx="1148715" cy="1216025"/>
           </a:xfrm>
           <a:prstGeom prst="rect">
@@ -5525,7 +5530,7 @@
         </p:nvSpPr>
         <p:spPr>
           <a:xfrm>
-            <a:off x="792162" y="1761564"/>
+            <a:off x="792162" y="1673992"/>
             <a:ext cx="7930288" cy="4880415"/>
           </a:xfrm>
         </p:spPr>
@@ -5537,8 +5542,9 @@
           <a:p>
             <a:r>
               <a:rPr lang="en-US" dirty="0" smtClean="0"/>
-              <a:t>The following code gives you:</a:t>
-            </a:r>
+              <a:t>Here is the same code … annotated:</a:t>
+            </a:r>
+            <a:endParaRPr lang="en-US" dirty="0" smtClean="0"/>
           </a:p>
           <a:p>
             <a:pPr marL="692150" lvl="2" indent="0">
@@ -5774,8 +5780,12 @@
           <a:lstStyle/>
           <a:p>
             <a:r>
-              <a:rPr lang="en-US" sz="4800" i="1" dirty="0" smtClean="0"/>
-              <a:t>Its time to do a sketch of your own! Try the following:</a:t>
+              <a:rPr lang="en-US" sz="4400" i="1" dirty="0" smtClean="0"/>
+              <a:t>We will now give you time to </a:t>
+            </a:r>
+            <a:r>
+              <a:rPr lang="en-US" sz="4400" i="1" dirty="0" smtClean="0"/>
+              <a:t>do a sketch of your own! </a:t>
             </a:r>
             <a:endParaRPr lang="en-US" sz="4800" i="1" dirty="0"/>
           </a:p>
@@ -5791,16 +5801,34 @@
             <p:ph idx="1"/>
           </p:nvPr>
         </p:nvSpPr>
-        <p:spPr/>
+        <p:spPr>
+          <a:xfrm>
+            <a:off x="792162" y="1761565"/>
+            <a:ext cx="7570787" cy="4828245"/>
+          </a:xfrm>
+        </p:spPr>
         <p:txBody>
           <a:bodyPr>
-            <a:normAutofit fontScale="92500" lnSpcReduction="10000"/>
+            <a:normAutofit fontScale="85000" lnSpcReduction="10000"/>
           </a:bodyPr>
           <a:lstStyle/>
           <a:p>
+            <a:pPr marL="0" indent="0" algn="ctr">
+              <a:buNone/>
+            </a:pPr>
+            <a:r>
+              <a:rPr lang="en-US" sz="3300" dirty="0" smtClean="0"/>
+              <a:t>How do these shapes look … in different colors?</a:t>
+            </a:r>
+          </a:p>
+          <a:p>
             <a:r>
               <a:rPr lang="en-US" dirty="0" smtClean="0"/>
-              <a:t>Line: </a:t>
+              <a:t>Line</a:t>
+            </a:r>
+            <a:r>
+              <a:rPr lang="en-US" dirty="0" smtClean="0"/>
+              <a:t>: </a:t>
             </a:r>
             <a:r>
               <a:rPr lang="en-US" i="1" dirty="0" smtClean="0"/>
@@ -6109,11 +6137,7 @@
           <a:p>
             <a:r>
               <a:rPr lang="en-US" dirty="0" smtClean="0"/>
-              <a:t>Introduction to </a:t>
-            </a:r>
-            <a:r>
-              <a:rPr lang="en-US" dirty="0" smtClean="0"/>
-              <a:t>Processing: Part 2</a:t>
+              <a:t>Introduction to Processing: Part 2</a:t>
             </a:r>
             <a:endParaRPr lang="en-US" dirty="0"/>
           </a:p>

</xml_diff>

<commit_message>
Corrections to Part 1
</commit_message>
<xml_diff>
--- a/Processing_Presentation_TF3_DE_notes.pptx
+++ b/Processing_Presentation_TF3_DE_notes.pptx
@@ -12,18 +12,20 @@
     <p:sldId id="260" r:id="rId6"/>
     <p:sldId id="261" r:id="rId7"/>
     <p:sldId id="262" r:id="rId8"/>
-    <p:sldId id="263" r:id="rId9"/>
-    <p:sldId id="264" r:id="rId10"/>
-    <p:sldId id="265" r:id="rId11"/>
-    <p:sldId id="266" r:id="rId12"/>
-    <p:sldId id="268" r:id="rId13"/>
-    <p:sldId id="267" r:id="rId14"/>
-    <p:sldId id="269" r:id="rId15"/>
-    <p:sldId id="270" r:id="rId16"/>
-    <p:sldId id="271" r:id="rId17"/>
-    <p:sldId id="272" r:id="rId18"/>
-    <p:sldId id="273" r:id="rId19"/>
-    <p:sldId id="274" r:id="rId20"/>
+    <p:sldId id="275" r:id="rId9"/>
+    <p:sldId id="276" r:id="rId10"/>
+    <p:sldId id="263" r:id="rId11"/>
+    <p:sldId id="264" r:id="rId12"/>
+    <p:sldId id="265" r:id="rId13"/>
+    <p:sldId id="266" r:id="rId14"/>
+    <p:sldId id="268" r:id="rId15"/>
+    <p:sldId id="267" r:id="rId16"/>
+    <p:sldId id="269" r:id="rId17"/>
+    <p:sldId id="270" r:id="rId18"/>
+    <p:sldId id="271" r:id="rId19"/>
+    <p:sldId id="272" r:id="rId20"/>
+    <p:sldId id="273" r:id="rId21"/>
+    <p:sldId id="274" r:id="rId22"/>
   </p:sldIdLst>
   <p:sldSz cx="9144000" cy="6858000" type="screen4x3"/>
   <p:notesSz cx="6858000" cy="9144000"/>
@@ -464,7 +466,7 @@
           <a:p>
             <a:fld id="{49AE121B-3902-2145-B971-053F2626F9D9}" type="datetimeFigureOut">
               <a:rPr lang="en-US" smtClean="0"/>
-              <a:t>8/10/15</a:t>
+              <a:t>8/17/15</a:t>
             </a:fld>
             <a:endParaRPr lang="en-US"/>
           </a:p>
@@ -817,7 +819,7 @@
           <a:p>
             <a:fld id="{49AE121B-3902-2145-B971-053F2626F9D9}" type="datetimeFigureOut">
               <a:rPr lang="en-US" smtClean="0"/>
-              <a:t>8/10/15</a:t>
+              <a:t>8/17/15</a:t>
             </a:fld>
             <a:endParaRPr lang="en-US"/>
           </a:p>
@@ -1192,7 +1194,7 @@
           <a:p>
             <a:fld id="{49AE121B-3902-2145-B971-053F2626F9D9}" type="datetimeFigureOut">
               <a:rPr lang="en-US" smtClean="0"/>
-              <a:t>8/10/15</a:t>
+              <a:t>8/17/15</a:t>
             </a:fld>
             <a:endParaRPr lang="en-US"/>
           </a:p>
@@ -1425,7 +1427,7 @@
           <a:p>
             <a:fld id="{49AE121B-3902-2145-B971-053F2626F9D9}" type="datetimeFigureOut">
               <a:rPr lang="en-US" smtClean="0"/>
-              <a:t>8/10/15</a:t>
+              <a:t>8/17/15</a:t>
             </a:fld>
             <a:endParaRPr lang="en-US"/>
           </a:p>
@@ -1668,7 +1670,7 @@
           <a:p>
             <a:fld id="{49AE121B-3902-2145-B971-053F2626F9D9}" type="datetimeFigureOut">
               <a:rPr lang="en-US" smtClean="0"/>
-              <a:t>8/10/15</a:t>
+              <a:t>8/17/15</a:t>
             </a:fld>
             <a:endParaRPr lang="en-US"/>
           </a:p>
@@ -1901,7 +1903,7 @@
           <a:p>
             <a:fld id="{49AE121B-3902-2145-B971-053F2626F9D9}" type="datetimeFigureOut">
               <a:rPr lang="en-US" smtClean="0"/>
-              <a:t>8/10/15</a:t>
+              <a:t>8/17/15</a:t>
             </a:fld>
             <a:endParaRPr lang="en-US"/>
           </a:p>
@@ -2296,7 +2298,7 @@
           <a:p>
             <a:fld id="{49AE121B-3902-2145-B971-053F2626F9D9}" type="datetimeFigureOut">
               <a:rPr lang="en-US" smtClean="0"/>
-              <a:t>8/10/15</a:t>
+              <a:t>8/17/15</a:t>
             </a:fld>
             <a:endParaRPr lang="en-US"/>
           </a:p>
@@ -2636,7 +2638,7 @@
           <a:p>
             <a:fld id="{49AE121B-3902-2145-B971-053F2626F9D9}" type="datetimeFigureOut">
               <a:rPr lang="en-US" smtClean="0"/>
-              <a:t>8/10/15</a:t>
+              <a:t>8/17/15</a:t>
             </a:fld>
             <a:endParaRPr lang="en-US"/>
           </a:p>
@@ -3139,7 +3141,7 @@
           <a:p>
             <a:fld id="{49AE121B-3902-2145-B971-053F2626F9D9}" type="datetimeFigureOut">
               <a:rPr lang="en-US" smtClean="0"/>
-              <a:t>8/10/15</a:t>
+              <a:t>8/17/15</a:t>
             </a:fld>
             <a:endParaRPr lang="en-US"/>
           </a:p>
@@ -3648,7 +3650,7 @@
           <a:p>
             <a:fld id="{49AE121B-3902-2145-B971-053F2626F9D9}" type="datetimeFigureOut">
               <a:rPr lang="en-US" smtClean="0"/>
-              <a:t>8/10/15</a:t>
+              <a:t>8/17/15</a:t>
             </a:fld>
             <a:endParaRPr lang="en-US"/>
           </a:p>
@@ -3887,7 +3889,7 @@
           <a:p>
             <a:fld id="{49AE121B-3902-2145-B971-053F2626F9D9}" type="datetimeFigureOut">
               <a:rPr lang="en-US" smtClean="0"/>
-              <a:t>8/10/15</a:t>
+              <a:t>8/17/15</a:t>
             </a:fld>
             <a:endParaRPr lang="en-US"/>
           </a:p>
@@ -4001,7 +4003,7 @@
           <a:p>
             <a:fld id="{49AE121B-3902-2145-B971-053F2626F9D9}" type="datetimeFigureOut">
               <a:rPr lang="en-US" smtClean="0"/>
-              <a:t>8/10/15</a:t>
+              <a:t>8/17/15</a:t>
             </a:fld>
             <a:endParaRPr lang="en-US"/>
           </a:p>
@@ -4347,7 +4349,7 @@
           <a:p>
             <a:fld id="{49AE121B-3902-2145-B971-053F2626F9D9}" type="datetimeFigureOut">
               <a:rPr lang="en-US" smtClean="0"/>
-              <a:t>8/10/15</a:t>
+              <a:t>8/17/15</a:t>
             </a:fld>
             <a:endParaRPr lang="en-US"/>
           </a:p>
@@ -4580,7 +4582,7 @@
           <a:p>
             <a:fld id="{49AE121B-3902-2145-B971-053F2626F9D9}" type="datetimeFigureOut">
               <a:rPr lang="en-US" smtClean="0"/>
-              <a:t>8/10/15</a:t>
+              <a:t>8/17/15</a:t>
             </a:fld>
             <a:endParaRPr lang="en-US"/>
           </a:p>
@@ -5033,8 +5035,13 @@
           <a:p>
             <a:r>
               <a:rPr lang="en-US" dirty="0" smtClean="0"/>
-              <a:t>Tech Focus 3</a:t>
-            </a:r>
+              <a:t>Tech </a:t>
+            </a:r>
+            <a:r>
+              <a:rPr lang="en-US" dirty="0" smtClean="0"/>
+              <a:t>Focus III: Caring for Software Based Art</a:t>
+            </a:r>
+            <a:endParaRPr lang="en-US" dirty="0" smtClean="0"/>
           </a:p>
           <a:p>
             <a:r>
@@ -5077,12 +5084,12 @@
       </p:grpSpPr>
       <p:sp>
         <p:nvSpPr>
-          <p:cNvPr id="3" name="Content Placeholder 2"/>
-          <p:cNvSpPr>
-            <a:spLocks noGrp="1"/>
-          </p:cNvSpPr>
-          <p:nvPr>
-            <p:ph idx="1"/>
+          <p:cNvPr id="2" name="Title 1"/>
+          <p:cNvSpPr>
+            <a:spLocks noGrp="1"/>
+          </p:cNvSpPr>
+          <p:nvPr>
+            <p:ph type="title"/>
           </p:nvPr>
         </p:nvSpPr>
         <p:spPr/>
@@ -5092,7 +5099,324 @@
           <a:p>
             <a:r>
               <a:rPr lang="en-US" dirty="0" smtClean="0"/>
-              <a:t>If you add the following code:</a:t>
+              <a:t>Adding to your sketch</a:t>
+            </a:r>
+            <a:endParaRPr lang="en-US" dirty="0"/>
+          </a:p>
+        </p:txBody>
+      </p:sp>
+      <p:sp>
+        <p:nvSpPr>
+          <p:cNvPr id="3" name="Content Placeholder 2"/>
+          <p:cNvSpPr>
+            <a:spLocks noGrp="1"/>
+          </p:cNvSpPr>
+          <p:nvPr>
+            <p:ph idx="1"/>
+          </p:nvPr>
+        </p:nvSpPr>
+        <p:spPr/>
+        <p:txBody>
+          <a:bodyPr/>
+          <a:lstStyle/>
+          <a:p>
+            <a:r>
+              <a:rPr lang="en-US" dirty="0" smtClean="0"/>
+              <a:t>Next let’s add:</a:t>
+            </a:r>
+          </a:p>
+          <a:p>
+            <a:pPr lvl="1"/>
+            <a:r>
+              <a:rPr lang="en-US" dirty="0" smtClean="0"/>
+              <a:t>The size of the drawing in pixels</a:t>
+            </a:r>
+          </a:p>
+          <a:p>
+            <a:pPr lvl="1"/>
+            <a:r>
+              <a:rPr lang="en-US" dirty="0" smtClean="0"/>
+              <a:t>More lines and other shapes</a:t>
+            </a:r>
+          </a:p>
+          <a:p>
+            <a:pPr lvl="1"/>
+            <a:r>
+              <a:rPr lang="en-US" dirty="0" smtClean="0"/>
+              <a:t>Color</a:t>
+            </a:r>
+          </a:p>
+          <a:p>
+            <a:pPr lvl="1"/>
+            <a:r>
+              <a:rPr lang="en-US" dirty="0" smtClean="0"/>
+              <a:t>Comments into </a:t>
+            </a:r>
+            <a:r>
+              <a:rPr lang="en-US" dirty="0" smtClean="0"/>
+              <a:t>your </a:t>
+            </a:r>
+            <a:r>
+              <a:rPr lang="en-US" dirty="0" smtClean="0"/>
+              <a:t>code</a:t>
+            </a:r>
+          </a:p>
+          <a:p>
+            <a:endParaRPr lang="en-US" dirty="0"/>
+          </a:p>
+        </p:txBody>
+      </p:sp>
+    </p:spTree>
+    <p:extLst>
+      <p:ext uri="{BB962C8B-B14F-4D97-AF65-F5344CB8AC3E}">
+        <p14:creationId xmlns:p14="http://schemas.microsoft.com/office/powerpoint/2010/main" val="2185405032"/>
+      </p:ext>
+    </p:extLst>
+  </p:cSld>
+  <p:clrMapOvr>
+    <a:masterClrMapping/>
+  </p:clrMapOvr>
+</p:sld>
+</file>
+
+<file path=ppt/slides/slide11.xml><?xml version="1.0" encoding="utf-8"?>
+<p:sld xmlns:a="http://schemas.openxmlformats.org/drawingml/2006/main" xmlns:r="http://schemas.openxmlformats.org/officeDocument/2006/relationships" xmlns:p="http://schemas.openxmlformats.org/presentationml/2006/main">
+  <p:cSld>
+    <p:spTree>
+      <p:nvGrpSpPr>
+        <p:cNvPr id="1" name=""/>
+        <p:cNvGrpSpPr/>
+        <p:nvPr/>
+      </p:nvGrpSpPr>
+      <p:grpSpPr>
+        <a:xfrm>
+          <a:off x="0" y="0"/>
+          <a:ext cx="0" cy="0"/>
+          <a:chOff x="0" y="0"/>
+          <a:chExt cx="0" cy="0"/>
+        </a:xfrm>
+      </p:grpSpPr>
+      <p:sp>
+        <p:nvSpPr>
+          <p:cNvPr id="2" name="Title 1"/>
+          <p:cNvSpPr>
+            <a:spLocks noGrp="1"/>
+          </p:cNvSpPr>
+          <p:nvPr>
+            <p:ph type="title"/>
+          </p:nvPr>
+        </p:nvSpPr>
+        <p:spPr/>
+        <p:txBody>
+          <a:bodyPr/>
+          <a:lstStyle/>
+          <a:p>
+            <a:r>
+              <a:rPr lang="en-US" dirty="0" smtClean="0"/>
+              <a:t>A Word About Color	</a:t>
+            </a:r>
+            <a:endParaRPr lang="en-US" dirty="0"/>
+          </a:p>
+        </p:txBody>
+      </p:sp>
+      <p:sp>
+        <p:nvSpPr>
+          <p:cNvPr id="3" name="Content Placeholder 2"/>
+          <p:cNvSpPr>
+            <a:spLocks noGrp="1"/>
+          </p:cNvSpPr>
+          <p:nvPr>
+            <p:ph idx="1"/>
+          </p:nvPr>
+        </p:nvSpPr>
+        <p:spPr>
+          <a:xfrm>
+            <a:off x="792162" y="1553355"/>
+            <a:ext cx="7570787" cy="5096435"/>
+          </a:xfrm>
+        </p:spPr>
+        <p:txBody>
+          <a:bodyPr>
+            <a:normAutofit fontScale="92500" lnSpcReduction="20000"/>
+          </a:bodyPr>
+          <a:lstStyle/>
+          <a:p>
+            <a:r>
+              <a:rPr lang="en-US" dirty="0" smtClean="0"/>
+              <a:t>We will be using color today in RGB mode (</a:t>
+            </a:r>
+            <a:r>
+              <a:rPr lang="en-US" i="1" dirty="0" smtClean="0"/>
+              <a:t>red, green, </a:t>
+            </a:r>
+            <a:r>
+              <a:rPr lang="en-US" dirty="0" smtClean="0"/>
+              <a:t>and</a:t>
+            </a:r>
+            <a:r>
+              <a:rPr lang="en-US" i="1" dirty="0" smtClean="0"/>
+              <a:t> blue</a:t>
+            </a:r>
+            <a:r>
+              <a:rPr lang="en-US" dirty="0" smtClean="0"/>
+              <a:t>) and we will measure each of the three colors in a range of 0-255. (</a:t>
+            </a:r>
+            <a:r>
+              <a:rPr lang="en-US" i="1" dirty="0" smtClean="0"/>
+              <a:t>Why??</a:t>
+            </a:r>
+            <a:r>
+              <a:rPr lang="en-US" dirty="0" smtClean="0"/>
+              <a:t>)</a:t>
+            </a:r>
+          </a:p>
+          <a:p>
+            <a:r>
+              <a:rPr lang="en-US" dirty="0" smtClean="0"/>
+              <a:t>Color is defined for both the </a:t>
+            </a:r>
+            <a:r>
+              <a:rPr lang="en-US" b="1" i="1" dirty="0" smtClean="0"/>
+              <a:t>stroke</a:t>
+            </a:r>
+            <a:r>
+              <a:rPr lang="en-US" dirty="0" smtClean="0"/>
+              <a:t> (lines and/or outlines) and </a:t>
+            </a:r>
+            <a:r>
+              <a:rPr lang="en-US" b="1" i="1" dirty="0" smtClean="0"/>
+              <a:t>fill</a:t>
+            </a:r>
+            <a:r>
+              <a:rPr lang="en-US" dirty="0" smtClean="0"/>
+              <a:t> (contents of a shape)</a:t>
+            </a:r>
+          </a:p>
+          <a:p>
+            <a:r>
+              <a:rPr lang="en-US" dirty="0" smtClean="0"/>
+              <a:t>(Hint: use </a:t>
+            </a:r>
+            <a:r>
+              <a:rPr lang="en-US" b="1" i="1" dirty="0" err="1" smtClean="0"/>
+              <a:t>nofill</a:t>
+            </a:r>
+            <a:r>
+              <a:rPr lang="en-US" b="1" i="1" dirty="0" smtClean="0"/>
+              <a:t>()</a:t>
+            </a:r>
+            <a:r>
+              <a:rPr lang="en-US" dirty="0" smtClean="0"/>
+              <a:t> to leave a shape with only an outline!)</a:t>
+            </a:r>
+          </a:p>
+          <a:p>
+            <a:r>
+              <a:rPr lang="en-US" dirty="0" smtClean="0"/>
+              <a:t>Black can be expressed as (0) and white can be expressed as (255).</a:t>
+            </a:r>
+          </a:p>
+          <a:p>
+            <a:r>
+              <a:rPr lang="en-US" dirty="0" smtClean="0"/>
+              <a:t>Note there is </a:t>
+            </a:r>
+            <a:r>
+              <a:rPr lang="en-US" dirty="0" smtClean="0"/>
+              <a:t>a Processing  </a:t>
+            </a:r>
+            <a:r>
+              <a:rPr lang="en-US" dirty="0"/>
+              <a:t>tutorial </a:t>
+            </a:r>
+            <a:r>
+              <a:rPr lang="en-US" dirty="0" smtClean="0"/>
+              <a:t>on color posted </a:t>
+            </a:r>
+            <a:r>
+              <a:rPr lang="en-US" dirty="0"/>
+              <a:t>to </a:t>
+            </a:r>
+            <a:r>
+              <a:rPr lang="en-US" dirty="0">
+                <a:hlinkClick r:id="rId2"/>
+              </a:rPr>
+              <a:t>https://www.processing.org/tutorials/color</a:t>
+            </a:r>
+            <a:r>
+              <a:rPr lang="en-US" dirty="0" smtClean="0">
+                <a:hlinkClick r:id="rId2"/>
+              </a:rPr>
+              <a:t>/</a:t>
+            </a:r>
+            <a:r>
+              <a:rPr lang="en-US" dirty="0" smtClean="0"/>
+              <a:t> </a:t>
+            </a:r>
+          </a:p>
+        </p:txBody>
+      </p:sp>
+    </p:spTree>
+    <p:extLst>
+      <p:ext uri="{BB962C8B-B14F-4D97-AF65-F5344CB8AC3E}">
+        <p14:creationId xmlns:p14="http://schemas.microsoft.com/office/powerpoint/2010/main" val="3232505315"/>
+      </p:ext>
+    </p:extLst>
+  </p:cSld>
+  <p:clrMapOvr>
+    <a:masterClrMapping/>
+  </p:clrMapOvr>
+</p:sld>
+</file>
+
+<file path=ppt/slides/slide12.xml><?xml version="1.0" encoding="utf-8"?>
+<p:sld xmlns:a="http://schemas.openxmlformats.org/drawingml/2006/main" xmlns:r="http://schemas.openxmlformats.org/officeDocument/2006/relationships" xmlns:p="http://schemas.openxmlformats.org/presentationml/2006/main">
+  <p:cSld>
+    <p:spTree>
+      <p:nvGrpSpPr>
+        <p:cNvPr id="1" name=""/>
+        <p:cNvGrpSpPr/>
+        <p:nvPr/>
+      </p:nvGrpSpPr>
+      <p:grpSpPr>
+        <a:xfrm>
+          <a:off x="0" y="0"/>
+          <a:ext cx="0" cy="0"/>
+          <a:chOff x="0" y="0"/>
+          <a:chExt cx="0" cy="0"/>
+        </a:xfrm>
+      </p:grpSpPr>
+      <p:sp>
+        <p:nvSpPr>
+          <p:cNvPr id="3" name="Content Placeholder 2"/>
+          <p:cNvSpPr>
+            <a:spLocks noGrp="1"/>
+          </p:cNvSpPr>
+          <p:nvPr>
+            <p:ph idx="1"/>
+          </p:nvPr>
+        </p:nvSpPr>
+        <p:spPr>
+          <a:xfrm>
+            <a:off x="792162" y="1761565"/>
+            <a:ext cx="7570787" cy="4810300"/>
+          </a:xfrm>
+        </p:spPr>
+        <p:txBody>
+          <a:bodyPr/>
+          <a:lstStyle/>
+          <a:p>
+            <a:r>
+              <a:rPr lang="en-US" dirty="0" smtClean="0"/>
+              <a:t>If you add the </a:t>
+            </a:r>
+            <a:r>
+              <a:rPr lang="en-US" dirty="0" smtClean="0"/>
+              <a:t>first two lines above your </a:t>
+            </a:r>
+            <a:r>
+              <a:rPr lang="en-US" dirty="0" smtClean="0"/>
+              <a:t>code:</a:t>
             </a:r>
           </a:p>
           <a:p>
@@ -5187,7 +5511,7 @@
         </p:nvSpPr>
         <p:spPr>
           <a:xfrm>
-            <a:off x="792162" y="40341"/>
+            <a:off x="792162" y="25573"/>
             <a:ext cx="7570787" cy="1411941"/>
           </a:xfrm>
         </p:spPr>
@@ -5196,10 +5520,14 @@
           <a:lstStyle/>
           <a:p>
             <a:r>
-              <a:rPr lang="en-US" dirty="0" smtClean="0"/>
-              <a:t>Your white line on a black background …</a:t>
-            </a:r>
-            <a:endParaRPr lang="en-US" dirty="0"/>
+              <a:rPr lang="en-US" sz="4400" dirty="0" smtClean="0"/>
+              <a:t>Let’s render your line in white on </a:t>
+            </a:r>
+            <a:r>
+              <a:rPr lang="en-US" sz="4400" dirty="0" smtClean="0"/>
+              <a:t>a black background …</a:t>
+            </a:r>
+            <a:endParaRPr lang="en-US" sz="4400" dirty="0"/>
           </a:p>
         </p:txBody>
       </p:sp>
@@ -5216,7 +5544,7 @@
 </p:sld>
 </file>
 
-<file path=ppt/slides/slide11.xml><?xml version="1.0" encoding="utf-8"?>
+<file path=ppt/slides/slide13.xml><?xml version="1.0" encoding="utf-8"?>
 <p:sld xmlns:a="http://schemas.openxmlformats.org/drawingml/2006/main" xmlns:r="http://schemas.openxmlformats.org/officeDocument/2006/relationships" xmlns:p="http://schemas.openxmlformats.org/presentationml/2006/main">
   <p:cSld>
     <p:spTree>
@@ -5249,10 +5577,18 @@
           <a:lstStyle/>
           <a:p>
             <a:r>
-              <a:rPr lang="en-US" dirty="0" smtClean="0"/>
-              <a:t>But if we change the colors …and the size:</a:t>
-            </a:r>
-            <a:endParaRPr lang="en-US" dirty="0"/>
+              <a:rPr lang="en-US" sz="4000" dirty="0" smtClean="0"/>
+              <a:t>We can also change the colors </a:t>
+            </a:r>
+            <a:r>
+              <a:rPr lang="en-US" sz="4000" dirty="0" smtClean="0"/>
+              <a:t>…and </a:t>
+            </a:r>
+            <a:r>
+              <a:rPr lang="en-US" sz="4000" dirty="0" smtClean="0"/>
+              <a:t>add another shape:</a:t>
+            </a:r>
+            <a:endParaRPr lang="en-US" sz="4000" dirty="0"/>
           </a:p>
         </p:txBody>
       </p:sp>
@@ -5478,7 +5814,7 @@
 </p:sld>
 </file>
 
-<file path=ppt/slides/slide12.xml><?xml version="1.0" encoding="utf-8"?>
+<file path=ppt/slides/slide14.xml><?xml version="1.0" encoding="utf-8"?>
 <p:sld xmlns:a="http://schemas.openxmlformats.org/drawingml/2006/main" xmlns:r="http://schemas.openxmlformats.org/officeDocument/2006/relationships" xmlns:p="http://schemas.openxmlformats.org/presentationml/2006/main">
   <p:cSld>
     <p:spTree>
@@ -5544,7 +5880,6 @@
               <a:rPr lang="en-US" dirty="0" smtClean="0"/>
               <a:t>Here is the same code … annotated:</a:t>
             </a:r>
-            <a:endParaRPr lang="en-US" dirty="0" smtClean="0"/>
           </a:p>
           <a:p>
             <a:pPr marL="692150" lvl="2" indent="0">
@@ -5747,444 +6082,6 @@
 </p:sld>
 </file>
 
-<file path=ppt/slides/slide13.xml><?xml version="1.0" encoding="utf-8"?>
-<p:sld xmlns:a="http://schemas.openxmlformats.org/drawingml/2006/main" xmlns:r="http://schemas.openxmlformats.org/officeDocument/2006/relationships" xmlns:p="http://schemas.openxmlformats.org/presentationml/2006/main">
-  <p:cSld>
-    <p:spTree>
-      <p:nvGrpSpPr>
-        <p:cNvPr id="1" name=""/>
-        <p:cNvGrpSpPr/>
-        <p:nvPr/>
-      </p:nvGrpSpPr>
-      <p:grpSpPr>
-        <a:xfrm>
-          <a:off x="0" y="0"/>
-          <a:ext cx="0" cy="0"/>
-          <a:chOff x="0" y="0"/>
-          <a:chExt cx="0" cy="0"/>
-        </a:xfrm>
-      </p:grpSpPr>
-      <p:sp>
-        <p:nvSpPr>
-          <p:cNvPr id="2" name="Title 1"/>
-          <p:cNvSpPr>
-            <a:spLocks noGrp="1"/>
-          </p:cNvSpPr>
-          <p:nvPr>
-            <p:ph type="title"/>
-          </p:nvPr>
-        </p:nvSpPr>
-        <p:spPr/>
-        <p:txBody>
-          <a:bodyPr/>
-          <a:lstStyle/>
-          <a:p>
-            <a:r>
-              <a:rPr lang="en-US" sz="4400" i="1" dirty="0" smtClean="0"/>
-              <a:t>We will now give you time to </a:t>
-            </a:r>
-            <a:r>
-              <a:rPr lang="en-US" sz="4400" i="1" dirty="0" smtClean="0"/>
-              <a:t>do a sketch of your own! </a:t>
-            </a:r>
-            <a:endParaRPr lang="en-US" sz="4800" i="1" dirty="0"/>
-          </a:p>
-        </p:txBody>
-      </p:sp>
-      <p:sp>
-        <p:nvSpPr>
-          <p:cNvPr id="3" name="Content Placeholder 2"/>
-          <p:cNvSpPr>
-            <a:spLocks noGrp="1"/>
-          </p:cNvSpPr>
-          <p:nvPr>
-            <p:ph idx="1"/>
-          </p:nvPr>
-        </p:nvSpPr>
-        <p:spPr>
-          <a:xfrm>
-            <a:off x="792162" y="1761565"/>
-            <a:ext cx="7570787" cy="4828245"/>
-          </a:xfrm>
-        </p:spPr>
-        <p:txBody>
-          <a:bodyPr>
-            <a:normAutofit fontScale="85000" lnSpcReduction="10000"/>
-          </a:bodyPr>
-          <a:lstStyle/>
-          <a:p>
-            <a:pPr marL="0" indent="0" algn="ctr">
-              <a:buNone/>
-            </a:pPr>
-            <a:r>
-              <a:rPr lang="en-US" sz="3300" dirty="0" smtClean="0"/>
-              <a:t>How do these shapes look … in different colors?</a:t>
-            </a:r>
-          </a:p>
-          <a:p>
-            <a:r>
-              <a:rPr lang="en-US" dirty="0" smtClean="0"/>
-              <a:t>Line</a:t>
-            </a:r>
-            <a:r>
-              <a:rPr lang="en-US" dirty="0" smtClean="0"/>
-              <a:t>: </a:t>
-            </a:r>
-            <a:r>
-              <a:rPr lang="en-US" i="1" dirty="0" smtClean="0"/>
-              <a:t>line (</a:t>
-            </a:r>
-            <a:r>
-              <a:rPr lang="en-US" i="1" dirty="0" err="1" smtClean="0"/>
-              <a:t>a,b,c,d</a:t>
-            </a:r>
-            <a:r>
-              <a:rPr lang="en-US" i="1" dirty="0" smtClean="0"/>
-              <a:t>)</a:t>
-            </a:r>
-            <a:r>
-              <a:rPr lang="en-US" dirty="0" smtClean="0"/>
-              <a:t> where </a:t>
-            </a:r>
-            <a:r>
-              <a:rPr lang="en-US" i="1" dirty="0" smtClean="0"/>
-              <a:t>(</a:t>
-            </a:r>
-            <a:r>
-              <a:rPr lang="en-US" i="1" dirty="0" err="1" smtClean="0"/>
-              <a:t>a,b</a:t>
-            </a:r>
-            <a:r>
-              <a:rPr lang="en-US" i="1" dirty="0" smtClean="0"/>
-              <a:t>)</a:t>
-            </a:r>
-            <a:r>
-              <a:rPr lang="en-US" dirty="0" smtClean="0"/>
-              <a:t> is the first point and </a:t>
-            </a:r>
-            <a:r>
-              <a:rPr lang="en-US" i="1" dirty="0" smtClean="0"/>
-              <a:t>(</a:t>
-            </a:r>
-            <a:r>
-              <a:rPr lang="en-US" i="1" dirty="0" err="1" smtClean="0"/>
-              <a:t>c,d</a:t>
-            </a:r>
-            <a:r>
-              <a:rPr lang="en-US" i="1" dirty="0" smtClean="0"/>
-              <a:t>)</a:t>
-            </a:r>
-            <a:r>
-              <a:rPr lang="en-US" dirty="0" smtClean="0"/>
-              <a:t> is the second point.</a:t>
-            </a:r>
-          </a:p>
-          <a:p>
-            <a:r>
-              <a:rPr lang="en-US" dirty="0" smtClean="0"/>
-              <a:t>Rectangle: </a:t>
-            </a:r>
-            <a:r>
-              <a:rPr lang="en-US" i="1" dirty="0" err="1" smtClean="0"/>
-              <a:t>rect</a:t>
-            </a:r>
-            <a:r>
-              <a:rPr lang="en-US" i="1" dirty="0" smtClean="0"/>
-              <a:t>(</a:t>
-            </a:r>
-            <a:r>
-              <a:rPr lang="en-US" i="1" dirty="0" err="1" smtClean="0"/>
-              <a:t>a,b,c,d</a:t>
-            </a:r>
-            <a:r>
-              <a:rPr lang="en-US" i="1" dirty="0" smtClean="0"/>
-              <a:t>)</a:t>
-            </a:r>
-            <a:r>
-              <a:rPr lang="en-US" dirty="0" smtClean="0"/>
-              <a:t> where </a:t>
-            </a:r>
-            <a:r>
-              <a:rPr lang="en-US" i="1" dirty="0" smtClean="0"/>
-              <a:t>(</a:t>
-            </a:r>
-            <a:r>
-              <a:rPr lang="en-US" i="1" dirty="0" err="1" smtClean="0"/>
-              <a:t>a,b</a:t>
-            </a:r>
-            <a:r>
-              <a:rPr lang="en-US" i="1" dirty="0" smtClean="0"/>
-              <a:t>)</a:t>
-            </a:r>
-            <a:r>
-              <a:rPr lang="en-US" dirty="0" smtClean="0"/>
-              <a:t> is the upper left corner; </a:t>
-            </a:r>
-            <a:r>
-              <a:rPr lang="en-US" i="1" dirty="0" smtClean="0"/>
-              <a:t>c</a:t>
-            </a:r>
-            <a:r>
-              <a:rPr lang="en-US" dirty="0" smtClean="0"/>
-              <a:t> is the width and </a:t>
-            </a:r>
-            <a:r>
-              <a:rPr lang="en-US" i="1" dirty="0" smtClean="0"/>
-              <a:t>d</a:t>
-            </a:r>
-            <a:r>
-              <a:rPr lang="en-US" dirty="0" smtClean="0"/>
-              <a:t> is the height.</a:t>
-            </a:r>
-          </a:p>
-          <a:p>
-            <a:r>
-              <a:rPr lang="en-US" dirty="0" smtClean="0"/>
-              <a:t>Ellipse: </a:t>
-            </a:r>
-            <a:r>
-              <a:rPr lang="en-US" i="1" dirty="0" smtClean="0"/>
-              <a:t>ellipse(</a:t>
-            </a:r>
-            <a:r>
-              <a:rPr lang="en-US" i="1" dirty="0" err="1" smtClean="0"/>
-              <a:t>a,b,c,d</a:t>
-            </a:r>
-            <a:r>
-              <a:rPr lang="en-US" i="1" dirty="0" smtClean="0"/>
-              <a:t>)</a:t>
-            </a:r>
-            <a:r>
-              <a:rPr lang="en-US" dirty="0" smtClean="0"/>
-              <a:t> where </a:t>
-            </a:r>
-            <a:r>
-              <a:rPr lang="en-US" i="1" dirty="0" smtClean="0"/>
-              <a:t>(</a:t>
-            </a:r>
-            <a:r>
-              <a:rPr lang="en-US" i="1" dirty="0" err="1" smtClean="0"/>
-              <a:t>a,b</a:t>
-            </a:r>
-            <a:r>
-              <a:rPr lang="en-US" i="1" dirty="0" smtClean="0"/>
-              <a:t>)</a:t>
-            </a:r>
-            <a:r>
-              <a:rPr lang="en-US" dirty="0" smtClean="0"/>
-              <a:t> is the center point; </a:t>
-            </a:r>
-            <a:r>
-              <a:rPr lang="en-US" i="1" dirty="0" smtClean="0"/>
-              <a:t>c</a:t>
-            </a:r>
-            <a:r>
-              <a:rPr lang="en-US" dirty="0" smtClean="0"/>
-              <a:t> is the width and </a:t>
-            </a:r>
-            <a:r>
-              <a:rPr lang="en-US" i="1" dirty="0" smtClean="0"/>
-              <a:t>d</a:t>
-            </a:r>
-            <a:r>
-              <a:rPr lang="en-US" dirty="0" smtClean="0"/>
-              <a:t> is the height. Note that if </a:t>
-            </a:r>
-            <a:r>
-              <a:rPr lang="en-US" i="1" dirty="0" smtClean="0"/>
-              <a:t>c</a:t>
-            </a:r>
-            <a:r>
-              <a:rPr lang="en-US" dirty="0" smtClean="0"/>
-              <a:t> is equal to </a:t>
-            </a:r>
-            <a:r>
-              <a:rPr lang="en-US" i="1" dirty="0" smtClean="0"/>
-              <a:t>d</a:t>
-            </a:r>
-            <a:r>
-              <a:rPr lang="en-US" dirty="0" smtClean="0"/>
-              <a:t>, </a:t>
-            </a:r>
-            <a:r>
-              <a:rPr lang="en-US" i="1" dirty="0" err="1" smtClean="0"/>
-              <a:t>elipse</a:t>
-            </a:r>
-            <a:r>
-              <a:rPr lang="en-US" dirty="0" smtClean="0"/>
-              <a:t> draws a circle.</a:t>
-            </a:r>
-          </a:p>
-          <a:p>
-            <a:r>
-              <a:rPr lang="en-US" dirty="0" smtClean="0"/>
-              <a:t>Triangle: </a:t>
-            </a:r>
-            <a:r>
-              <a:rPr lang="en-US" i="1" dirty="0" smtClean="0"/>
-              <a:t>triangle(</a:t>
-            </a:r>
-            <a:r>
-              <a:rPr lang="en-US" i="1" dirty="0" err="1" smtClean="0"/>
-              <a:t>a,b,c,d,e,f</a:t>
-            </a:r>
-            <a:r>
-              <a:rPr lang="en-US" i="1" dirty="0" smtClean="0"/>
-              <a:t>) </a:t>
-            </a:r>
-            <a:r>
-              <a:rPr lang="en-US" dirty="0" smtClean="0"/>
-              <a:t>where </a:t>
-            </a:r>
-            <a:r>
-              <a:rPr lang="en-US" i="1" dirty="0" smtClean="0"/>
-              <a:t>(</a:t>
-            </a:r>
-            <a:r>
-              <a:rPr lang="en-US" i="1" dirty="0" err="1" smtClean="0"/>
-              <a:t>a,b</a:t>
-            </a:r>
-            <a:r>
-              <a:rPr lang="en-US" i="1" dirty="0" smtClean="0"/>
-              <a:t>)</a:t>
-            </a:r>
-            <a:r>
-              <a:rPr lang="en-US" dirty="0" smtClean="0"/>
-              <a:t>, </a:t>
-            </a:r>
-            <a:r>
-              <a:rPr lang="en-US" i="1" dirty="0" smtClean="0"/>
-              <a:t>(</a:t>
-            </a:r>
-            <a:r>
-              <a:rPr lang="en-US" i="1" dirty="0" err="1" smtClean="0"/>
-              <a:t>c,d</a:t>
-            </a:r>
-            <a:r>
-              <a:rPr lang="en-US" i="1" dirty="0" smtClean="0"/>
-              <a:t>)</a:t>
-            </a:r>
-            <a:r>
-              <a:rPr lang="en-US" dirty="0" smtClean="0"/>
-              <a:t> and </a:t>
-            </a:r>
-            <a:r>
-              <a:rPr lang="en-US" i="1" dirty="0" smtClean="0"/>
-              <a:t>(</a:t>
-            </a:r>
-            <a:r>
-              <a:rPr lang="en-US" i="1" dirty="0" err="1" smtClean="0"/>
-              <a:t>e,f</a:t>
-            </a:r>
-            <a:r>
-              <a:rPr lang="en-US" i="1" dirty="0" smtClean="0"/>
-              <a:t>)</a:t>
-            </a:r>
-            <a:r>
-              <a:rPr lang="en-US" dirty="0" smtClean="0"/>
-              <a:t> are the points that create the triangle.</a:t>
-            </a:r>
-          </a:p>
-          <a:p>
-            <a:endParaRPr lang="en-US" dirty="0"/>
-          </a:p>
-        </p:txBody>
-      </p:sp>
-    </p:spTree>
-    <p:extLst>
-      <p:ext uri="{BB962C8B-B14F-4D97-AF65-F5344CB8AC3E}">
-        <p14:creationId xmlns:p14="http://schemas.microsoft.com/office/powerpoint/2010/main" val="91583783"/>
-      </p:ext>
-    </p:extLst>
-  </p:cSld>
-  <p:clrMapOvr>
-    <a:masterClrMapping/>
-  </p:clrMapOvr>
-</p:sld>
-</file>
-
-<file path=ppt/slides/slide14.xml><?xml version="1.0" encoding="utf-8"?>
-<p:sld xmlns:a="http://schemas.openxmlformats.org/drawingml/2006/main" xmlns:r="http://schemas.openxmlformats.org/officeDocument/2006/relationships" xmlns:p="http://schemas.openxmlformats.org/presentationml/2006/main">
-  <p:cSld>
-    <p:spTree>
-      <p:nvGrpSpPr>
-        <p:cNvPr id="1" name=""/>
-        <p:cNvGrpSpPr/>
-        <p:nvPr/>
-      </p:nvGrpSpPr>
-      <p:grpSpPr>
-        <a:xfrm>
-          <a:off x="0" y="0"/>
-          <a:ext cx="0" cy="0"/>
-          <a:chOff x="0" y="0"/>
-          <a:chExt cx="0" cy="0"/>
-        </a:xfrm>
-      </p:grpSpPr>
-      <p:sp>
-        <p:nvSpPr>
-          <p:cNvPr id="2" name="Title 1"/>
-          <p:cNvSpPr>
-            <a:spLocks noGrp="1"/>
-          </p:cNvSpPr>
-          <p:nvPr>
-            <p:ph type="ctrTitle"/>
-          </p:nvPr>
-        </p:nvSpPr>
-        <p:spPr/>
-        <p:txBody>
-          <a:bodyPr/>
-          <a:lstStyle/>
-          <a:p>
-            <a:r>
-              <a:rPr lang="en-US" dirty="0" smtClean="0"/>
-              <a:t>Introduction to Processing: Part 2</a:t>
-            </a:r>
-            <a:endParaRPr lang="en-US" dirty="0"/>
-          </a:p>
-        </p:txBody>
-      </p:sp>
-      <p:sp>
-        <p:nvSpPr>
-          <p:cNvPr id="3" name="Subtitle 2"/>
-          <p:cNvSpPr>
-            <a:spLocks noGrp="1"/>
-          </p:cNvSpPr>
-          <p:nvPr>
-            <p:ph type="subTitle" idx="1"/>
-          </p:nvPr>
-        </p:nvSpPr>
-        <p:spPr/>
-        <p:txBody>
-          <a:bodyPr/>
-          <a:lstStyle/>
-          <a:p>
-            <a:r>
-              <a:rPr lang="en-US" dirty="0" smtClean="0"/>
-              <a:t>Tech Focus 3</a:t>
-            </a:r>
-          </a:p>
-          <a:p>
-            <a:r>
-              <a:rPr lang="en-US" dirty="0" smtClean="0"/>
-              <a:t>September 26, 2015</a:t>
-            </a:r>
-            <a:endParaRPr lang="en-US" dirty="0"/>
-          </a:p>
-        </p:txBody>
-      </p:sp>
-    </p:spTree>
-    <p:extLst>
-      <p:ext uri="{BB962C8B-B14F-4D97-AF65-F5344CB8AC3E}">
-        <p14:creationId xmlns:p14="http://schemas.microsoft.com/office/powerpoint/2010/main" val="250366495"/>
-      </p:ext>
-    </p:extLst>
-  </p:cSld>
-  <p:clrMapOvr>
-    <a:masterClrMapping/>
-  </p:clrMapOvr>
-</p:sld>
-</file>
-
 <file path=ppt/slides/slide15.xml><?xml version="1.0" encoding="utf-8"?>
 <p:sld xmlns:a="http://schemas.openxmlformats.org/drawingml/2006/main" xmlns:r="http://schemas.openxmlformats.org/officeDocument/2006/relationships" xmlns:p="http://schemas.openxmlformats.org/presentationml/2006/main">
   <p:cSld>
@@ -6217,7 +6114,11 @@
           <a:bodyPr/>
           <a:lstStyle/>
           <a:p>
-            <a:endParaRPr lang="en-US"/>
+            <a:r>
+              <a:rPr lang="en-US" sz="4400" i="1" dirty="0" smtClean="0"/>
+              <a:t>We will now give you time to do a sketch of your own! </a:t>
+            </a:r>
+            <a:endParaRPr lang="en-US" sz="4800" i="1" dirty="0"/>
           </a:p>
         </p:txBody>
       </p:sp>
@@ -6231,19 +6132,328 @@
             <p:ph idx="1"/>
           </p:nvPr>
         </p:nvSpPr>
-        <p:spPr/>
-        <p:txBody>
-          <a:bodyPr/>
+        <p:spPr>
+          <a:xfrm>
+            <a:off x="792162" y="1761565"/>
+            <a:ext cx="7570787" cy="4828245"/>
+          </a:xfrm>
+        </p:spPr>
+        <p:txBody>
+          <a:bodyPr>
+            <a:normAutofit fontScale="85000" lnSpcReduction="20000"/>
+          </a:bodyPr>
           <a:lstStyle/>
           <a:p>
-            <a:endParaRPr lang="en-US"/>
+            <a:pPr marL="0" indent="0" algn="ctr">
+              <a:buNone/>
+            </a:pPr>
+            <a:r>
+              <a:rPr lang="en-US" sz="3300" dirty="0" smtClean="0"/>
+              <a:t>How do these shapes look … in different colors?</a:t>
+            </a:r>
+          </a:p>
+          <a:p>
+            <a:r>
+              <a:rPr lang="en-US" dirty="0" smtClean="0"/>
+              <a:t>Line: </a:t>
+            </a:r>
+            <a:r>
+              <a:rPr lang="en-US" i="1" dirty="0" smtClean="0"/>
+              <a:t>line (</a:t>
+            </a:r>
+            <a:r>
+              <a:rPr lang="en-US" i="1" dirty="0" err="1" smtClean="0"/>
+              <a:t>a,b,c,d</a:t>
+            </a:r>
+            <a:r>
+              <a:rPr lang="en-US" i="1" dirty="0" smtClean="0"/>
+              <a:t>)</a:t>
+            </a:r>
+            <a:r>
+              <a:rPr lang="en-US" dirty="0" smtClean="0"/>
+              <a:t> where </a:t>
+            </a:r>
+            <a:r>
+              <a:rPr lang="en-US" i="1" dirty="0" smtClean="0"/>
+              <a:t>(</a:t>
+            </a:r>
+            <a:r>
+              <a:rPr lang="en-US" i="1" dirty="0" err="1" smtClean="0"/>
+              <a:t>a,b</a:t>
+            </a:r>
+            <a:r>
+              <a:rPr lang="en-US" i="1" dirty="0" smtClean="0"/>
+              <a:t>)</a:t>
+            </a:r>
+            <a:r>
+              <a:rPr lang="en-US" dirty="0" smtClean="0"/>
+              <a:t> is the first point and </a:t>
+            </a:r>
+            <a:r>
+              <a:rPr lang="en-US" i="1" dirty="0" smtClean="0"/>
+              <a:t>(</a:t>
+            </a:r>
+            <a:r>
+              <a:rPr lang="en-US" i="1" dirty="0" err="1" smtClean="0"/>
+              <a:t>c,d</a:t>
+            </a:r>
+            <a:r>
+              <a:rPr lang="en-US" i="1" dirty="0" smtClean="0"/>
+              <a:t>)</a:t>
+            </a:r>
+            <a:r>
+              <a:rPr lang="en-US" dirty="0" smtClean="0"/>
+              <a:t> is the second point.</a:t>
+            </a:r>
+          </a:p>
+          <a:p>
+            <a:r>
+              <a:rPr lang="en-US" dirty="0" smtClean="0"/>
+              <a:t>Rectangle: </a:t>
+            </a:r>
+            <a:r>
+              <a:rPr lang="en-US" i="1" dirty="0" err="1" smtClean="0"/>
+              <a:t>rect</a:t>
+            </a:r>
+            <a:r>
+              <a:rPr lang="en-US" i="1" dirty="0" smtClean="0"/>
+              <a:t>(</a:t>
+            </a:r>
+            <a:r>
+              <a:rPr lang="en-US" i="1" dirty="0" err="1" smtClean="0"/>
+              <a:t>a,b,c,d</a:t>
+            </a:r>
+            <a:r>
+              <a:rPr lang="en-US" i="1" dirty="0" smtClean="0"/>
+              <a:t>)</a:t>
+            </a:r>
+            <a:r>
+              <a:rPr lang="en-US" dirty="0" smtClean="0"/>
+              <a:t> where </a:t>
+            </a:r>
+            <a:r>
+              <a:rPr lang="en-US" i="1" dirty="0" smtClean="0"/>
+              <a:t>(</a:t>
+            </a:r>
+            <a:r>
+              <a:rPr lang="en-US" i="1" dirty="0" err="1" smtClean="0"/>
+              <a:t>a,b</a:t>
+            </a:r>
+            <a:r>
+              <a:rPr lang="en-US" i="1" dirty="0" smtClean="0"/>
+              <a:t>)</a:t>
+            </a:r>
+            <a:r>
+              <a:rPr lang="en-US" dirty="0" smtClean="0"/>
+              <a:t> is the upper left corner; </a:t>
+            </a:r>
+            <a:r>
+              <a:rPr lang="en-US" i="1" dirty="0" smtClean="0"/>
+              <a:t>c</a:t>
+            </a:r>
+            <a:r>
+              <a:rPr lang="en-US" dirty="0" smtClean="0"/>
+              <a:t> is the width </a:t>
+            </a:r>
+            <a:r>
+              <a:rPr lang="en-US" dirty="0" smtClean="0"/>
+              <a:t>in pixels and </a:t>
+            </a:r>
+            <a:r>
+              <a:rPr lang="en-US" i="1" dirty="0" smtClean="0"/>
+              <a:t>d</a:t>
+            </a:r>
+            <a:r>
+              <a:rPr lang="en-US" dirty="0" smtClean="0"/>
+              <a:t> is the </a:t>
+            </a:r>
+            <a:r>
+              <a:rPr lang="en-US" dirty="0" smtClean="0"/>
+              <a:t>height in pixels.</a:t>
+            </a:r>
+            <a:endParaRPr lang="en-US" dirty="0" smtClean="0"/>
+          </a:p>
+          <a:p>
+            <a:r>
+              <a:rPr lang="en-US" dirty="0" smtClean="0"/>
+              <a:t>Ellipse: </a:t>
+            </a:r>
+            <a:r>
+              <a:rPr lang="en-US" i="1" dirty="0" smtClean="0"/>
+              <a:t>ellipse(</a:t>
+            </a:r>
+            <a:r>
+              <a:rPr lang="en-US" i="1" dirty="0" err="1" smtClean="0"/>
+              <a:t>a,b,c,d</a:t>
+            </a:r>
+            <a:r>
+              <a:rPr lang="en-US" i="1" dirty="0" smtClean="0"/>
+              <a:t>)</a:t>
+            </a:r>
+            <a:r>
+              <a:rPr lang="en-US" dirty="0" smtClean="0"/>
+              <a:t> where </a:t>
+            </a:r>
+            <a:r>
+              <a:rPr lang="en-US" i="1" dirty="0" smtClean="0"/>
+              <a:t>(</a:t>
+            </a:r>
+            <a:r>
+              <a:rPr lang="en-US" i="1" dirty="0" err="1" smtClean="0"/>
+              <a:t>a,b</a:t>
+            </a:r>
+            <a:r>
+              <a:rPr lang="en-US" i="1" dirty="0" smtClean="0"/>
+              <a:t>)</a:t>
+            </a:r>
+            <a:r>
+              <a:rPr lang="en-US" dirty="0" smtClean="0"/>
+              <a:t> is the center point; </a:t>
+            </a:r>
+            <a:r>
+              <a:rPr lang="en-US" i="1" dirty="0" smtClean="0"/>
+              <a:t>c</a:t>
+            </a:r>
+            <a:r>
+              <a:rPr lang="en-US" dirty="0" smtClean="0"/>
+              <a:t> is the width </a:t>
+            </a:r>
+            <a:r>
+              <a:rPr lang="en-US" dirty="0" smtClean="0"/>
+              <a:t>in pixels and </a:t>
+            </a:r>
+            <a:r>
+              <a:rPr lang="en-US" i="1" dirty="0" smtClean="0"/>
+              <a:t>d</a:t>
+            </a:r>
+            <a:r>
+              <a:rPr lang="en-US" dirty="0" smtClean="0"/>
+              <a:t> is the </a:t>
+            </a:r>
+            <a:r>
+              <a:rPr lang="en-US" dirty="0" smtClean="0"/>
+              <a:t>height in pixels. </a:t>
+            </a:r>
+            <a:r>
+              <a:rPr lang="en-US" dirty="0" smtClean="0"/>
+              <a:t>Note that if </a:t>
+            </a:r>
+            <a:r>
+              <a:rPr lang="en-US" i="1" dirty="0" smtClean="0"/>
+              <a:t>c</a:t>
+            </a:r>
+            <a:r>
+              <a:rPr lang="en-US" dirty="0" smtClean="0"/>
+              <a:t> is equal to </a:t>
+            </a:r>
+            <a:r>
+              <a:rPr lang="en-US" i="1" dirty="0" smtClean="0"/>
+              <a:t>d</a:t>
+            </a:r>
+            <a:r>
+              <a:rPr lang="en-US" dirty="0" smtClean="0"/>
+              <a:t>, </a:t>
+            </a:r>
+            <a:r>
+              <a:rPr lang="en-US" i="1" dirty="0" smtClean="0"/>
+              <a:t>ellipse</a:t>
+            </a:r>
+            <a:r>
+              <a:rPr lang="en-US" dirty="0" smtClean="0"/>
+              <a:t> </a:t>
+            </a:r>
+            <a:r>
+              <a:rPr lang="en-US" dirty="0" smtClean="0"/>
+              <a:t>draws a circle.</a:t>
+            </a:r>
+          </a:p>
+          <a:p>
+            <a:r>
+              <a:rPr lang="en-US" dirty="0" smtClean="0"/>
+              <a:t>Triangle: </a:t>
+            </a:r>
+            <a:r>
+              <a:rPr lang="en-US" i="1" dirty="0" smtClean="0"/>
+              <a:t>triangle(</a:t>
+            </a:r>
+            <a:r>
+              <a:rPr lang="en-US" i="1" dirty="0" err="1" smtClean="0"/>
+              <a:t>a,b,c,d,e,f</a:t>
+            </a:r>
+            <a:r>
+              <a:rPr lang="en-US" i="1" dirty="0" smtClean="0"/>
+              <a:t>) </a:t>
+            </a:r>
+            <a:r>
+              <a:rPr lang="en-US" dirty="0" smtClean="0"/>
+              <a:t>where </a:t>
+            </a:r>
+            <a:r>
+              <a:rPr lang="en-US" i="1" dirty="0" smtClean="0"/>
+              <a:t>(</a:t>
+            </a:r>
+            <a:r>
+              <a:rPr lang="en-US" i="1" dirty="0" err="1" smtClean="0"/>
+              <a:t>a,b</a:t>
+            </a:r>
+            <a:r>
+              <a:rPr lang="en-US" i="1" dirty="0" smtClean="0"/>
+              <a:t>)</a:t>
+            </a:r>
+            <a:r>
+              <a:rPr lang="en-US" dirty="0" smtClean="0"/>
+              <a:t>, </a:t>
+            </a:r>
+            <a:r>
+              <a:rPr lang="en-US" i="1" dirty="0" smtClean="0"/>
+              <a:t>(</a:t>
+            </a:r>
+            <a:r>
+              <a:rPr lang="en-US" i="1" dirty="0" err="1" smtClean="0"/>
+              <a:t>c,d</a:t>
+            </a:r>
+            <a:r>
+              <a:rPr lang="en-US" i="1" dirty="0" smtClean="0"/>
+              <a:t>)</a:t>
+            </a:r>
+            <a:r>
+              <a:rPr lang="en-US" dirty="0" smtClean="0"/>
+              <a:t> and </a:t>
+            </a:r>
+            <a:r>
+              <a:rPr lang="en-US" i="1" dirty="0" smtClean="0"/>
+              <a:t>(</a:t>
+            </a:r>
+            <a:r>
+              <a:rPr lang="en-US" i="1" dirty="0" err="1" smtClean="0"/>
+              <a:t>e,f</a:t>
+            </a:r>
+            <a:r>
+              <a:rPr lang="en-US" i="1" dirty="0" smtClean="0"/>
+              <a:t>)</a:t>
+            </a:r>
+            <a:r>
+              <a:rPr lang="en-US" dirty="0" smtClean="0"/>
+              <a:t> </a:t>
+            </a:r>
+            <a:r>
+              <a:rPr lang="en-US" dirty="0" smtClean="0"/>
+              <a:t>represent the three points that </a:t>
+            </a:r>
+            <a:r>
+              <a:rPr lang="en-US" dirty="0" smtClean="0"/>
+              <a:t>create the triangle.</a:t>
+            </a:r>
+          </a:p>
+          <a:p>
+            <a:endParaRPr lang="en-US" dirty="0"/>
           </a:p>
         </p:txBody>
       </p:sp>
     </p:spTree>
     <p:extLst>
       <p:ext uri="{BB962C8B-B14F-4D97-AF65-F5344CB8AC3E}">
-        <p14:creationId xmlns:p14="http://schemas.microsoft.com/office/powerpoint/2010/main" val="968812114"/>
+        <p14:creationId xmlns:p14="http://schemas.microsoft.com/office/powerpoint/2010/main" val="91583783"/>
       </p:ext>
     </p:extLst>
   </p:cSld>
@@ -6277,7 +6487,7 @@
             <a:spLocks noGrp="1"/>
           </p:cNvSpPr>
           <p:nvPr>
-            <p:ph type="title"/>
+            <p:ph type="ctrTitle"/>
           </p:nvPr>
         </p:nvSpPr>
         <p:spPr/>
@@ -6285,18 +6495,22 @@
           <a:bodyPr/>
           <a:lstStyle/>
           <a:p>
-            <a:endParaRPr lang="en-US"/>
-          </a:p>
-        </p:txBody>
-      </p:sp>
-      <p:sp>
-        <p:nvSpPr>
-          <p:cNvPr id="3" name="Content Placeholder 2"/>
-          <p:cNvSpPr>
-            <a:spLocks noGrp="1"/>
-          </p:cNvSpPr>
-          <p:nvPr>
-            <p:ph idx="1"/>
+            <a:r>
+              <a:rPr lang="en-US" dirty="0" smtClean="0"/>
+              <a:t>Introduction to Processing: Part 2</a:t>
+            </a:r>
+            <a:endParaRPr lang="en-US" dirty="0"/>
+          </a:p>
+        </p:txBody>
+      </p:sp>
+      <p:sp>
+        <p:nvSpPr>
+          <p:cNvPr id="3" name="Subtitle 2"/>
+          <p:cNvSpPr>
+            <a:spLocks noGrp="1"/>
+          </p:cNvSpPr>
+          <p:nvPr>
+            <p:ph type="subTitle" idx="1"/>
           </p:nvPr>
         </p:nvSpPr>
         <p:spPr/>
@@ -6304,14 +6518,24 @@
           <a:bodyPr/>
           <a:lstStyle/>
           <a:p>
-            <a:endParaRPr lang="en-US"/>
+            <a:r>
+              <a:rPr lang="en-US" dirty="0" smtClean="0"/>
+              <a:t>Tech Focus 3</a:t>
+            </a:r>
+          </a:p>
+          <a:p>
+            <a:r>
+              <a:rPr lang="en-US" dirty="0" smtClean="0"/>
+              <a:t>September 26, 2015</a:t>
+            </a:r>
+            <a:endParaRPr lang="en-US" dirty="0"/>
           </a:p>
         </p:txBody>
       </p:sp>
     </p:spTree>
     <p:extLst>
       <p:ext uri="{BB962C8B-B14F-4D97-AF65-F5344CB8AC3E}">
-        <p14:creationId xmlns:p14="http://schemas.microsoft.com/office/powerpoint/2010/main" val="3643397802"/>
+        <p14:creationId xmlns:p14="http://schemas.microsoft.com/office/powerpoint/2010/main" val="250366495"/>
       </p:ext>
     </p:extLst>
   </p:cSld>
@@ -6379,7 +6603,7 @@
     </p:spTree>
     <p:extLst>
       <p:ext uri="{BB962C8B-B14F-4D97-AF65-F5344CB8AC3E}">
-        <p14:creationId xmlns:p14="http://schemas.microsoft.com/office/powerpoint/2010/main" val="528213199"/>
+        <p14:creationId xmlns:p14="http://schemas.microsoft.com/office/powerpoint/2010/main" val="968812114"/>
       </p:ext>
     </p:extLst>
   </p:cSld>
@@ -6421,11 +6645,7 @@
           <a:bodyPr/>
           <a:lstStyle/>
           <a:p>
-            <a:r>
-              <a:rPr lang="en-US" dirty="0" smtClean="0"/>
-              <a:t>Bibliography</a:t>
-            </a:r>
-            <a:endParaRPr lang="en-US" dirty="0"/>
+            <a:endParaRPr lang="en-US"/>
           </a:p>
         </p:txBody>
       </p:sp>
@@ -6441,135 +6661,17 @@
         </p:nvSpPr>
         <p:spPr/>
         <p:txBody>
-          <a:bodyPr>
-            <a:normAutofit lnSpcReduction="10000"/>
-          </a:bodyPr>
+          <a:bodyPr/>
           <a:lstStyle/>
           <a:p>
-            <a:pPr marL="0" indent="0" algn="ctr">
-              <a:buNone/>
-            </a:pPr>
-            <a:r>
-              <a:rPr lang="en-US" b="1" dirty="0" smtClean="0"/>
-              <a:t>The Processing Site:</a:t>
-            </a:r>
-          </a:p>
-          <a:p>
-            <a:r>
-              <a:rPr lang="en-US" dirty="0"/>
-              <a:t>Opening Page </a:t>
-            </a:r>
-            <a:r>
-              <a:rPr lang="en-US" dirty="0">
-                <a:hlinkClick r:id="rId2"/>
-              </a:rPr>
-              <a:t>https://</a:t>
-            </a:r>
-            <a:r>
-              <a:rPr lang="en-US" dirty="0" smtClean="0">
-                <a:hlinkClick r:id="rId2"/>
-              </a:rPr>
-              <a:t>processing.org</a:t>
-            </a:r>
-            <a:endParaRPr lang="en-US" dirty="0" smtClean="0"/>
-          </a:p>
-          <a:p>
-            <a:r>
-              <a:rPr lang="en-US" dirty="0"/>
-              <a:t>Tutorials </a:t>
-            </a:r>
-            <a:r>
-              <a:rPr lang="en-US" dirty="0">
-                <a:hlinkClick r:id="rId3"/>
-              </a:rPr>
-              <a:t>https://processing.org/tutorials</a:t>
-            </a:r>
-            <a:r>
-              <a:rPr lang="en-US" dirty="0" smtClean="0">
-                <a:hlinkClick r:id="rId3"/>
-              </a:rPr>
-              <a:t>/</a:t>
-            </a:r>
-            <a:r>
-              <a:rPr lang="en-US" dirty="0" smtClean="0"/>
-              <a:t> </a:t>
-            </a:r>
-          </a:p>
-          <a:p>
-            <a:r>
-              <a:rPr lang="en-US" dirty="0"/>
-              <a:t>Examples </a:t>
-            </a:r>
-            <a:r>
-              <a:rPr lang="en-US" dirty="0">
-                <a:hlinkClick r:id="rId4"/>
-              </a:rPr>
-              <a:t>https://processing.org/examples</a:t>
-            </a:r>
-            <a:r>
-              <a:rPr lang="en-US" dirty="0" smtClean="0">
-                <a:hlinkClick r:id="rId4"/>
-              </a:rPr>
-              <a:t>/</a:t>
-            </a:r>
-            <a:r>
-              <a:rPr lang="en-US" dirty="0" smtClean="0"/>
-              <a:t> or … </a:t>
-            </a:r>
-            <a:r>
-              <a:rPr lang="en-US" i="1" dirty="0" smtClean="0"/>
-              <a:t>open </a:t>
-            </a:r>
-            <a:r>
-              <a:rPr lang="en-US" i="1" dirty="0"/>
-              <a:t>Processing and </a:t>
-            </a:r>
-            <a:r>
-              <a:rPr lang="en-US" i="1" dirty="0" err="1"/>
-              <a:t>naviage</a:t>
-            </a:r>
-            <a:r>
-              <a:rPr lang="en-US" i="1" dirty="0"/>
-              <a:t> to FILE / </a:t>
-            </a:r>
-            <a:r>
-              <a:rPr lang="en-US" i="1" dirty="0" smtClean="0"/>
-              <a:t>EXAMPLES.</a:t>
-            </a:r>
-          </a:p>
-          <a:p>
-            <a:r>
-              <a:rPr lang="en-US" dirty="0"/>
-              <a:t>Exhibition</a:t>
-            </a:r>
-            <a:r>
-              <a:rPr lang="en-US" i="1" dirty="0"/>
-              <a:t> </a:t>
-            </a:r>
-            <a:r>
-              <a:rPr lang="en-US" i="1" dirty="0">
-                <a:hlinkClick r:id="rId5"/>
-              </a:rPr>
-              <a:t>https://processing.org/exhibition</a:t>
-            </a:r>
-            <a:r>
-              <a:rPr lang="en-US" i="1" dirty="0" smtClean="0">
-                <a:hlinkClick r:id="rId5"/>
-              </a:rPr>
-              <a:t>/</a:t>
-            </a:r>
-            <a:r>
-              <a:rPr lang="en-US" i="1" dirty="0" smtClean="0"/>
-              <a:t> </a:t>
-            </a:r>
-            <a:endParaRPr lang="en-US" i="1" dirty="0"/>
+            <a:endParaRPr lang="en-US"/>
           </a:p>
         </p:txBody>
       </p:sp>
     </p:spTree>
     <p:extLst>
       <p:ext uri="{BB962C8B-B14F-4D97-AF65-F5344CB8AC3E}">
-        <p14:creationId xmlns:p14="http://schemas.microsoft.com/office/powerpoint/2010/main" val="325812743"/>
+        <p14:creationId xmlns:p14="http://schemas.microsoft.com/office/powerpoint/2010/main" val="3643397802"/>
       </p:ext>
     </p:extLst>
   </p:cSld>
@@ -6611,11 +6713,7 @@
           <a:bodyPr/>
           <a:lstStyle/>
           <a:p>
-            <a:r>
-              <a:rPr lang="en-US" dirty="0" smtClean="0"/>
-              <a:t>Bibliography</a:t>
-            </a:r>
-            <a:endParaRPr lang="en-US" dirty="0"/>
+            <a:endParaRPr lang="en-US"/>
           </a:p>
         </p:txBody>
       </p:sp>
@@ -6631,110 +6729,17 @@
         </p:nvSpPr>
         <p:spPr/>
         <p:txBody>
-          <a:bodyPr>
-            <a:normAutofit lnSpcReduction="10000"/>
-          </a:bodyPr>
+          <a:bodyPr/>
           <a:lstStyle/>
           <a:p>
-            <a:pPr marL="0" indent="0" algn="ctr">
-              <a:buNone/>
-            </a:pPr>
-            <a:r>
-              <a:rPr lang="en-US" b="1" dirty="0" smtClean="0"/>
-              <a:t>Exhibitions and Inspiration</a:t>
-            </a:r>
-          </a:p>
-          <a:p>
-            <a:r>
-              <a:rPr lang="en-US" dirty="0" err="1" smtClean="0"/>
-              <a:t>OpenProcessing</a:t>
-            </a:r>
-            <a:r>
-              <a:rPr lang="en-US" dirty="0"/>
-              <a:t> </a:t>
-            </a:r>
-            <a:r>
-              <a:rPr lang="en-US" dirty="0">
-                <a:hlinkClick r:id="rId2"/>
-              </a:rPr>
-              <a:t>http://</a:t>
-            </a:r>
-            <a:r>
-              <a:rPr lang="en-US" dirty="0" smtClean="0">
-                <a:hlinkClick r:id="rId2"/>
-              </a:rPr>
-              <a:t>www.openprocessing.org</a:t>
-            </a:r>
-            <a:r>
-              <a:rPr lang="en-US" dirty="0" smtClean="0"/>
-              <a:t> </a:t>
-            </a:r>
-          </a:p>
-          <a:p>
-            <a:r>
-              <a:rPr lang="en-US" dirty="0" err="1" smtClean="0"/>
-              <a:t>OpenProcessing</a:t>
-            </a:r>
-            <a:r>
-              <a:rPr lang="en-US" dirty="0" smtClean="0"/>
-              <a:t> </a:t>
-            </a:r>
-            <a:r>
-              <a:rPr lang="en-US" dirty="0"/>
-              <a:t>Data Visualizations </a:t>
-            </a:r>
-            <a:r>
-              <a:rPr lang="en-US" dirty="0">
-                <a:hlinkClick r:id="rId3"/>
-              </a:rPr>
-              <a:t>http://www.openprocessing.org/collection/</a:t>
-            </a:r>
-            <a:r>
-              <a:rPr lang="en-US" dirty="0" smtClean="0">
-                <a:hlinkClick r:id="rId3"/>
-              </a:rPr>
-              <a:t>1122</a:t>
-            </a:r>
-            <a:r>
-              <a:rPr lang="en-US" dirty="0" smtClean="0"/>
-              <a:t> </a:t>
-            </a:r>
-          </a:p>
-          <a:p>
-            <a:r>
-              <a:rPr lang="en-US" dirty="0" smtClean="0"/>
-              <a:t>Ben Fry’s </a:t>
-            </a:r>
-            <a:r>
-              <a:rPr lang="en-US" dirty="0"/>
-              <a:t>Project Page </a:t>
-            </a:r>
-            <a:r>
-              <a:rPr lang="en-US" dirty="0">
-                <a:hlinkClick r:id="rId4"/>
-              </a:rPr>
-              <a:t>http://benfry.com/projects</a:t>
-            </a:r>
-            <a:r>
-              <a:rPr lang="en-US" dirty="0" smtClean="0">
-                <a:hlinkClick r:id="rId4"/>
-              </a:rPr>
-              <a:t>/</a:t>
-            </a:r>
-            <a:r>
-              <a:rPr lang="en-US" dirty="0" smtClean="0"/>
-              <a:t> </a:t>
-            </a:r>
-          </a:p>
-          <a:p>
-            <a:endParaRPr lang="en-US" i="1" dirty="0"/>
+            <a:endParaRPr lang="en-US"/>
           </a:p>
         </p:txBody>
       </p:sp>
     </p:spTree>
     <p:extLst>
       <p:ext uri="{BB962C8B-B14F-4D97-AF65-F5344CB8AC3E}">
-        <p14:creationId xmlns:p14="http://schemas.microsoft.com/office/powerpoint/2010/main" val="168351568"/>
+        <p14:creationId xmlns:p14="http://schemas.microsoft.com/office/powerpoint/2010/main" val="528213199"/>
       </p:ext>
     </p:extLst>
   </p:cSld>
@@ -6862,6 +6867,361 @@
     <p:extLst>
       <p:ext uri="{BB962C8B-B14F-4D97-AF65-F5344CB8AC3E}">
         <p14:creationId xmlns:p14="http://schemas.microsoft.com/office/powerpoint/2010/main" val="3755664089"/>
+      </p:ext>
+    </p:extLst>
+  </p:cSld>
+  <p:clrMapOvr>
+    <a:masterClrMapping/>
+  </p:clrMapOvr>
+</p:sld>
+</file>
+
+<file path=ppt/slides/slide20.xml><?xml version="1.0" encoding="utf-8"?>
+<p:sld xmlns:a="http://schemas.openxmlformats.org/drawingml/2006/main" xmlns:r="http://schemas.openxmlformats.org/officeDocument/2006/relationships" xmlns:p="http://schemas.openxmlformats.org/presentationml/2006/main">
+  <p:cSld>
+    <p:spTree>
+      <p:nvGrpSpPr>
+        <p:cNvPr id="1" name=""/>
+        <p:cNvGrpSpPr/>
+        <p:nvPr/>
+      </p:nvGrpSpPr>
+      <p:grpSpPr>
+        <a:xfrm>
+          <a:off x="0" y="0"/>
+          <a:ext cx="0" cy="0"/>
+          <a:chOff x="0" y="0"/>
+          <a:chExt cx="0" cy="0"/>
+        </a:xfrm>
+      </p:grpSpPr>
+      <p:sp>
+        <p:nvSpPr>
+          <p:cNvPr id="2" name="Title 1"/>
+          <p:cNvSpPr>
+            <a:spLocks noGrp="1"/>
+          </p:cNvSpPr>
+          <p:nvPr>
+            <p:ph type="title"/>
+          </p:nvPr>
+        </p:nvSpPr>
+        <p:spPr/>
+        <p:txBody>
+          <a:bodyPr/>
+          <a:lstStyle/>
+          <a:p>
+            <a:r>
+              <a:rPr lang="en-US" dirty="0" smtClean="0"/>
+              <a:t>Bibliography</a:t>
+            </a:r>
+            <a:endParaRPr lang="en-US" dirty="0"/>
+          </a:p>
+        </p:txBody>
+      </p:sp>
+      <p:sp>
+        <p:nvSpPr>
+          <p:cNvPr id="3" name="Content Placeholder 2"/>
+          <p:cNvSpPr>
+            <a:spLocks noGrp="1"/>
+          </p:cNvSpPr>
+          <p:nvPr>
+            <p:ph idx="1"/>
+          </p:nvPr>
+        </p:nvSpPr>
+        <p:spPr/>
+        <p:txBody>
+          <a:bodyPr>
+            <a:normAutofit lnSpcReduction="10000"/>
+          </a:bodyPr>
+          <a:lstStyle/>
+          <a:p>
+            <a:pPr marL="0" indent="0" algn="ctr">
+              <a:buNone/>
+            </a:pPr>
+            <a:r>
+              <a:rPr lang="en-US" b="1" dirty="0" smtClean="0"/>
+              <a:t>The Processing Site:</a:t>
+            </a:r>
+          </a:p>
+          <a:p>
+            <a:r>
+              <a:rPr lang="en-US" dirty="0"/>
+              <a:t>Opening Page </a:t>
+            </a:r>
+            <a:r>
+              <a:rPr lang="en-US" dirty="0">
+                <a:hlinkClick r:id="rId2"/>
+              </a:rPr>
+              <a:t>https://</a:t>
+            </a:r>
+            <a:r>
+              <a:rPr lang="en-US" dirty="0" smtClean="0">
+                <a:hlinkClick r:id="rId2"/>
+              </a:rPr>
+              <a:t>processing.org</a:t>
+            </a:r>
+            <a:endParaRPr lang="en-US" dirty="0" smtClean="0"/>
+          </a:p>
+          <a:p>
+            <a:r>
+              <a:rPr lang="en-US" dirty="0"/>
+              <a:t>Tutorials </a:t>
+            </a:r>
+            <a:r>
+              <a:rPr lang="en-US" dirty="0">
+                <a:hlinkClick r:id="rId3"/>
+              </a:rPr>
+              <a:t>https://processing.org/tutorials</a:t>
+            </a:r>
+            <a:r>
+              <a:rPr lang="en-US" dirty="0" smtClean="0">
+                <a:hlinkClick r:id="rId3"/>
+              </a:rPr>
+              <a:t>/</a:t>
+            </a:r>
+            <a:r>
+              <a:rPr lang="en-US" dirty="0" smtClean="0"/>
+              <a:t> </a:t>
+            </a:r>
+          </a:p>
+          <a:p>
+            <a:r>
+              <a:rPr lang="en-US" dirty="0"/>
+              <a:t>Examples </a:t>
+            </a:r>
+            <a:r>
+              <a:rPr lang="en-US" dirty="0">
+                <a:hlinkClick r:id="rId4"/>
+              </a:rPr>
+              <a:t>https://processing.org/examples</a:t>
+            </a:r>
+            <a:r>
+              <a:rPr lang="en-US" dirty="0" smtClean="0">
+                <a:hlinkClick r:id="rId4"/>
+              </a:rPr>
+              <a:t>/</a:t>
+            </a:r>
+            <a:r>
+              <a:rPr lang="en-US" dirty="0" smtClean="0"/>
+              <a:t> or … </a:t>
+            </a:r>
+            <a:r>
+              <a:rPr lang="en-US" i="1" dirty="0" smtClean="0"/>
+              <a:t>open </a:t>
+            </a:r>
+            <a:r>
+              <a:rPr lang="en-US" i="1" dirty="0"/>
+              <a:t>Processing and </a:t>
+            </a:r>
+            <a:r>
+              <a:rPr lang="en-US" i="1" dirty="0" err="1"/>
+              <a:t>naviage</a:t>
+            </a:r>
+            <a:r>
+              <a:rPr lang="en-US" i="1" dirty="0"/>
+              <a:t> to FILE / </a:t>
+            </a:r>
+            <a:r>
+              <a:rPr lang="en-US" i="1" dirty="0" smtClean="0"/>
+              <a:t>EXAMPLES.</a:t>
+            </a:r>
+          </a:p>
+          <a:p>
+            <a:r>
+              <a:rPr lang="en-US" dirty="0"/>
+              <a:t>Exhibition</a:t>
+            </a:r>
+            <a:r>
+              <a:rPr lang="en-US" i="1" dirty="0"/>
+              <a:t> </a:t>
+            </a:r>
+            <a:r>
+              <a:rPr lang="en-US" i="1" dirty="0">
+                <a:hlinkClick r:id="rId5"/>
+              </a:rPr>
+              <a:t>https://processing.org/exhibition</a:t>
+            </a:r>
+            <a:r>
+              <a:rPr lang="en-US" i="1" dirty="0" smtClean="0">
+                <a:hlinkClick r:id="rId5"/>
+              </a:rPr>
+              <a:t>/</a:t>
+            </a:r>
+            <a:r>
+              <a:rPr lang="en-US" i="1" dirty="0" smtClean="0"/>
+              <a:t> </a:t>
+            </a:r>
+            <a:endParaRPr lang="en-US" i="1" dirty="0"/>
+          </a:p>
+        </p:txBody>
+      </p:sp>
+    </p:spTree>
+    <p:extLst>
+      <p:ext uri="{BB962C8B-B14F-4D97-AF65-F5344CB8AC3E}">
+        <p14:creationId xmlns:p14="http://schemas.microsoft.com/office/powerpoint/2010/main" val="325812743"/>
+      </p:ext>
+    </p:extLst>
+  </p:cSld>
+  <p:clrMapOvr>
+    <a:masterClrMapping/>
+  </p:clrMapOvr>
+</p:sld>
+</file>
+
+<file path=ppt/slides/slide21.xml><?xml version="1.0" encoding="utf-8"?>
+<p:sld xmlns:a="http://schemas.openxmlformats.org/drawingml/2006/main" xmlns:r="http://schemas.openxmlformats.org/officeDocument/2006/relationships" xmlns:p="http://schemas.openxmlformats.org/presentationml/2006/main">
+  <p:cSld>
+    <p:spTree>
+      <p:nvGrpSpPr>
+        <p:cNvPr id="1" name=""/>
+        <p:cNvGrpSpPr/>
+        <p:nvPr/>
+      </p:nvGrpSpPr>
+      <p:grpSpPr>
+        <a:xfrm>
+          <a:off x="0" y="0"/>
+          <a:ext cx="0" cy="0"/>
+          <a:chOff x="0" y="0"/>
+          <a:chExt cx="0" cy="0"/>
+        </a:xfrm>
+      </p:grpSpPr>
+      <p:sp>
+        <p:nvSpPr>
+          <p:cNvPr id="2" name="Title 1"/>
+          <p:cNvSpPr>
+            <a:spLocks noGrp="1"/>
+          </p:cNvSpPr>
+          <p:nvPr>
+            <p:ph type="title"/>
+          </p:nvPr>
+        </p:nvSpPr>
+        <p:spPr/>
+        <p:txBody>
+          <a:bodyPr/>
+          <a:lstStyle/>
+          <a:p>
+            <a:r>
+              <a:rPr lang="en-US" dirty="0" smtClean="0"/>
+              <a:t>Bibliography</a:t>
+            </a:r>
+            <a:endParaRPr lang="en-US" dirty="0"/>
+          </a:p>
+        </p:txBody>
+      </p:sp>
+      <p:sp>
+        <p:nvSpPr>
+          <p:cNvPr id="3" name="Content Placeholder 2"/>
+          <p:cNvSpPr>
+            <a:spLocks noGrp="1"/>
+          </p:cNvSpPr>
+          <p:nvPr>
+            <p:ph idx="1"/>
+          </p:nvPr>
+        </p:nvSpPr>
+        <p:spPr/>
+        <p:txBody>
+          <a:bodyPr>
+            <a:normAutofit lnSpcReduction="10000"/>
+          </a:bodyPr>
+          <a:lstStyle/>
+          <a:p>
+            <a:pPr marL="0" indent="0" algn="ctr">
+              <a:buNone/>
+            </a:pPr>
+            <a:r>
+              <a:rPr lang="en-US" b="1" dirty="0" smtClean="0"/>
+              <a:t>Exhibitions and Inspiration</a:t>
+            </a:r>
+          </a:p>
+          <a:p>
+            <a:r>
+              <a:rPr lang="en-US" dirty="0" err="1" smtClean="0"/>
+              <a:t>OpenProcessing</a:t>
+            </a:r>
+            <a:r>
+              <a:rPr lang="en-US" dirty="0"/>
+              <a:t> </a:t>
+            </a:r>
+            <a:r>
+              <a:rPr lang="en-US" dirty="0">
+                <a:hlinkClick r:id="rId2"/>
+              </a:rPr>
+              <a:t>http://</a:t>
+            </a:r>
+            <a:r>
+              <a:rPr lang="en-US" dirty="0" smtClean="0">
+                <a:hlinkClick r:id="rId2"/>
+              </a:rPr>
+              <a:t>www.openprocessing.org</a:t>
+            </a:r>
+            <a:r>
+              <a:rPr lang="en-US" dirty="0" smtClean="0"/>
+              <a:t> </a:t>
+            </a:r>
+          </a:p>
+          <a:p>
+            <a:r>
+              <a:rPr lang="en-US" dirty="0" err="1" smtClean="0"/>
+              <a:t>OpenProcessing</a:t>
+            </a:r>
+            <a:r>
+              <a:rPr lang="en-US" dirty="0" smtClean="0"/>
+              <a:t> </a:t>
+            </a:r>
+            <a:r>
+              <a:rPr lang="en-US" dirty="0"/>
+              <a:t>Data Visualizations </a:t>
+            </a:r>
+            <a:r>
+              <a:rPr lang="en-US" dirty="0">
+                <a:hlinkClick r:id="rId3"/>
+              </a:rPr>
+              <a:t>http://www.openprocessing.org/collection/</a:t>
+            </a:r>
+            <a:r>
+              <a:rPr lang="en-US" dirty="0" smtClean="0">
+                <a:hlinkClick r:id="rId3"/>
+              </a:rPr>
+              <a:t>1122</a:t>
+            </a:r>
+            <a:r>
+              <a:rPr lang="en-US" dirty="0" smtClean="0"/>
+              <a:t> </a:t>
+            </a:r>
+          </a:p>
+          <a:p>
+            <a:r>
+              <a:rPr lang="en-US" dirty="0" smtClean="0"/>
+              <a:t>Ben Fry’s </a:t>
+            </a:r>
+            <a:r>
+              <a:rPr lang="en-US" dirty="0"/>
+              <a:t>Project Page </a:t>
+            </a:r>
+            <a:r>
+              <a:rPr lang="en-US" dirty="0">
+                <a:hlinkClick r:id="rId4"/>
+              </a:rPr>
+              <a:t>http://benfry.com/projects</a:t>
+            </a:r>
+            <a:r>
+              <a:rPr lang="en-US" dirty="0" smtClean="0">
+                <a:hlinkClick r:id="rId4"/>
+              </a:rPr>
+              <a:t>/</a:t>
+            </a:r>
+            <a:r>
+              <a:rPr lang="en-US" dirty="0" smtClean="0"/>
+              <a:t> </a:t>
+            </a:r>
+          </a:p>
+          <a:p>
+            <a:endParaRPr lang="en-US" i="1" dirty="0"/>
+          </a:p>
+        </p:txBody>
+      </p:sp>
+    </p:spTree>
+    <p:extLst>
+      <p:ext uri="{BB962C8B-B14F-4D97-AF65-F5344CB8AC3E}">
+        <p14:creationId xmlns:p14="http://schemas.microsoft.com/office/powerpoint/2010/main" val="168351568"/>
       </p:ext>
     </p:extLst>
   </p:cSld>
@@ -7790,8 +8150,23 @@
               <a:rPr lang="en-US" dirty="0" smtClean="0">
                 <a:cs typeface="Courier New"/>
               </a:rPr>
-              <a:t>… and here is your “sketch”: </a:t>
-            </a:r>
+              <a:t>… and here is your </a:t>
+            </a:r>
+            <a:r>
+              <a:rPr lang="en-US" i="1" dirty="0" smtClean="0">
+                <a:cs typeface="Courier New"/>
+              </a:rPr>
+              <a:t>sketch</a:t>
+            </a:r>
+            <a:r>
+              <a:rPr lang="en-US" dirty="0" smtClean="0">
+                <a:cs typeface="Courier New"/>
+              </a:rPr>
+              <a:t>: </a:t>
+            </a:r>
+            <a:endParaRPr lang="en-US" dirty="0" smtClean="0">
+              <a:cs typeface="Courier New"/>
+            </a:endParaRPr>
           </a:p>
           <a:p>
             <a:pPr marL="0" indent="0">
@@ -7930,9 +8305,16 @@
           <a:p>
             <a:r>
               <a:rPr lang="en-US" dirty="0" smtClean="0"/>
-              <a:t>Adding to your sketch</a:t>
-            </a:r>
-            <a:endParaRPr lang="en-US" dirty="0"/>
+              <a:t>Drawing a line: </a:t>
+            </a:r>
+            <a:br>
+              <a:rPr lang="en-US" dirty="0" smtClean="0"/>
+            </a:br>
+            <a:r>
+              <a:rPr lang="en-US" sz="4400" i="1" dirty="0" smtClean="0"/>
+              <a:t>Let’s look at the code.</a:t>
+            </a:r>
+            <a:endParaRPr lang="en-US" i="1" dirty="0"/>
           </a:p>
         </p:txBody>
       </p:sp>
@@ -7946,53 +8328,241 @@
             <p:ph idx="1"/>
           </p:nvPr>
         </p:nvSpPr>
-        <p:spPr/>
-        <p:txBody>
-          <a:bodyPr/>
+        <p:spPr>
+          <a:xfrm>
+            <a:off x="792162" y="1761565"/>
+            <a:ext cx="7772263" cy="4713844"/>
+          </a:xfrm>
+        </p:spPr>
+        <p:txBody>
+          <a:bodyPr>
+            <a:normAutofit lnSpcReduction="10000"/>
+          </a:bodyPr>
           <a:lstStyle/>
           <a:p>
-            <a:r>
-              <a:rPr lang="en-US" dirty="0" smtClean="0"/>
-              <a:t>Next let’s add:</a:t>
-            </a:r>
-          </a:p>
-          <a:p>
-            <a:pPr lvl="1"/>
-            <a:r>
-              <a:rPr lang="en-US" dirty="0" smtClean="0"/>
-              <a:t>The size of the drawing in pixels</a:t>
-            </a:r>
-          </a:p>
-          <a:p>
-            <a:pPr lvl="1"/>
-            <a:r>
-              <a:rPr lang="en-US" dirty="0" smtClean="0"/>
-              <a:t>More lines and other shapes</a:t>
-            </a:r>
-          </a:p>
-          <a:p>
-            <a:pPr lvl="1"/>
-            <a:r>
-              <a:rPr lang="en-US" dirty="0" smtClean="0"/>
-              <a:t>Color</a:t>
-            </a:r>
-          </a:p>
-          <a:p>
-            <a:pPr lvl="1"/>
-            <a:r>
-              <a:rPr lang="en-US" dirty="0" smtClean="0"/>
-              <a:t>Comments into our code</a:t>
-            </a:r>
-          </a:p>
-          <a:p>
-            <a:endParaRPr lang="en-US" dirty="0"/>
-          </a:p>
-        </p:txBody>
-      </p:sp>
+            <a:pPr marL="0" indent="0">
+              <a:buNone/>
+            </a:pPr>
+            <a:r>
+              <a:rPr lang="en-US" dirty="0">
+                <a:latin typeface="Courier New"/>
+                <a:cs typeface="Courier New"/>
+              </a:rPr>
+              <a:t>line(0,0,200,200); </a:t>
+            </a:r>
+            <a:endParaRPr lang="en-US" dirty="0">
+              <a:cs typeface="Courier New"/>
+            </a:endParaRPr>
+          </a:p>
+          <a:p>
+            <a:pPr marL="0" indent="0">
+              <a:buNone/>
+            </a:pPr>
+            <a:r>
+              <a:rPr lang="en-US" dirty="0" smtClean="0">
+                <a:cs typeface="Courier New"/>
+              </a:rPr>
+              <a:t>Here is how a line is defined in Processing:</a:t>
+            </a:r>
+          </a:p>
+          <a:p>
+            <a:pPr marL="0" indent="0">
+              <a:buNone/>
+            </a:pPr>
+            <a:r>
+              <a:rPr lang="en-US" i="1" dirty="0" smtClean="0"/>
+              <a:t>line </a:t>
+            </a:r>
+            <a:r>
+              <a:rPr lang="en-US" i="1" dirty="0"/>
+              <a:t>(</a:t>
+            </a:r>
+            <a:r>
+              <a:rPr lang="en-US" i="1" dirty="0" err="1"/>
+              <a:t>a,b,c,d</a:t>
+            </a:r>
+            <a:r>
+              <a:rPr lang="en-US" i="1" dirty="0"/>
+              <a:t>)</a:t>
+            </a:r>
+            <a:r>
+              <a:rPr lang="en-US" dirty="0"/>
+              <a:t> </a:t>
+            </a:r>
+            <a:r>
+              <a:rPr lang="en-US" dirty="0" smtClean="0"/>
+              <a:t>is defined where </a:t>
+            </a:r>
+            <a:r>
+              <a:rPr lang="en-US" i="1" dirty="0"/>
+              <a:t>(</a:t>
+            </a:r>
+            <a:r>
+              <a:rPr lang="en-US" i="1" dirty="0" err="1"/>
+              <a:t>a,b</a:t>
+            </a:r>
+            <a:r>
+              <a:rPr lang="en-US" i="1" dirty="0"/>
+              <a:t>)</a:t>
+            </a:r>
+            <a:r>
+              <a:rPr lang="en-US" dirty="0"/>
+              <a:t> </a:t>
+            </a:r>
+            <a:r>
+              <a:rPr lang="en-US" dirty="0" smtClean="0"/>
+              <a:t>are the </a:t>
+            </a:r>
+            <a:r>
+              <a:rPr lang="en-US" i="1" dirty="0" smtClean="0"/>
+              <a:t>(</a:t>
+            </a:r>
+            <a:r>
+              <a:rPr lang="en-US" i="1" dirty="0" err="1" smtClean="0"/>
+              <a:t>x,y</a:t>
+            </a:r>
+            <a:r>
+              <a:rPr lang="en-US" i="1" dirty="0" smtClean="0"/>
+              <a:t>)</a:t>
+            </a:r>
+            <a:r>
+              <a:rPr lang="en-US" dirty="0" smtClean="0"/>
+              <a:t> coordinates of </a:t>
+            </a:r>
+            <a:r>
+              <a:rPr lang="en-US" dirty="0"/>
+              <a:t>the first point and </a:t>
+            </a:r>
+            <a:r>
+              <a:rPr lang="en-US" i="1" dirty="0"/>
+              <a:t>(</a:t>
+            </a:r>
+            <a:r>
+              <a:rPr lang="en-US" i="1" dirty="0" err="1"/>
+              <a:t>c,d</a:t>
+            </a:r>
+            <a:r>
+              <a:rPr lang="en-US" i="1" dirty="0"/>
+              <a:t>)</a:t>
+            </a:r>
+            <a:r>
+              <a:rPr lang="en-US" dirty="0"/>
+              <a:t> </a:t>
+            </a:r>
+            <a:r>
+              <a:rPr lang="en-US" dirty="0" smtClean="0"/>
+              <a:t>are the </a:t>
+            </a:r>
+            <a:r>
+              <a:rPr lang="en-US" i="1" dirty="0" smtClean="0"/>
+              <a:t>(</a:t>
+            </a:r>
+            <a:r>
+              <a:rPr lang="en-US" i="1" dirty="0" err="1" smtClean="0"/>
+              <a:t>x,y</a:t>
+            </a:r>
+            <a:r>
+              <a:rPr lang="en-US" i="1" dirty="0" smtClean="0"/>
+              <a:t>)</a:t>
+            </a:r>
+            <a:r>
+              <a:rPr lang="en-US" dirty="0" smtClean="0"/>
+              <a:t> coordinates of </a:t>
+            </a:r>
+            <a:r>
+              <a:rPr lang="en-US" dirty="0"/>
+              <a:t>the second point.</a:t>
+            </a:r>
+          </a:p>
+          <a:p>
+            <a:pPr marL="0" indent="0">
+              <a:buNone/>
+            </a:pPr>
+            <a:endParaRPr lang="en-US" dirty="0" smtClean="0">
+              <a:cs typeface="Courier New"/>
+            </a:endParaRPr>
+          </a:p>
+          <a:p>
+            <a:pPr marL="0" indent="0">
+              <a:buNone/>
+            </a:pPr>
+            <a:endParaRPr lang="en-US" dirty="0">
+              <a:cs typeface="Courier New"/>
+            </a:endParaRPr>
+          </a:p>
+          <a:p>
+            <a:pPr marL="0" indent="0">
+              <a:buNone/>
+            </a:pPr>
+            <a:r>
+              <a:rPr lang="en-US" sz="2000" dirty="0">
+                <a:cs typeface="Courier New"/>
+              </a:rPr>
+              <a:t>See </a:t>
+            </a:r>
+            <a:r>
+              <a:rPr lang="en-US" sz="2000" dirty="0">
+                <a:cs typeface="Courier New"/>
+                <a:hlinkClick r:id="rId2"/>
+              </a:rPr>
+              <a:t>https://processing.org/reference/line_.</a:t>
+            </a:r>
+            <a:r>
+              <a:rPr lang="en-US" sz="2000" dirty="0" smtClean="0">
+                <a:cs typeface="Courier New"/>
+                <a:hlinkClick r:id="rId2"/>
+              </a:rPr>
+              <a:t>html</a:t>
+            </a:r>
+            <a:r>
+              <a:rPr lang="en-US" sz="2000" dirty="0" smtClean="0">
+                <a:cs typeface="Courier New"/>
+              </a:rPr>
+              <a:t> </a:t>
+            </a:r>
+            <a:endParaRPr lang="en-US" sz="2000" dirty="0" smtClean="0">
+              <a:cs typeface="Courier New"/>
+            </a:endParaRPr>
+          </a:p>
+        </p:txBody>
+      </p:sp>
+      <p:pic>
+        <p:nvPicPr>
+          <p:cNvPr id="6" name="Picture 5"/>
+          <p:cNvPicPr/>
+          <p:nvPr/>
+        </p:nvPicPr>
+        <p:blipFill>
+          <a:blip r:embed="rId3">
+            <a:extLst>
+              <a:ext uri="{28A0092B-C50C-407E-A947-70E740481C1C}">
+                <a14:useLocalDpi xmlns:a14="http://schemas.microsoft.com/office/drawing/2010/main" val="0"/>
+              </a:ext>
+            </a:extLst>
+          </a:blip>
+          <a:srcRect/>
+          <a:stretch>
+            <a:fillRect/>
+          </a:stretch>
+        </p:blipFill>
+        <p:spPr bwMode="auto">
+          <a:xfrm>
+            <a:off x="6699249" y="4331238"/>
+            <a:ext cx="1663700" cy="1981200"/>
+          </a:xfrm>
+          <a:prstGeom prst="rect">
+            <a:avLst/>
+          </a:prstGeom>
+          <a:noFill/>
+          <a:ln>
+            <a:noFill/>
+          </a:ln>
+        </p:spPr>
+      </p:pic>
     </p:spTree>
     <p:extLst>
       <p:ext uri="{BB962C8B-B14F-4D97-AF65-F5344CB8AC3E}">
-        <p14:creationId xmlns:p14="http://schemas.microsoft.com/office/powerpoint/2010/main" val="2185405032"/>
+        <p14:creationId xmlns:p14="http://schemas.microsoft.com/office/powerpoint/2010/main" val="2267018909"/>
       </p:ext>
     </p:extLst>
   </p:cSld>
@@ -8036,9 +8606,13 @@
           <a:p>
             <a:r>
               <a:rPr lang="en-US" dirty="0" smtClean="0"/>
-              <a:t>A Word About Color	</a:t>
-            </a:r>
-            <a:endParaRPr lang="en-US" dirty="0"/>
+              <a:t>Drawing a </a:t>
+            </a:r>
+            <a:r>
+              <a:rPr lang="en-US" dirty="0" smtClean="0"/>
+              <a:t>line</a:t>
+            </a:r>
+            <a:endParaRPr lang="en-US" i="1" dirty="0"/>
           </a:p>
         </p:txBody>
       </p:sp>
@@ -8054,139 +8628,160 @@
         </p:nvSpPr>
         <p:spPr>
           <a:xfrm>
-            <a:off x="792162" y="1553355"/>
-            <a:ext cx="7570787" cy="5096435"/>
+            <a:off x="792162" y="1761565"/>
+            <a:ext cx="7772263" cy="4713844"/>
           </a:xfrm>
         </p:spPr>
         <p:txBody>
           <a:bodyPr>
-            <a:normAutofit fontScale="92500" lnSpcReduction="20000"/>
+            <a:normAutofit/>
           </a:bodyPr>
           <a:lstStyle/>
           <a:p>
-            <a:r>
-              <a:rPr lang="en-US" dirty="0" smtClean="0"/>
-              <a:t>We will be using color today in RGB mode (</a:t>
-            </a:r>
-            <a:r>
-              <a:rPr lang="en-US" i="1" dirty="0" smtClean="0"/>
-              <a:t>red, green, </a:t>
-            </a:r>
-            <a:r>
-              <a:rPr lang="en-US" dirty="0" smtClean="0"/>
-              <a:t>and</a:t>
-            </a:r>
-            <a:r>
-              <a:rPr lang="en-US" i="1" dirty="0" smtClean="0"/>
-              <a:t> blue</a:t>
-            </a:r>
-            <a:r>
-              <a:rPr lang="en-US" dirty="0" smtClean="0"/>
-              <a:t>) and we will measure each of the three colors in a range of 0-255. (</a:t>
-            </a:r>
-            <a:r>
-              <a:rPr lang="en-US" i="1" dirty="0" smtClean="0"/>
-              <a:t>Why??</a:t>
-            </a:r>
-            <a:r>
-              <a:rPr lang="en-US" dirty="0" smtClean="0"/>
-              <a:t>)</a:t>
-            </a:r>
-          </a:p>
-          <a:p>
-            <a:r>
-              <a:rPr lang="en-US" dirty="0" smtClean="0"/>
-              <a:t>Color is defined for both the </a:t>
-            </a:r>
-            <a:r>
-              <a:rPr lang="en-US" b="1" i="1" dirty="0" smtClean="0"/>
-              <a:t>stroke</a:t>
-            </a:r>
-            <a:r>
-              <a:rPr lang="en-US" dirty="0" smtClean="0"/>
-              <a:t> (lines and/or outlines) and </a:t>
-            </a:r>
-            <a:r>
-              <a:rPr lang="en-US" b="1" i="1" dirty="0" smtClean="0"/>
-              <a:t>fill</a:t>
-            </a:r>
-            <a:r>
-              <a:rPr lang="en-US" dirty="0" smtClean="0"/>
-              <a:t> (contents of a shape)</a:t>
-            </a:r>
-          </a:p>
-          <a:p>
-            <a:r>
-              <a:rPr lang="en-US" dirty="0" smtClean="0"/>
-              <a:t>(Hint: use </a:t>
-            </a:r>
-            <a:r>
-              <a:rPr lang="en-US" b="1" i="1" dirty="0" err="1" smtClean="0"/>
-              <a:t>nofill</a:t>
-            </a:r>
-            <a:r>
-              <a:rPr lang="en-US" b="1" i="1" dirty="0" smtClean="0"/>
-              <a:t>()</a:t>
-            </a:r>
-            <a:r>
-              <a:rPr lang="en-US" dirty="0" smtClean="0"/>
-              <a:t> to leave a shape with only an outline!)</a:t>
-            </a:r>
-          </a:p>
-          <a:p>
-            <a:r>
-              <a:rPr lang="en-US" dirty="0" smtClean="0"/>
-              <a:t>Black can be expressed as (0) and white can be expressed as (255).</a:t>
-            </a:r>
-          </a:p>
-          <a:p>
-            <a:r>
-              <a:rPr lang="en-US" dirty="0" smtClean="0"/>
-              <a:t>Note there is </a:t>
-            </a:r>
-            <a:r>
-              <a:rPr lang="en-US" dirty="0" err="1" smtClean="0"/>
-              <a:t>aProcessing</a:t>
-            </a:r>
-            <a:r>
-              <a:rPr lang="en-US" dirty="0" smtClean="0"/>
-              <a:t>  </a:t>
-            </a:r>
-            <a:r>
-              <a:rPr lang="en-US" dirty="0"/>
-              <a:t>tutorial </a:t>
-            </a:r>
-            <a:r>
-              <a:rPr lang="en-US" dirty="0" smtClean="0"/>
-              <a:t>on color posted </a:t>
-            </a:r>
-            <a:r>
-              <a:rPr lang="en-US" dirty="0"/>
-              <a:t>to </a:t>
-            </a:r>
+            <a:pPr marL="0" indent="0">
+              <a:buNone/>
+            </a:pPr>
             <a:r>
               <a:rPr lang="en-US" dirty="0">
+                <a:latin typeface="Courier New"/>
+                <a:cs typeface="Courier New"/>
+              </a:rPr>
+              <a:t>line(0,0,200,200); </a:t>
+            </a:r>
+            <a:endParaRPr lang="en-US" dirty="0">
+              <a:cs typeface="Courier New"/>
+            </a:endParaRPr>
+          </a:p>
+          <a:p>
+            <a:pPr marL="0" indent="0">
+              <a:buNone/>
+            </a:pPr>
+            <a:r>
+              <a:rPr lang="en-US" dirty="0" smtClean="0">
+                <a:cs typeface="Courier New"/>
+              </a:rPr>
+              <a:t>In programming terms, </a:t>
+            </a:r>
+            <a:r>
+              <a:rPr lang="en-US" dirty="0" smtClean="0">
+                <a:latin typeface="Courier New"/>
+                <a:cs typeface="Courier New"/>
+              </a:rPr>
+              <a:t>line</a:t>
+            </a:r>
+            <a:r>
+              <a:rPr lang="en-US" dirty="0" smtClean="0">
+                <a:cs typeface="Courier New"/>
+              </a:rPr>
+              <a:t> is a function and </a:t>
+            </a:r>
+            <a:r>
+              <a:rPr lang="en-US" dirty="0" smtClean="0">
+                <a:latin typeface="Courier New"/>
+                <a:cs typeface="Courier New"/>
+              </a:rPr>
+              <a:t>0,0, 200 and 200 </a:t>
+            </a:r>
+            <a:r>
+              <a:rPr lang="en-US" dirty="0" smtClean="0">
+                <a:cs typeface="Courier New"/>
+              </a:rPr>
+              <a:t>are the parameters.</a:t>
+            </a:r>
+            <a:endParaRPr lang="en-US" dirty="0"/>
+          </a:p>
+          <a:p>
+            <a:pPr marL="0" indent="0">
+              <a:buNone/>
+            </a:pPr>
+            <a:r>
+              <a:rPr lang="en-US" dirty="0" smtClean="0">
+                <a:cs typeface="Courier New"/>
+              </a:rPr>
+              <a:t>The processing environment offers many functions. You can also write your own!</a:t>
+            </a:r>
+          </a:p>
+          <a:p>
+            <a:pPr marL="0" indent="0">
+              <a:buNone/>
+            </a:pPr>
+            <a:endParaRPr lang="en-US" dirty="0">
+              <a:cs typeface="Courier New"/>
+            </a:endParaRPr>
+          </a:p>
+          <a:p>
+            <a:pPr marL="0" indent="0">
+              <a:buNone/>
+            </a:pPr>
+            <a:r>
+              <a:rPr lang="en-US" sz="2000" dirty="0" smtClean="0">
+                <a:cs typeface="Courier New"/>
+              </a:rPr>
+              <a:t>See </a:t>
+            </a:r>
+            <a:r>
+              <a:rPr lang="en-US" sz="2000" dirty="0">
+                <a:cs typeface="Courier New"/>
                 <a:hlinkClick r:id="rId2"/>
               </a:rPr>
-              <a:t>https://www.processing.org/tutorials/color</a:t>
-            </a:r>
-            <a:r>
-              <a:rPr lang="en-US" dirty="0" smtClean="0">
+              <a:t>https://processing.org/reference/line_.</a:t>
+            </a:r>
+            <a:r>
+              <a:rPr lang="en-US" sz="2000" dirty="0" smtClean="0">
+                <a:cs typeface="Courier New"/>
                 <a:hlinkClick r:id="rId2"/>
               </a:rPr>
-              <a:t>/</a:t>
-            </a:r>
-            <a:r>
-              <a:rPr lang="en-US" dirty="0" smtClean="0"/>
+              <a:t>html</a:t>
+            </a:r>
+            <a:r>
+              <a:rPr lang="en-US" sz="2000" dirty="0" smtClean="0">
+                <a:cs typeface="Courier New"/>
+              </a:rPr>
               <a:t> </a:t>
             </a:r>
-          </a:p>
-        </p:txBody>
-      </p:sp>
+            <a:endParaRPr lang="en-US" sz="2000" dirty="0" smtClean="0">
+              <a:cs typeface="Courier New"/>
+            </a:endParaRPr>
+          </a:p>
+        </p:txBody>
+      </p:sp>
+      <p:pic>
+        <p:nvPicPr>
+          <p:cNvPr id="6" name="Picture 5"/>
+          <p:cNvPicPr/>
+          <p:nvPr/>
+        </p:nvPicPr>
+        <p:blipFill>
+          <a:blip r:embed="rId3">
+            <a:extLst>
+              <a:ext uri="{28A0092B-C50C-407E-A947-70E740481C1C}">
+                <a14:useLocalDpi xmlns:a14="http://schemas.microsoft.com/office/drawing/2010/main" val="0"/>
+              </a:ext>
+            </a:extLst>
+          </a:blip>
+          <a:srcRect/>
+          <a:stretch>
+            <a:fillRect/>
+          </a:stretch>
+        </p:blipFill>
+        <p:spPr bwMode="auto">
+          <a:xfrm>
+            <a:off x="6900725" y="4494209"/>
+            <a:ext cx="1663700" cy="1981200"/>
+          </a:xfrm>
+          <a:prstGeom prst="rect">
+            <a:avLst/>
+          </a:prstGeom>
+          <a:noFill/>
+          <a:ln>
+            <a:noFill/>
+          </a:ln>
+        </p:spPr>
+      </p:pic>
     </p:spTree>
     <p:extLst>
       <p:ext uri="{BB962C8B-B14F-4D97-AF65-F5344CB8AC3E}">
-        <p14:creationId xmlns:p14="http://schemas.microsoft.com/office/powerpoint/2010/main" val="3232505315"/>
+        <p14:creationId xmlns:p14="http://schemas.microsoft.com/office/powerpoint/2010/main" val="1475796654"/>
       </p:ext>
     </p:extLst>
   </p:cSld>

</xml_diff>

<commit_message>
Final touches for now
Added the file names for the sketches; several spellings changed.
</commit_message>
<xml_diff>
--- a/Processing_Presentation_TF3_DE_notes.pptx
+++ b/Processing_Presentation_TF3_DE_notes.pptx
@@ -39,12 +39,13 @@
     <p:sldId id="289" r:id="rId33"/>
     <p:sldId id="290" r:id="rId34"/>
     <p:sldId id="291" r:id="rId35"/>
-    <p:sldId id="292" r:id="rId36"/>
-    <p:sldId id="293" r:id="rId37"/>
-    <p:sldId id="273" r:id="rId38"/>
-    <p:sldId id="274" r:id="rId39"/>
-    <p:sldId id="278" r:id="rId40"/>
-    <p:sldId id="298" r:id="rId41"/>
+    <p:sldId id="299" r:id="rId36"/>
+    <p:sldId id="292" r:id="rId37"/>
+    <p:sldId id="293" r:id="rId38"/>
+    <p:sldId id="273" r:id="rId39"/>
+    <p:sldId id="274" r:id="rId40"/>
+    <p:sldId id="278" r:id="rId41"/>
+    <p:sldId id="298" r:id="rId42"/>
   </p:sldIdLst>
   <p:sldSz cx="9144000" cy="6858000" type="screen4x3"/>
   <p:notesSz cx="6858000" cy="9144000"/>
@@ -5343,13 +5344,65 @@
         </p:nvSpPr>
         <p:spPr/>
         <p:txBody>
-          <a:bodyPr/>
+          <a:bodyPr>
+            <a:normAutofit fontScale="92500" lnSpcReduction="10000"/>
+          </a:bodyPr>
           <a:lstStyle/>
           <a:p>
             <a:r>
               <a:rPr lang="en-US" dirty="0" smtClean="0"/>
-              <a:t>Next let’s add:</a:t>
-            </a:r>
+              <a:t>When you create a sketch, it is saved in a folder along with a .</a:t>
+            </a:r>
+            <a:r>
+              <a:rPr lang="en-US" dirty="0" err="1" smtClean="0"/>
+              <a:t>pde</a:t>
+            </a:r>
+            <a:r>
+              <a:rPr lang="en-US" dirty="0" smtClean="0"/>
+              <a:t> file of the same name. For example, the above drawing is named </a:t>
+            </a:r>
+            <a:r>
+              <a:rPr lang="en-US" dirty="0" smtClean="0">
+                <a:latin typeface="Courier New"/>
+                <a:cs typeface="Courier New"/>
+              </a:rPr>
+              <a:t>sketch_1_line.pde</a:t>
+            </a:r>
+            <a:r>
+              <a:rPr lang="en-US" dirty="0" smtClean="0"/>
+              <a:t> </a:t>
+            </a:r>
+            <a:r>
+              <a:rPr lang="en-US" dirty="0" smtClean="0"/>
+              <a:t>on your drive.</a:t>
+            </a:r>
+            <a:endParaRPr lang="en-US" dirty="0" smtClean="0"/>
+          </a:p>
+          <a:p>
+            <a:r>
+              <a:rPr lang="en-US" dirty="0" smtClean="0"/>
+              <a:t>Next </a:t>
+            </a:r>
+            <a:r>
+              <a:rPr lang="en-US" dirty="0" smtClean="0"/>
+              <a:t>let’s </a:t>
+            </a:r>
+            <a:r>
+              <a:rPr lang="en-US" dirty="0" smtClean="0"/>
+              <a:t>add the following and call it </a:t>
+            </a:r>
+            <a:r>
+              <a:rPr lang="en-US" dirty="0" smtClean="0">
+                <a:latin typeface="Courier New"/>
+                <a:cs typeface="Courier New"/>
+              </a:rPr>
+              <a:t>sketch_2_line</a:t>
+            </a:r>
+            <a:r>
+              <a:rPr lang="en-US" dirty="0" smtClean="0"/>
+              <a:t>:</a:t>
+            </a:r>
+            <a:endParaRPr lang="en-US" dirty="0" smtClean="0"/>
           </a:p>
           <a:p>
             <a:pPr lvl="1"/>
@@ -5810,8 +5863,24 @@
           <a:p>
             <a:r>
               <a:rPr lang="en-US" dirty="0" smtClean="0"/>
-              <a:t>The following code gives you:</a:t>
-            </a:r>
+              <a:t>The following code </a:t>
+            </a:r>
+            <a:r>
+              <a:rPr lang="en-US" dirty="0" smtClean="0"/>
+              <a:t>(saved on your drive as </a:t>
+            </a:r>
+            <a:r>
+              <a:rPr lang="en-US" dirty="0" smtClean="0">
+                <a:latin typeface="Courier New"/>
+                <a:cs typeface="Courier New"/>
+              </a:rPr>
+              <a:t>sketch_3_circle</a:t>
+            </a:r>
+            <a:r>
+              <a:rPr lang="en-US" dirty="0" smtClean="0"/>
+              <a:t> ) renders:</a:t>
+            </a:r>
+            <a:endParaRPr lang="en-US" dirty="0" smtClean="0"/>
           </a:p>
           <a:p>
             <a:pPr marL="692150" lvl="2" indent="0">
@@ -7194,7 +7263,15 @@
           <a:p>
             <a:r>
               <a:rPr lang="en-US" dirty="0" smtClean="0"/>
-              <a:t>So, too, software art and digital-born art have developed as artists continue to work in new technologies. </a:t>
+              <a:t>So, too, software art and digital-born art have </a:t>
+            </a:r>
+            <a:r>
+              <a:rPr lang="en-US" dirty="0" smtClean="0"/>
+              <a:t>evolved as </a:t>
+            </a:r>
+            <a:r>
+              <a:rPr lang="en-US" dirty="0" smtClean="0"/>
+              <a:t>artists continue to work in new technologies. </a:t>
             </a:r>
           </a:p>
           <a:p>
@@ -7386,7 +7463,15 @@
           <a:p>
             <a:r>
               <a:rPr lang="en-US" dirty="0" smtClean="0"/>
-              <a:t>In the second part of today’s class, I would like for you to have an opportunity explore facets of drawing in </a:t>
+              <a:t>In the second part of today’s class, I would like for you to </a:t>
+            </a:r>
+            <a:r>
+              <a:rPr lang="en-US" dirty="0" smtClean="0"/>
+              <a:t>take this </a:t>
+            </a:r>
+            <a:r>
+              <a:rPr lang="en-US" dirty="0" smtClean="0"/>
+              <a:t>opportunity explore facets of drawing in </a:t>
             </a:r>
             <a:r>
               <a:rPr lang="en-US" i="1" dirty="0" smtClean="0"/>
@@ -8195,7 +8280,7 @@
           <a:p>
             <a:r>
               <a:rPr lang="en-US" dirty="0" smtClean="0"/>
-              <a:t>Loops</a:t>
+              <a:t>Programming Interlude</a:t>
             </a:r>
             <a:endParaRPr lang="en-US" dirty="0"/>
           </a:p>
@@ -8211,20 +8296,37 @@
             <p:ph idx="1"/>
           </p:nvPr>
         </p:nvSpPr>
-        <p:spPr/>
-        <p:txBody>
-          <a:bodyPr/>
+        <p:spPr>
+          <a:xfrm>
+            <a:off x="792162" y="1761565"/>
+            <a:ext cx="7570787" cy="4957983"/>
+          </a:xfrm>
+        </p:spPr>
+        <p:txBody>
+          <a:bodyPr>
+            <a:normAutofit fontScale="92500" lnSpcReduction="10000"/>
+          </a:bodyPr>
           <a:lstStyle/>
           <a:p>
             <a:r>
               <a:rPr lang="en-US" dirty="0" smtClean="0"/>
-              <a:t>In programming terms, iteration is handled by loops.</a:t>
-            </a:r>
-          </a:p>
-          <a:p>
-            <a:r>
-              <a:rPr lang="en-US" dirty="0" smtClean="0"/>
-              <a:t>There are typically at least two kinds of loops in programming languages:</a:t>
+              <a:t>In programming terms, iteration is handled by loops</a:t>
+            </a:r>
+            <a:r>
+              <a:rPr lang="en-US" dirty="0" smtClean="0"/>
+              <a:t>. </a:t>
+            </a:r>
+            <a:r>
+              <a:rPr lang="en-US" dirty="0"/>
+              <a:t> </a:t>
+            </a:r>
+            <a:r>
+              <a:rPr lang="en-US" dirty="0" smtClean="0"/>
+              <a:t>There </a:t>
+            </a:r>
+            <a:r>
+              <a:rPr lang="en-US" dirty="0" smtClean="0"/>
+              <a:t>are typically at least two kinds of loops in programming languages:</a:t>
             </a:r>
           </a:p>
           <a:p>
@@ -8256,7 +8358,54 @@
           <a:p>
             <a:r>
               <a:rPr lang="en-US" dirty="0" smtClean="0"/>
-              <a:t>You will see these used throughout software-based art.</a:t>
+              <a:t>Conditions can be set using </a:t>
+            </a:r>
+            <a:r>
+              <a:rPr lang="en-US" i="1" dirty="0" smtClean="0"/>
+              <a:t>if</a:t>
+            </a:r>
+            <a:r>
+              <a:rPr lang="en-US" dirty="0" smtClean="0"/>
+              <a:t> statements or </a:t>
+            </a:r>
+            <a:r>
+              <a:rPr lang="en-US" i="1" dirty="0" smtClean="0"/>
+              <a:t>if … else</a:t>
+            </a:r>
+            <a:r>
+              <a:rPr lang="en-US" dirty="0" smtClean="0"/>
+              <a:t> statements so tha</a:t>
+            </a:r>
+            <a:r>
+              <a:rPr lang="en-US" dirty="0" smtClean="0"/>
+              <a:t>t the program is response to a condition.</a:t>
+            </a:r>
+            <a:endParaRPr lang="en-US" dirty="0" smtClean="0"/>
+          </a:p>
+          <a:p>
+            <a:r>
+              <a:rPr lang="en-US" dirty="0" smtClean="0"/>
+              <a:t>You </a:t>
+            </a:r>
+            <a:r>
+              <a:rPr lang="en-US" dirty="0" smtClean="0"/>
+              <a:t>will see these </a:t>
+            </a:r>
+            <a:r>
+              <a:rPr lang="en-US" dirty="0" smtClean="0"/>
+              <a:t>keywords used </a:t>
+            </a:r>
+            <a:r>
+              <a:rPr lang="en-US" dirty="0" smtClean="0"/>
+              <a:t>throughout </a:t>
+            </a:r>
+            <a:r>
+              <a:rPr lang="en-US" dirty="0" smtClean="0"/>
+              <a:t>programming and therefore throughout software</a:t>
+            </a:r>
+            <a:r>
+              <a:rPr lang="en-US" dirty="0" smtClean="0"/>
+              <a:t>-based art.</a:t>
             </a:r>
             <a:endParaRPr lang="en-US" dirty="0"/>
           </a:p>
@@ -8327,7 +8476,7 @@
         </p:nvSpPr>
         <p:spPr>
           <a:xfrm>
-            <a:off x="383922" y="1436668"/>
+            <a:off x="383922" y="1451436"/>
             <a:ext cx="8446295" cy="5223807"/>
           </a:xfrm>
         </p:spPr>
@@ -8339,7 +8488,19 @@
           <a:p>
             <a:r>
               <a:rPr lang="en-US" dirty="0" smtClean="0"/>
-              <a:t>In order to move shapes and lines around a sketch, we will need to introduce two functions to set the scene, so to speak:</a:t>
+              <a:t>In order to move shapes and lines around a sketch, we will need to introduce </a:t>
+            </a:r>
+            <a:r>
+              <a:rPr lang="en-US" dirty="0" err="1" smtClean="0"/>
+              <a:t>twonew</a:t>
+            </a:r>
+            <a:r>
+              <a:rPr lang="en-US" dirty="0" smtClean="0"/>
+              <a:t>  </a:t>
+            </a:r>
+            <a:r>
+              <a:rPr lang="en-US" dirty="0" smtClean="0"/>
+              <a:t>functions to set the scene, so to speak:</a:t>
             </a:r>
           </a:p>
           <a:p>
@@ -8379,8 +8540,24 @@
           <a:p>
             <a:r>
               <a:rPr lang="en-US" dirty="0" smtClean="0"/>
-              <a:t>Here is the previous drawing, rendered with these functions.</a:t>
-            </a:r>
+              <a:t>Here is the previous drawing, rendered with these </a:t>
+            </a:r>
+            <a:r>
+              <a:rPr lang="en-US" dirty="0" smtClean="0"/>
+              <a:t>functions and saved as </a:t>
+            </a:r>
+            <a:r>
+              <a:rPr lang="en-US" dirty="0" smtClean="0">
+                <a:latin typeface="Courier New"/>
+                <a:cs typeface="Courier New"/>
+              </a:rPr>
+              <a:t>sketch_4_usingFunctions</a:t>
+            </a:r>
+            <a:r>
+              <a:rPr lang="en-US" dirty="0" smtClean="0"/>
+              <a:t>.</a:t>
+            </a:r>
+            <a:endParaRPr lang="en-US" dirty="0" smtClean="0"/>
           </a:p>
           <a:p>
             <a:pPr marL="0" indent="0">
@@ -9240,30 +9417,40 @@
           <a:p>
             <a:r>
               <a:rPr lang="en-US" dirty="0" smtClean="0"/>
-              <a:t>Sketch 5 yields a moving line. Here are questions for you:</a:t>
+              <a:t>Sketch 5 </a:t>
+            </a:r>
+            <a:r>
+              <a:rPr lang="en-US" dirty="0" smtClean="0"/>
+              <a:t>(</a:t>
+            </a:r>
+            <a:r>
+              <a:rPr lang="en-US" dirty="0" smtClean="0">
+                <a:latin typeface="Courier New"/>
+                <a:cs typeface="Courier New"/>
+              </a:rPr>
+              <a:t>sketch_5_movingLine</a:t>
+            </a:r>
+            <a:r>
+              <a:rPr lang="en-US" dirty="0" smtClean="0"/>
+              <a:t>) yields </a:t>
+            </a:r>
+            <a:r>
+              <a:rPr lang="en-US" dirty="0" smtClean="0"/>
+              <a:t>a moving line. Here are questions for you:</a:t>
             </a:r>
           </a:p>
           <a:p>
             <a:pPr lvl="1"/>
             <a:r>
               <a:rPr lang="en-US" dirty="0" smtClean="0"/>
-              <a:t>What color is the line</a:t>
-            </a:r>
-            <a:r>
-              <a:rPr lang="en-US" dirty="0" smtClean="0"/>
-              <a:t>? </a:t>
-            </a:r>
-            <a:endParaRPr lang="en-US" dirty="0" smtClean="0"/>
+              <a:t>What color is the line? </a:t>
+            </a:r>
           </a:p>
           <a:p>
             <a:pPr lvl="1"/>
             <a:r>
               <a:rPr lang="en-US" dirty="0" smtClean="0"/>
-              <a:t>Is it horizontal or </a:t>
-            </a:r>
-            <a:r>
-              <a:rPr lang="en-US" dirty="0" smtClean="0"/>
-              <a:t>vertical now?</a:t>
+              <a:t>Is it horizontal or vertical now?</a:t>
             </a:r>
           </a:p>
           <a:p>
@@ -9272,7 +9459,6 @@
               <a:rPr lang="en-US" dirty="0" smtClean="0"/>
               <a:t>How would you change its direction?</a:t>
             </a:r>
-            <a:endParaRPr lang="en-US" dirty="0" smtClean="0"/>
           </a:p>
           <a:p>
             <a:pPr lvl="1"/>
@@ -9285,23 +9471,7 @@
             <a:pPr lvl="1"/>
             <a:r>
               <a:rPr lang="en-US" dirty="0" smtClean="0"/>
-              <a:t>Does the line </a:t>
-            </a:r>
-            <a:r>
-              <a:rPr lang="en-US" dirty="0" smtClean="0"/>
-              <a:t>go all the way </a:t>
-            </a:r>
-            <a:r>
-              <a:rPr lang="en-US" dirty="0" smtClean="0"/>
-              <a:t>across the </a:t>
-            </a:r>
-            <a:r>
-              <a:rPr lang="en-US" dirty="0" smtClean="0"/>
-              <a:t>window or just partway? </a:t>
-            </a:r>
-            <a:r>
-              <a:rPr lang="en-US" dirty="0" smtClean="0"/>
-              <a:t>How do you know?</a:t>
+              <a:t>Does the line go all the way across the window or just partway? How do you know?</a:t>
             </a:r>
           </a:p>
           <a:p>
@@ -10433,16 +10603,29 @@
             <p:ph idx="1"/>
           </p:nvPr>
         </p:nvSpPr>
-        <p:spPr/>
+        <p:spPr>
+          <a:xfrm>
+            <a:off x="792162" y="1555659"/>
+            <a:ext cx="7978990" cy="5134352"/>
+          </a:xfrm>
+        </p:spPr>
         <p:txBody>
           <a:bodyPr>
-            <a:normAutofit/>
+            <a:normAutofit lnSpcReduction="10000"/>
           </a:bodyPr>
           <a:lstStyle/>
           <a:p>
             <a:r>
               <a:rPr lang="en-US" dirty="0" smtClean="0"/>
-              <a:t>Look closely at this line of code and where it is placed in the sketch:</a:t>
+              <a:t>Look closely at this line of code and where it is placed in </a:t>
+            </a:r>
+            <a:r>
+              <a:rPr lang="en-US" dirty="0" smtClean="0"/>
+              <a:t>the animated </a:t>
+            </a:r>
+            <a:r>
+              <a:rPr lang="en-US" dirty="0" smtClean="0"/>
+              <a:t>sketch:</a:t>
             </a:r>
           </a:p>
           <a:p>
@@ -10475,7 +10658,17 @@
           <a:p>
             <a:r>
               <a:rPr lang="en-US" dirty="0" smtClean="0"/>
-              <a:t>What happens when this line is written in the </a:t>
+              <a:t>In animation, one can reset the background to give the illusion of a moving shape or object.</a:t>
+            </a:r>
+          </a:p>
+          <a:p>
+            <a:r>
+              <a:rPr lang="en-US" dirty="0" smtClean="0"/>
+              <a:t>Therefore the placement of the code to set the background color (whether in </a:t>
+            </a:r>
+            <a:r>
+              <a:rPr lang="en-US" dirty="0" smtClean="0"/>
+              <a:t>the </a:t>
             </a:r>
             <a:r>
               <a:rPr lang="en-US" dirty="0" smtClean="0">
@@ -10486,18 +10679,40 @@
             </a:r>
             <a:r>
               <a:rPr lang="en-US" dirty="0" smtClean="0"/>
-              <a:t> function? What happens when it is written in the </a:t>
+              <a:t> </a:t>
+            </a:r>
+            <a:r>
+              <a:rPr lang="en-US" dirty="0" smtClean="0"/>
+              <a:t>function or in the </a:t>
             </a:r>
             <a:r>
               <a:rPr lang="en-US" dirty="0" smtClean="0">
                 <a:latin typeface="Courier New"/>
                 <a:cs typeface="Courier New"/>
               </a:rPr>
-              <a:t>draw() </a:t>
-            </a:r>
-            <a:r>
-              <a:rPr lang="en-US" dirty="0" smtClean="0"/>
-              <a:t>function?</a:t>
+              <a:t>draw</a:t>
+            </a:r>
+            <a:r>
+              <a:rPr lang="en-US" dirty="0" smtClean="0">
+                <a:latin typeface="Courier New"/>
+                <a:cs typeface="Courier New"/>
+              </a:rPr>
+              <a:t>(</a:t>
+            </a:r>
+            <a:r>
+              <a:rPr lang="en-US" dirty="0" smtClean="0">
+                <a:latin typeface="Courier New"/>
+                <a:cs typeface="Courier New"/>
+              </a:rPr>
+              <a:t>)</a:t>
+            </a:r>
+            <a:r>
+              <a:rPr lang="en-US" dirty="0" smtClean="0"/>
+              <a:t>function</a:t>
+            </a:r>
+            <a:r>
+              <a:rPr lang="en-US" dirty="0" smtClean="0"/>
+              <a:t>) is one way to render the illusion of animation (a rapidly changing drawing.)</a:t>
             </a:r>
             <a:endParaRPr lang="en-US" dirty="0" smtClean="0"/>
           </a:p>
@@ -10714,7 +10929,15 @@
             </a:r>
             <a:r>
               <a:rPr lang="en-US" dirty="0" smtClean="0"/>
-              <a:t> coordinates of her mouse and </a:t>
+              <a:t> coordinates of </a:t>
+            </a:r>
+            <a:r>
+              <a:rPr lang="en-US" dirty="0" smtClean="0"/>
+              <a:t>a mouse </a:t>
+            </a:r>
+            <a:r>
+              <a:rPr lang="en-US" dirty="0" smtClean="0"/>
+              <a:t>and </a:t>
             </a:r>
             <a:r>
               <a:rPr lang="en-US" dirty="0" err="1" smtClean="0">
@@ -10731,7 +10954,15 @@
           <a:p>
             <a:r>
               <a:rPr lang="en-US" dirty="0" smtClean="0"/>
-              <a:t>You, as the artist/programmer, can make things happen where the user tells you to!</a:t>
+              <a:t>You, as the artist/programmer, can make things happen where the user </a:t>
+            </a:r>
+            <a:r>
+              <a:rPr lang="en-US" dirty="0" smtClean="0"/>
+              <a:t>“tells” </a:t>
+            </a:r>
+            <a:r>
+              <a:rPr lang="en-US" dirty="0" smtClean="0"/>
+              <a:t>you to!</a:t>
             </a:r>
             <a:endParaRPr lang="en-US" dirty="0"/>
           </a:p>
@@ -10814,7 +11045,26 @@
           <a:p>
             <a:r>
               <a:rPr lang="en-US" dirty="0" smtClean="0"/>
-              <a:t>In this program, the user “draws” with a purple circle:</a:t>
+              <a:t>In this </a:t>
+            </a:r>
+            <a:r>
+              <a:rPr lang="en-US" dirty="0" smtClean="0"/>
+              <a:t>program (</a:t>
+            </a:r>
+            <a:r>
+              <a:rPr lang="en-US" dirty="0" smtClean="0">
+                <a:latin typeface="Courier New"/>
+                <a:cs typeface="Courier New"/>
+              </a:rPr>
+              <a:t>sketch_6_mouse</a:t>
+            </a:r>
+            <a:r>
+              <a:rPr lang="en-US" dirty="0" smtClean="0"/>
+              <a:t>), </a:t>
+            </a:r>
+            <a:r>
+              <a:rPr lang="en-US" dirty="0" smtClean="0"/>
+              <a:t>the user “draws” with a purple circle:</a:t>
             </a:r>
           </a:p>
           <a:p>
@@ -11025,7 +11275,7 @@
           <a:p>
             <a:r>
               <a:rPr lang="en-US" dirty="0" smtClean="0"/>
-              <a:t>One can change colors as well using an “if” clause:</a:t>
+              <a:t>Responding to a mouse:</a:t>
             </a:r>
             <a:endParaRPr lang="en-US" dirty="0"/>
           </a:p>
@@ -11041,26 +11291,23 @@
             <p:ph idx="1"/>
           </p:nvPr>
         </p:nvSpPr>
-        <p:spPr/>
+        <p:spPr>
+          <a:xfrm>
+            <a:off x="792162" y="1575849"/>
+            <a:ext cx="7570787" cy="4957038"/>
+          </a:xfrm>
+        </p:spPr>
         <p:txBody>
           <a:bodyPr>
-            <a:normAutofit fontScale="92500" lnSpcReduction="20000"/>
+            <a:normAutofit/>
           </a:bodyPr>
           <a:lstStyle/>
           <a:p>
-            <a:pPr marL="0" indent="0">
-              <a:buNone/>
-            </a:pPr>
-            <a:r>
-              <a:rPr lang="en-US" dirty="0">
-                <a:solidFill>
-                  <a:schemeClr val="tx1"/>
-                </a:solidFill>
-                <a:latin typeface="Courier New"/>
-                <a:cs typeface="Courier New"/>
-              </a:rPr>
-              <a:t>void setup() {</a:t>
-            </a:r>
+            <a:r>
+              <a:rPr lang="en-US" dirty="0" smtClean="0"/>
+              <a:t>Annotated version:</a:t>
+            </a:r>
+            <a:endParaRPr lang="en-US" dirty="0" smtClean="0"/>
           </a:p>
           <a:p>
             <a:pPr marL="0" indent="0">
@@ -11073,15 +11320,23 @@
               <a:buNone/>
             </a:pPr>
             <a:r>
-              <a:rPr lang="en-US" dirty="0">
-                <a:solidFill>
-                  <a:schemeClr val="tx1"/>
-                </a:solidFill>
-                <a:latin typeface="Courier New"/>
-                <a:cs typeface="Courier New"/>
-              </a:rPr>
-              <a:t>  size(400,400);</a:t>
-            </a:r>
+              <a:rPr lang="en-US" sz="2400" dirty="0">
+                <a:latin typeface="Courier New"/>
+                <a:cs typeface="Courier New"/>
+              </a:rPr>
+              <a:t>void setup() </a:t>
+            </a:r>
+            <a:r>
+              <a:rPr lang="en-US" sz="2400" dirty="0" smtClean="0">
+                <a:latin typeface="Courier New"/>
+                <a:cs typeface="Courier New"/>
+              </a:rPr>
+              <a:t>{		// setup</a:t>
+            </a:r>
+            <a:endParaRPr lang="en-US" sz="2400" dirty="0">
+              <a:latin typeface="Courier New"/>
+              <a:cs typeface="Courier New"/>
+            </a:endParaRPr>
           </a:p>
           <a:p>
             <a:pPr marL="0" indent="0">
@@ -11094,15 +11349,23 @@
               <a:buNone/>
             </a:pPr>
             <a:r>
-              <a:rPr lang="en-US" dirty="0">
-                <a:solidFill>
-                  <a:schemeClr val="tx1"/>
-                </a:solidFill>
-                <a:latin typeface="Courier New"/>
-                <a:cs typeface="Courier New"/>
-              </a:rPr>
-              <a:t>  background(255);</a:t>
-            </a:r>
+              <a:rPr lang="en-US" sz="2400" dirty="0">
+                <a:latin typeface="Courier New"/>
+                <a:cs typeface="Courier New"/>
+              </a:rPr>
+              <a:t>  size(400,400)</a:t>
+            </a:r>
+            <a:r>
+              <a:rPr lang="en-US" sz="2400" dirty="0" smtClean="0">
+                <a:latin typeface="Courier New"/>
+                <a:cs typeface="Courier New"/>
+              </a:rPr>
+              <a:t>;	// window size</a:t>
+            </a:r>
+            <a:endParaRPr lang="en-US" sz="2400" dirty="0">
+              <a:latin typeface="Courier New"/>
+              <a:cs typeface="Courier New"/>
+            </a:endParaRPr>
           </a:p>
           <a:p>
             <a:pPr marL="0" indent="0">
@@ -11115,15 +11378,23 @@
               <a:buNone/>
             </a:pPr>
             <a:r>
-              <a:rPr lang="en-US" dirty="0">
-                <a:solidFill>
-                  <a:schemeClr val="tx1"/>
-                </a:solidFill>
-                <a:latin typeface="Courier New"/>
-                <a:cs typeface="Courier New"/>
-              </a:rPr>
-              <a:t>}</a:t>
-            </a:r>
+              <a:rPr lang="en-US" sz="2400" dirty="0">
+                <a:latin typeface="Courier New"/>
+                <a:cs typeface="Courier New"/>
+              </a:rPr>
+              <a:t>  background(255)</a:t>
+            </a:r>
+            <a:r>
+              <a:rPr lang="en-US" sz="2400" dirty="0" smtClean="0">
+                <a:latin typeface="Courier New"/>
+                <a:cs typeface="Courier New"/>
+              </a:rPr>
+              <a:t>;	// white background</a:t>
+            </a:r>
+            <a:endParaRPr lang="en-US" sz="2400" dirty="0">
+              <a:latin typeface="Courier New"/>
+              <a:cs typeface="Courier New"/>
+            </a:endParaRPr>
           </a:p>
           <a:p>
             <a:pPr marL="0" indent="0">
@@ -11136,15 +11407,23 @@
               <a:buNone/>
             </a:pPr>
             <a:r>
-              <a:rPr lang="en-US" dirty="0">
-                <a:solidFill>
-                  <a:schemeClr val="tx1"/>
-                </a:solidFill>
-                <a:latin typeface="Courier New"/>
-                <a:cs typeface="Courier New"/>
-              </a:rPr>
-              <a:t>void draw() {</a:t>
-            </a:r>
+              <a:rPr lang="en-US" sz="2400" dirty="0">
+                <a:latin typeface="Courier New"/>
+                <a:cs typeface="Courier New"/>
+              </a:rPr>
+              <a:t>  fill(150,0,150)</a:t>
+            </a:r>
+            <a:r>
+              <a:rPr lang="en-US" sz="2400" dirty="0" smtClean="0">
+                <a:latin typeface="Courier New"/>
+                <a:cs typeface="Courier New"/>
+              </a:rPr>
+              <a:t>;	// purple color</a:t>
+            </a:r>
+            <a:endParaRPr lang="en-US" sz="2400" dirty="0">
+              <a:latin typeface="Courier New"/>
+              <a:cs typeface="Courier New"/>
+            </a:endParaRPr>
           </a:p>
           <a:p>
             <a:pPr marL="0" indent="0">
@@ -11157,34 +11436,11 @@
               <a:buNone/>
             </a:pPr>
             <a:r>
-              <a:rPr lang="en-US" dirty="0">
-                <a:solidFill>
-                  <a:schemeClr val="tx1"/>
-                </a:solidFill>
-                <a:latin typeface="Courier New"/>
-                <a:cs typeface="Courier New"/>
-              </a:rPr>
-              <a:t>    if  (</a:t>
-            </a:r>
-            <a:r>
-              <a:rPr lang="en-US" dirty="0" err="1">
-                <a:solidFill>
-                  <a:schemeClr val="tx1"/>
-                </a:solidFill>
-                <a:latin typeface="Courier New"/>
-                <a:cs typeface="Courier New"/>
-              </a:rPr>
-              <a:t>mousePressed</a:t>
-            </a:r>
-            <a:r>
-              <a:rPr lang="en-US" dirty="0">
-                <a:solidFill>
-                  <a:schemeClr val="tx1"/>
-                </a:solidFill>
-                <a:latin typeface="Courier New"/>
-                <a:cs typeface="Courier New"/>
-              </a:rPr>
-              <a:t>) {</a:t>
+              <a:rPr lang="en-US" sz="2400" dirty="0">
+                <a:latin typeface="Courier New"/>
+                <a:cs typeface="Courier New"/>
+              </a:rPr>
+              <a:t>}</a:t>
             </a:r>
           </a:p>
           <a:p>
@@ -11198,14 +11454,18 @@
               <a:buNone/>
             </a:pPr>
             <a:r>
-              <a:rPr lang="en-US" dirty="0">
-                <a:solidFill>
-                  <a:schemeClr val="tx1"/>
-                </a:solidFill>
-                <a:latin typeface="Courier New"/>
-                <a:cs typeface="Courier New"/>
-              </a:rPr>
-              <a:t>        fill(150 ,0,150); }</a:t>
+              <a:rPr lang="en-US" sz="2400" dirty="0">
+                <a:latin typeface="Courier New"/>
+                <a:cs typeface="Courier New"/>
+              </a:rPr>
+              <a:t>void draw() </a:t>
+            </a:r>
+            <a:r>
+              <a:rPr lang="en-US" sz="2400" dirty="0" smtClean="0">
+                <a:latin typeface="Courier New"/>
+                <a:cs typeface="Courier New"/>
+              </a:rPr>
+              <a:t>{</a:t>
             </a:r>
           </a:p>
           <a:p>
@@ -11219,14 +11479,25 @@
               <a:buNone/>
             </a:pPr>
             <a:r>
-              <a:rPr lang="en-US" dirty="0">
-                <a:solidFill>
-                  <a:schemeClr val="tx1"/>
-                </a:solidFill>
-                <a:latin typeface="Courier New"/>
-                <a:cs typeface="Courier New"/>
-              </a:rPr>
-              <a:t>    else {</a:t>
+              <a:rPr lang="en-US" sz="2400" dirty="0" smtClean="0">
+                <a:latin typeface="Courier New"/>
+                <a:cs typeface="Courier New"/>
+              </a:rPr>
+              <a:t>  // draw a circle at the (</a:t>
+            </a:r>
+            <a:r>
+              <a:rPr lang="en-US" sz="2400" dirty="0" err="1" smtClean="0">
+                <a:latin typeface="Courier New"/>
+                <a:cs typeface="Courier New"/>
+              </a:rPr>
+              <a:t>x,y</a:t>
+            </a:r>
+            <a:r>
+              <a:rPr lang="en-US" sz="2400" dirty="0" smtClean="0">
+                <a:latin typeface="Courier New"/>
+                <a:cs typeface="Courier New"/>
+              </a:rPr>
+              <a:t>)</a:t>
             </a:r>
           </a:p>
           <a:p>
@@ -11240,15 +11511,23 @@
               <a:buNone/>
             </a:pPr>
             <a:r>
-              <a:rPr lang="en-US" dirty="0">
-                <a:solidFill>
-                  <a:schemeClr val="tx1"/>
-                </a:solidFill>
-                <a:latin typeface="Courier New"/>
-                <a:cs typeface="Courier New"/>
-              </a:rPr>
-              <a:t>        fill(0,0,255);    } </a:t>
-            </a:r>
+              <a:rPr lang="en-US" sz="2400" dirty="0">
+                <a:latin typeface="Courier New"/>
+                <a:cs typeface="Courier New"/>
+              </a:rPr>
+              <a:t> </a:t>
+            </a:r>
+            <a:r>
+              <a:rPr lang="en-US" sz="2400" dirty="0" smtClean="0">
+                <a:latin typeface="Courier New"/>
+                <a:cs typeface="Courier New"/>
+              </a:rPr>
+              <a:t> // coordinates designated by the mouse</a:t>
+            </a:r>
+            <a:endParaRPr lang="en-US" sz="2400" dirty="0">
+              <a:latin typeface="Courier New"/>
+              <a:cs typeface="Courier New"/>
+            </a:endParaRPr>
           </a:p>
           <a:p>
             <a:pPr marL="0" indent="0">
@@ -11261,10 +11540,7 @@
               <a:buNone/>
             </a:pPr>
             <a:r>
-              <a:rPr lang="en-US" dirty="0">
-                <a:solidFill>
-                  <a:schemeClr val="tx1"/>
-                </a:solidFill>
+              <a:rPr lang="en-US" sz="2400" dirty="0">
                 <a:latin typeface="Courier New"/>
                 <a:cs typeface="Courier New"/>
               </a:rPr>
@@ -11282,10 +11558,7 @@
               <a:buNone/>
             </a:pPr>
             <a:r>
-              <a:rPr lang="en-US" dirty="0">
-                <a:solidFill>
-                  <a:schemeClr val="tx1"/>
-                </a:solidFill>
+              <a:rPr lang="en-US" sz="2400" dirty="0">
                 <a:latin typeface="Courier New"/>
                 <a:cs typeface="Courier New"/>
               </a:rPr>
@@ -11302,18 +11575,14 @@
               </a:spcBef>
               <a:buNone/>
             </a:pPr>
-            <a:endParaRPr lang="en-US" dirty="0">
-              <a:solidFill>
-                <a:schemeClr val="tx1"/>
-              </a:solidFill>
-            </a:endParaRPr>
+            <a:endParaRPr lang="en-US" sz="2400" dirty="0"/>
           </a:p>
         </p:txBody>
       </p:sp>
     </p:spTree>
     <p:extLst>
       <p:ext uri="{BB962C8B-B14F-4D97-AF65-F5344CB8AC3E}">
-        <p14:creationId xmlns:p14="http://schemas.microsoft.com/office/powerpoint/2010/main" val="755585802"/>
+        <p14:creationId xmlns:p14="http://schemas.microsoft.com/office/powerpoint/2010/main" val="2573470675"/>
       </p:ext>
     </p:extLst>
   </p:cSld>
@@ -11357,7 +11626,7 @@
           <a:p>
             <a:r>
               <a:rPr lang="en-US" dirty="0" smtClean="0"/>
-              <a:t>Now its your turn!</a:t>
+              <a:t>One can change colors as well using an “if” clause:</a:t>
             </a:r>
             <a:endParaRPr lang="en-US" dirty="0"/>
           </a:p>
@@ -11375,33 +11644,346 @@
         </p:nvSpPr>
         <p:spPr/>
         <p:txBody>
-          <a:bodyPr/>
+          <a:bodyPr>
+            <a:normAutofit fontScale="77500" lnSpcReduction="20000"/>
+          </a:bodyPr>
           <a:lstStyle/>
           <a:p>
-            <a:r>
-              <a:rPr lang="en-US" dirty="0" smtClean="0"/>
-              <a:t>Render your earlier drawing (or start a new one) with the addition of animation or user interactivity.</a:t>
-            </a:r>
-          </a:p>
-          <a:p>
-            <a:r>
-              <a:rPr lang="en-US" dirty="0" smtClean="0"/>
-              <a:t>Be sure to ask me or any of our talented teaching assistants any questions that you might have.</a:t>
-            </a:r>
-          </a:p>
-          <a:p>
-            <a:r>
-              <a:rPr lang="en-US" dirty="0" smtClean="0"/>
-              <a:t>Above all, have fun!</a:t>
-            </a:r>
-            <a:endParaRPr lang="en-US" dirty="0"/>
+            <a:pPr marL="0" indent="0">
+              <a:buNone/>
+            </a:pPr>
+            <a:r>
+              <a:rPr lang="en-US" dirty="0">
+                <a:solidFill>
+                  <a:schemeClr val="tx1"/>
+                </a:solidFill>
+                <a:latin typeface="Courier New"/>
+                <a:cs typeface="Courier New"/>
+              </a:rPr>
+              <a:t>void setup() {</a:t>
+            </a:r>
+          </a:p>
+          <a:p>
+            <a:pPr marL="0" indent="0">
+              <a:lnSpc>
+                <a:spcPct val="110000"/>
+              </a:lnSpc>
+              <a:spcBef>
+                <a:spcPts val="0"/>
+              </a:spcBef>
+              <a:buNone/>
+            </a:pPr>
+            <a:r>
+              <a:rPr lang="en-US" dirty="0">
+                <a:solidFill>
+                  <a:schemeClr val="tx1"/>
+                </a:solidFill>
+                <a:latin typeface="Courier New"/>
+                <a:cs typeface="Courier New"/>
+              </a:rPr>
+              <a:t>  size(400,400);</a:t>
+            </a:r>
+          </a:p>
+          <a:p>
+            <a:pPr marL="0" indent="0">
+              <a:lnSpc>
+                <a:spcPct val="110000"/>
+              </a:lnSpc>
+              <a:spcBef>
+                <a:spcPts val="0"/>
+              </a:spcBef>
+              <a:buNone/>
+            </a:pPr>
+            <a:r>
+              <a:rPr lang="en-US" dirty="0">
+                <a:solidFill>
+                  <a:schemeClr val="tx1"/>
+                </a:solidFill>
+                <a:latin typeface="Courier New"/>
+                <a:cs typeface="Courier New"/>
+              </a:rPr>
+              <a:t>  background(255);</a:t>
+            </a:r>
+          </a:p>
+          <a:p>
+            <a:pPr marL="0" indent="0">
+              <a:lnSpc>
+                <a:spcPct val="110000"/>
+              </a:lnSpc>
+              <a:spcBef>
+                <a:spcPts val="0"/>
+              </a:spcBef>
+              <a:buNone/>
+            </a:pPr>
+            <a:r>
+              <a:rPr lang="en-US" dirty="0">
+                <a:solidFill>
+                  <a:schemeClr val="tx1"/>
+                </a:solidFill>
+                <a:latin typeface="Courier New"/>
+                <a:cs typeface="Courier New"/>
+              </a:rPr>
+              <a:t>}</a:t>
+            </a:r>
+          </a:p>
+          <a:p>
+            <a:pPr marL="0" indent="0">
+              <a:lnSpc>
+                <a:spcPct val="110000"/>
+              </a:lnSpc>
+              <a:spcBef>
+                <a:spcPts val="0"/>
+              </a:spcBef>
+              <a:buNone/>
+            </a:pPr>
+            <a:r>
+              <a:rPr lang="en-US" dirty="0">
+                <a:solidFill>
+                  <a:schemeClr val="tx1"/>
+                </a:solidFill>
+                <a:latin typeface="Courier New"/>
+                <a:cs typeface="Courier New"/>
+              </a:rPr>
+              <a:t>void draw() </a:t>
+            </a:r>
+            <a:r>
+              <a:rPr lang="en-US" dirty="0" smtClean="0">
+                <a:solidFill>
+                  <a:schemeClr val="tx1"/>
+                </a:solidFill>
+                <a:latin typeface="Courier New"/>
+                <a:cs typeface="Courier New"/>
+              </a:rPr>
+              <a:t>{</a:t>
+            </a:r>
+          </a:p>
+          <a:p>
+            <a:pPr marL="0" indent="0">
+              <a:lnSpc>
+                <a:spcPct val="110000"/>
+              </a:lnSpc>
+              <a:spcBef>
+                <a:spcPts val="0"/>
+              </a:spcBef>
+              <a:buNone/>
+            </a:pPr>
+            <a:r>
+              <a:rPr lang="en-US" dirty="0">
+                <a:solidFill>
+                  <a:schemeClr val="tx1"/>
+                </a:solidFill>
+                <a:latin typeface="Courier New"/>
+                <a:cs typeface="Courier New"/>
+              </a:rPr>
+              <a:t> </a:t>
+            </a:r>
+            <a:r>
+              <a:rPr lang="en-US" dirty="0" smtClean="0">
+                <a:solidFill>
+                  <a:schemeClr val="tx1"/>
+                </a:solidFill>
+                <a:latin typeface="Courier New"/>
+                <a:cs typeface="Courier New"/>
+              </a:rPr>
+              <a:t> // change color … depending on whether</a:t>
+            </a:r>
+          </a:p>
+          <a:p>
+            <a:pPr marL="0" indent="0">
+              <a:lnSpc>
+                <a:spcPct val="110000"/>
+              </a:lnSpc>
+              <a:spcBef>
+                <a:spcPts val="0"/>
+              </a:spcBef>
+              <a:buNone/>
+            </a:pPr>
+            <a:r>
+              <a:rPr lang="en-US" dirty="0" smtClean="0">
+                <a:solidFill>
+                  <a:schemeClr val="tx1"/>
+                </a:solidFill>
+                <a:latin typeface="Courier New"/>
+                <a:cs typeface="Courier New"/>
+              </a:rPr>
+              <a:t>  // the mouse is pressed or not!</a:t>
+            </a:r>
+            <a:endParaRPr lang="en-US" dirty="0">
+              <a:solidFill>
+                <a:schemeClr val="tx1"/>
+              </a:solidFill>
+              <a:latin typeface="Courier New"/>
+              <a:cs typeface="Courier New"/>
+            </a:endParaRPr>
+          </a:p>
+          <a:p>
+            <a:pPr marL="0" indent="0">
+              <a:lnSpc>
+                <a:spcPct val="110000"/>
+              </a:lnSpc>
+              <a:spcBef>
+                <a:spcPts val="0"/>
+              </a:spcBef>
+              <a:buNone/>
+            </a:pPr>
+            <a:r>
+              <a:rPr lang="en-US" dirty="0">
+                <a:solidFill>
+                  <a:schemeClr val="tx1"/>
+                </a:solidFill>
+                <a:latin typeface="Courier New"/>
+                <a:cs typeface="Courier New"/>
+              </a:rPr>
+              <a:t>    if  (</a:t>
+            </a:r>
+            <a:r>
+              <a:rPr lang="en-US" dirty="0" err="1">
+                <a:solidFill>
+                  <a:schemeClr val="tx1"/>
+                </a:solidFill>
+                <a:latin typeface="Courier New"/>
+                <a:cs typeface="Courier New"/>
+              </a:rPr>
+              <a:t>mousePressed</a:t>
+            </a:r>
+            <a:r>
+              <a:rPr lang="en-US" dirty="0">
+                <a:solidFill>
+                  <a:schemeClr val="tx1"/>
+                </a:solidFill>
+                <a:latin typeface="Courier New"/>
+                <a:cs typeface="Courier New"/>
+              </a:rPr>
+              <a:t>) {</a:t>
+            </a:r>
+          </a:p>
+          <a:p>
+            <a:pPr marL="0" indent="0">
+              <a:lnSpc>
+                <a:spcPct val="110000"/>
+              </a:lnSpc>
+              <a:spcBef>
+                <a:spcPts val="0"/>
+              </a:spcBef>
+              <a:buNone/>
+            </a:pPr>
+            <a:r>
+              <a:rPr lang="en-US" dirty="0">
+                <a:solidFill>
+                  <a:schemeClr val="tx1"/>
+                </a:solidFill>
+                <a:latin typeface="Courier New"/>
+                <a:cs typeface="Courier New"/>
+              </a:rPr>
+              <a:t>        fill(150 ,0,150); }</a:t>
+            </a:r>
+          </a:p>
+          <a:p>
+            <a:pPr marL="0" indent="0">
+              <a:lnSpc>
+                <a:spcPct val="110000"/>
+              </a:lnSpc>
+              <a:spcBef>
+                <a:spcPts val="0"/>
+              </a:spcBef>
+              <a:buNone/>
+            </a:pPr>
+            <a:r>
+              <a:rPr lang="en-US" dirty="0">
+                <a:solidFill>
+                  <a:schemeClr val="tx1"/>
+                </a:solidFill>
+                <a:latin typeface="Courier New"/>
+                <a:cs typeface="Courier New"/>
+              </a:rPr>
+              <a:t>    else {</a:t>
+            </a:r>
+          </a:p>
+          <a:p>
+            <a:pPr marL="0" indent="0">
+              <a:lnSpc>
+                <a:spcPct val="110000"/>
+              </a:lnSpc>
+              <a:spcBef>
+                <a:spcPts val="0"/>
+              </a:spcBef>
+              <a:buNone/>
+            </a:pPr>
+            <a:r>
+              <a:rPr lang="en-US" dirty="0">
+                <a:solidFill>
+                  <a:schemeClr val="tx1"/>
+                </a:solidFill>
+                <a:latin typeface="Courier New"/>
+                <a:cs typeface="Courier New"/>
+              </a:rPr>
+              <a:t>        fill(0,0,255);    } </a:t>
+            </a:r>
+          </a:p>
+          <a:p>
+            <a:pPr marL="0" indent="0">
+              <a:lnSpc>
+                <a:spcPct val="110000"/>
+              </a:lnSpc>
+              <a:spcBef>
+                <a:spcPts val="0"/>
+              </a:spcBef>
+              <a:buNone/>
+            </a:pPr>
+            <a:r>
+              <a:rPr lang="en-US" dirty="0">
+                <a:solidFill>
+                  <a:schemeClr val="tx1"/>
+                </a:solidFill>
+                <a:latin typeface="Courier New"/>
+                <a:cs typeface="Courier New"/>
+              </a:rPr>
+              <a:t>  ellipse(mouseX,mouseY,50,50);</a:t>
+            </a:r>
+          </a:p>
+          <a:p>
+            <a:pPr marL="0" indent="0">
+              <a:lnSpc>
+                <a:spcPct val="110000"/>
+              </a:lnSpc>
+              <a:spcBef>
+                <a:spcPts val="0"/>
+              </a:spcBef>
+              <a:buNone/>
+            </a:pPr>
+            <a:r>
+              <a:rPr lang="en-US" dirty="0">
+                <a:solidFill>
+                  <a:schemeClr val="tx1"/>
+                </a:solidFill>
+                <a:latin typeface="Courier New"/>
+                <a:cs typeface="Courier New"/>
+              </a:rPr>
+              <a:t>}</a:t>
+            </a:r>
+          </a:p>
+          <a:p>
+            <a:pPr marL="0" indent="0">
+              <a:lnSpc>
+                <a:spcPct val="110000"/>
+              </a:lnSpc>
+              <a:spcBef>
+                <a:spcPts val="0"/>
+              </a:spcBef>
+              <a:buNone/>
+            </a:pPr>
+            <a:endParaRPr lang="en-US" dirty="0">
+              <a:solidFill>
+                <a:schemeClr val="tx1"/>
+              </a:solidFill>
+            </a:endParaRPr>
           </a:p>
         </p:txBody>
       </p:sp>
     </p:spTree>
     <p:extLst>
       <p:ext uri="{BB962C8B-B14F-4D97-AF65-F5344CB8AC3E}">
-        <p14:creationId xmlns:p14="http://schemas.microsoft.com/office/powerpoint/2010/main" val="1254827601"/>
+        <p14:creationId xmlns:p14="http://schemas.microsoft.com/office/powerpoint/2010/main" val="755585802"/>
       </p:ext>
     </p:extLst>
   </p:cSld>
@@ -11445,7 +12027,7 @@
           <a:p>
             <a:r>
               <a:rPr lang="en-US" dirty="0" smtClean="0"/>
-              <a:t>Bibliography</a:t>
+              <a:t>Now its your turn!</a:t>
             </a:r>
             <a:endParaRPr lang="en-US" dirty="0"/>
           </a:p>
@@ -11463,135 +12045,33 @@
         </p:nvSpPr>
         <p:spPr/>
         <p:txBody>
-          <a:bodyPr>
-            <a:normAutofit lnSpcReduction="10000"/>
-          </a:bodyPr>
+          <a:bodyPr/>
           <a:lstStyle/>
           <a:p>
-            <a:pPr marL="0" indent="0" algn="ctr">
-              <a:buNone/>
-            </a:pPr>
-            <a:r>
-              <a:rPr lang="en-US" b="1" dirty="0" smtClean="0"/>
-              <a:t>The Processing Site:</a:t>
-            </a:r>
-          </a:p>
-          <a:p>
-            <a:r>
-              <a:rPr lang="en-US" dirty="0"/>
-              <a:t>Opening Page </a:t>
-            </a:r>
-            <a:r>
-              <a:rPr lang="en-US" dirty="0">
-                <a:hlinkClick r:id="rId2"/>
-              </a:rPr>
-              <a:t>https://</a:t>
-            </a:r>
-            <a:r>
-              <a:rPr lang="en-US" dirty="0" smtClean="0">
-                <a:hlinkClick r:id="rId2"/>
-              </a:rPr>
-              <a:t>processing.org</a:t>
-            </a:r>
-            <a:endParaRPr lang="en-US" dirty="0" smtClean="0"/>
-          </a:p>
-          <a:p>
-            <a:r>
-              <a:rPr lang="en-US" dirty="0"/>
-              <a:t>Tutorials </a:t>
-            </a:r>
-            <a:r>
-              <a:rPr lang="en-US" dirty="0">
-                <a:hlinkClick r:id="rId3"/>
-              </a:rPr>
-              <a:t>https://processing.org/tutorials</a:t>
-            </a:r>
-            <a:r>
-              <a:rPr lang="en-US" dirty="0" smtClean="0">
-                <a:hlinkClick r:id="rId3"/>
-              </a:rPr>
-              <a:t>/</a:t>
-            </a:r>
-            <a:r>
-              <a:rPr lang="en-US" dirty="0" smtClean="0"/>
-              <a:t> </a:t>
-            </a:r>
-          </a:p>
-          <a:p>
-            <a:r>
-              <a:rPr lang="en-US" dirty="0"/>
-              <a:t>Examples </a:t>
-            </a:r>
-            <a:r>
-              <a:rPr lang="en-US" dirty="0">
-                <a:hlinkClick r:id="rId4"/>
-              </a:rPr>
-              <a:t>https://processing.org/examples</a:t>
-            </a:r>
-            <a:r>
-              <a:rPr lang="en-US" dirty="0" smtClean="0">
-                <a:hlinkClick r:id="rId4"/>
-              </a:rPr>
-              <a:t>/</a:t>
-            </a:r>
-            <a:r>
-              <a:rPr lang="en-US" dirty="0" smtClean="0"/>
-              <a:t> or … </a:t>
-            </a:r>
-            <a:r>
-              <a:rPr lang="en-US" i="1" dirty="0" smtClean="0"/>
-              <a:t>open </a:t>
-            </a:r>
-            <a:r>
-              <a:rPr lang="en-US" i="1" dirty="0"/>
-              <a:t>Processing and </a:t>
-            </a:r>
-            <a:r>
-              <a:rPr lang="en-US" i="1" dirty="0" err="1"/>
-              <a:t>naviage</a:t>
-            </a:r>
-            <a:r>
-              <a:rPr lang="en-US" i="1" dirty="0"/>
-              <a:t> to FILE / </a:t>
-            </a:r>
-            <a:r>
-              <a:rPr lang="en-US" i="1" dirty="0" smtClean="0"/>
-              <a:t>EXAMPLES.</a:t>
-            </a:r>
-          </a:p>
-          <a:p>
-            <a:r>
-              <a:rPr lang="en-US" dirty="0"/>
-              <a:t>Exhibition</a:t>
-            </a:r>
-            <a:r>
-              <a:rPr lang="en-US" i="1" dirty="0"/>
-              <a:t> </a:t>
-            </a:r>
-            <a:r>
-              <a:rPr lang="en-US" i="1" dirty="0">
-                <a:hlinkClick r:id="rId5"/>
-              </a:rPr>
-              <a:t>https://processing.org/exhibition</a:t>
-            </a:r>
-            <a:r>
-              <a:rPr lang="en-US" i="1" dirty="0" smtClean="0">
-                <a:hlinkClick r:id="rId5"/>
-              </a:rPr>
-              <a:t>/</a:t>
-            </a:r>
-            <a:r>
-              <a:rPr lang="en-US" i="1" dirty="0" smtClean="0"/>
-              <a:t> </a:t>
-            </a:r>
-            <a:endParaRPr lang="en-US" i="1" dirty="0"/>
+            <a:r>
+              <a:rPr lang="en-US" dirty="0" smtClean="0"/>
+              <a:t>Render your earlier drawing (or start a new one) with the addition of animation or user interactivity.</a:t>
+            </a:r>
+          </a:p>
+          <a:p>
+            <a:r>
+              <a:rPr lang="en-US" dirty="0" smtClean="0"/>
+              <a:t>Be sure to ask me or any of our talented teaching assistants any questions that you might have.</a:t>
+            </a:r>
+          </a:p>
+          <a:p>
+            <a:r>
+              <a:rPr lang="en-US" dirty="0" smtClean="0"/>
+              <a:t>Above all, have fun!</a:t>
+            </a:r>
+            <a:endParaRPr lang="en-US" dirty="0"/>
           </a:p>
         </p:txBody>
       </p:sp>
     </p:spTree>
     <p:extLst>
       <p:ext uri="{BB962C8B-B14F-4D97-AF65-F5344CB8AC3E}">
-        <p14:creationId xmlns:p14="http://schemas.microsoft.com/office/powerpoint/2010/main" val="325812743"/>
+        <p14:creationId xmlns:p14="http://schemas.microsoft.com/office/powerpoint/2010/main" val="1254827601"/>
       </p:ext>
     </p:extLst>
   </p:cSld>
@@ -11663,59 +12143,44 @@
             </a:pPr>
             <a:r>
               <a:rPr lang="en-US" b="1" dirty="0" smtClean="0"/>
-              <a:t>Exhibitions and Inspiration</a:t>
-            </a:r>
-          </a:p>
-          <a:p>
-            <a:r>
-              <a:rPr lang="en-US" dirty="0" err="1" smtClean="0"/>
-              <a:t>OpenProcessing</a:t>
-            </a:r>
+              <a:t>The Processing Site:</a:t>
+            </a:r>
+          </a:p>
+          <a:p>
             <a:r>
               <a:rPr lang="en-US" dirty="0"/>
-              <a:t> </a:t>
+              <a:t>Opening Page </a:t>
             </a:r>
             <a:r>
               <a:rPr lang="en-US" dirty="0">
                 <a:hlinkClick r:id="rId2"/>
               </a:rPr>
-              <a:t>http://</a:t>
+              <a:t>https://</a:t>
             </a:r>
             <a:r>
               <a:rPr lang="en-US" dirty="0" smtClean="0">
                 <a:hlinkClick r:id="rId2"/>
               </a:rPr>
-              <a:t>www.openprocessing.org</a:t>
-            </a:r>
-            <a:r>
-              <a:rPr lang="en-US" dirty="0" smtClean="0"/>
-              <a:t> </a:t>
-            </a:r>
-          </a:p>
-          <a:p>
-            <a:r>
-              <a:rPr lang="en-US" dirty="0" err="1" smtClean="0"/>
-              <a:t>OpenProcessing</a:t>
-            </a:r>
-            <a:r>
-              <a:rPr lang="en-US" dirty="0" smtClean="0"/>
-              <a:t> </a:t>
-            </a:r>
+              <a:t>processing.org</a:t>
+            </a:r>
+            <a:endParaRPr lang="en-US" dirty="0" smtClean="0"/>
+          </a:p>
+          <a:p>
             <a:r>
               <a:rPr lang="en-US" dirty="0"/>
-              <a:t>Data Visualizations </a:t>
+              <a:t>Tutorials </a:t>
             </a:r>
             <a:r>
               <a:rPr lang="en-US" dirty="0">
                 <a:hlinkClick r:id="rId3"/>
               </a:rPr>
-              <a:t>http://www.openprocessing.org/collection/</a:t>
+              <a:t>https://processing.org/tutorials</a:t>
             </a:r>
             <a:r>
               <a:rPr lang="en-US" dirty="0" smtClean="0">
                 <a:hlinkClick r:id="rId3"/>
               </a:rPr>
-              <a:t>1122</a:t>
+              <a:t>/</a:t>
             </a:r>
             <a:r>
               <a:rPr lang="en-US" dirty="0" smtClean="0"/>
@@ -11724,18 +12189,14 @@
           </a:p>
           <a:p>
             <a:r>
-              <a:rPr lang="en-US" dirty="0" smtClean="0"/>
-              <a:t>Ben Fry’s </a:t>
-            </a:r>
-            <a:r>
               <a:rPr lang="en-US" dirty="0"/>
-              <a:t>Project Page </a:t>
+              <a:t>Examples </a:t>
             </a:r>
             <a:r>
               <a:rPr lang="en-US" dirty="0">
                 <a:hlinkClick r:id="rId4"/>
               </a:rPr>
-              <a:t>http://benfry.com/projects</a:t>
+              <a:t>https://processing.org/examples</a:t>
             </a:r>
             <a:r>
               <a:rPr lang="en-US" dirty="0" smtClean="0">
@@ -11745,10 +12206,54 @@
             </a:r>
             <a:r>
               <a:rPr lang="en-US" dirty="0" smtClean="0"/>
+              <a:t> or … </a:t>
+            </a:r>
+            <a:r>
+              <a:rPr lang="en-US" i="1" dirty="0" smtClean="0"/>
+              <a:t>open </a:t>
+            </a:r>
+            <a:r>
+              <a:rPr lang="en-US" i="1" dirty="0"/>
+              <a:t>Processing and </a:t>
+            </a:r>
+            <a:r>
+              <a:rPr lang="en-US" i="1" dirty="0" err="1"/>
+              <a:t>naviage</a:t>
+            </a:r>
+            <a:r>
+              <a:rPr lang="en-US" i="1" dirty="0"/>
+              <a:t> to FILE / </a:t>
+            </a:r>
+            <a:r>
+              <a:rPr lang="en-US" i="1" dirty="0" smtClean="0"/>
+              <a:t>EXAMPLES.</a:t>
+            </a:r>
+          </a:p>
+          <a:p>
+            <a:r>
+              <a:rPr lang="en-US" dirty="0"/>
+              <a:t>Exhibition</a:t>
+            </a:r>
+            <a:r>
+              <a:rPr lang="en-US" i="1" dirty="0"/>
               <a:t> </a:t>
             </a:r>
-          </a:p>
-          <a:p>
+            <a:r>
+              <a:rPr lang="en-US" i="1" dirty="0">
+                <a:hlinkClick r:id="rId5"/>
+              </a:rPr>
+              <a:t>https://processing.org/exhibition</a:t>
+            </a:r>
+            <a:r>
+              <a:rPr lang="en-US" i="1" dirty="0" smtClean="0">
+                <a:hlinkClick r:id="rId5"/>
+              </a:rPr>
+              <a:t>/</a:t>
+            </a:r>
+            <a:r>
+              <a:rPr lang="en-US" i="1" dirty="0" smtClean="0"/>
+              <a:t> </a:t>
+            </a:r>
             <a:endParaRPr lang="en-US" i="1" dirty="0"/>
           </a:p>
         </p:txBody>
@@ -11756,7 +12261,7 @@
     </p:spTree>
     <p:extLst>
       <p:ext uri="{BB962C8B-B14F-4D97-AF65-F5344CB8AC3E}">
-        <p14:creationId xmlns:p14="http://schemas.microsoft.com/office/powerpoint/2010/main" val="168351568"/>
+        <p14:creationId xmlns:p14="http://schemas.microsoft.com/office/powerpoint/2010/main" val="325812743"/>
       </p:ext>
     </p:extLst>
   </p:cSld>
@@ -11819,7 +12324,7 @@
         <p:spPr/>
         <p:txBody>
           <a:bodyPr>
-            <a:normAutofit/>
+            <a:normAutofit lnSpcReduction="10000"/>
           </a:bodyPr>
           <a:lstStyle/>
           <a:p>
@@ -11828,69 +12333,59 @@
             </a:pPr>
             <a:r>
               <a:rPr lang="en-US" b="1" dirty="0" smtClean="0"/>
-              <a:t>Processing and Programming Languages</a:t>
-            </a:r>
-          </a:p>
-          <a:p>
-            <a:r>
-              <a:rPr lang="en-US" dirty="0" smtClean="0"/>
-              <a:t>Processing in </a:t>
+              <a:t>Exhibitions and Inspiration</a:t>
+            </a:r>
+          </a:p>
+          <a:p>
+            <a:r>
+              <a:rPr lang="en-US" dirty="0" err="1" smtClean="0"/>
+              <a:t>OpenProcessing</a:t>
             </a:r>
             <a:r>
               <a:rPr lang="en-US" dirty="0"/>
-              <a:t>Java </a:t>
-            </a:r>
-            <a:r>
-              <a:rPr lang="en-US" dirty="0" smtClean="0"/>
-              <a:t/>
-            </a:r>
-            <a:br>
-              <a:rPr lang="en-US" dirty="0" smtClean="0"/>
-            </a:br>
+              <a:t> </a:t>
+            </a:r>
+            <a:r>
+              <a:rPr lang="en-US" dirty="0">
+                <a:hlinkClick r:id="rId2"/>
+              </a:rPr>
+              <a:t>http://</a:t>
+            </a:r>
             <a:r>
               <a:rPr lang="en-US" dirty="0" smtClean="0">
                 <a:hlinkClick r:id="rId2"/>
               </a:rPr>
-              <a:t>https</a:t>
-            </a:r>
-            <a:r>
-              <a:rPr lang="en-US" dirty="0">
-                <a:hlinkClick r:id="rId2"/>
-              </a:rPr>
-              <a:t>://</a:t>
-            </a:r>
-            <a:r>
-              <a:rPr lang="en-US" dirty="0" smtClean="0">
-                <a:hlinkClick r:id="rId2"/>
-              </a:rPr>
-              <a:t>processing.org</a:t>
+              <a:t>www.openprocessing.org</a:t>
             </a:r>
             <a:r>
               <a:rPr lang="en-US" dirty="0" smtClean="0"/>
               <a:t> </a:t>
             </a:r>
-            <a:endParaRPr lang="en-US" dirty="0"/>
-          </a:p>
-          <a:p>
-            <a:r>
-              <a:rPr lang="en-US" dirty="0" smtClean="0"/>
-              <a:t>Python mode </a:t>
+          </a:p>
+          <a:p>
+            <a:r>
+              <a:rPr lang="en-US" dirty="0" err="1" smtClean="0"/>
+              <a:t>OpenProcessing</a:t>
+            </a:r>
+            <a:r>
+              <a:rPr lang="en-US" dirty="0" smtClean="0"/>
+              <a:t> </a:t>
             </a:r>
             <a:r>
               <a:rPr lang="en-US" dirty="0"/>
-              <a:t>for Processing </a:t>
+              <a:t>Data Visualizations </a:t>
             </a:r>
             <a:r>
               <a:rPr lang="en-US" dirty="0">
                 <a:hlinkClick r:id="rId3"/>
               </a:rPr>
-              <a:t>http://</a:t>
+              <a:t>http://www.openprocessing.org/collection/</a:t>
             </a:r>
             <a:r>
               <a:rPr lang="en-US" dirty="0" smtClean="0">
                 <a:hlinkClick r:id="rId3"/>
               </a:rPr>
-              <a:t>py.processing.org</a:t>
+              <a:t>1122</a:t>
             </a:r>
             <a:r>
               <a:rPr lang="en-US" dirty="0" smtClean="0"/>
@@ -11900,23 +12395,23 @@
           <a:p>
             <a:r>
               <a:rPr lang="en-US" dirty="0" smtClean="0"/>
-              <a:t>Processing </a:t>
+              <a:t>Ben Fry’s </a:t>
             </a:r>
             <a:r>
               <a:rPr lang="en-US" dirty="0"/>
-              <a:t>and JavaScript </a:t>
+              <a:t>Project Page </a:t>
             </a:r>
             <a:r>
               <a:rPr lang="en-US" dirty="0">
                 <a:hlinkClick r:id="rId4"/>
               </a:rPr>
-              <a:t>http://</a:t>
+              <a:t>http://benfry.com/projects</a:t>
             </a:r>
             <a:r>
               <a:rPr lang="en-US" dirty="0" smtClean="0">
                 <a:hlinkClick r:id="rId4"/>
               </a:rPr>
-              <a:t>processingjs.org</a:t>
+              <a:t>/</a:t>
             </a:r>
             <a:r>
               <a:rPr lang="en-US" dirty="0" smtClean="0"/>
@@ -11931,7 +12426,7 @@
     </p:spTree>
     <p:extLst>
       <p:ext uri="{BB962C8B-B14F-4D97-AF65-F5344CB8AC3E}">
-        <p14:creationId xmlns:p14="http://schemas.microsoft.com/office/powerpoint/2010/main" val="2197109077"/>
+        <p14:creationId xmlns:p14="http://schemas.microsoft.com/office/powerpoint/2010/main" val="168351568"/>
       </p:ext>
     </p:extLst>
   </p:cSld>
@@ -12074,6 +12569,181 @@
 </file>
 
 <file path=ppt/slides/slide40.xml><?xml version="1.0" encoding="utf-8"?>
+<p:sld xmlns:a="http://schemas.openxmlformats.org/drawingml/2006/main" xmlns:r="http://schemas.openxmlformats.org/officeDocument/2006/relationships" xmlns:p="http://schemas.openxmlformats.org/presentationml/2006/main">
+  <p:cSld>
+    <p:spTree>
+      <p:nvGrpSpPr>
+        <p:cNvPr id="1" name=""/>
+        <p:cNvGrpSpPr/>
+        <p:nvPr/>
+      </p:nvGrpSpPr>
+      <p:grpSpPr>
+        <a:xfrm>
+          <a:off x="0" y="0"/>
+          <a:ext cx="0" cy="0"/>
+          <a:chOff x="0" y="0"/>
+          <a:chExt cx="0" cy="0"/>
+        </a:xfrm>
+      </p:grpSpPr>
+      <p:sp>
+        <p:nvSpPr>
+          <p:cNvPr id="2" name="Title 1"/>
+          <p:cNvSpPr>
+            <a:spLocks noGrp="1"/>
+          </p:cNvSpPr>
+          <p:nvPr>
+            <p:ph type="title"/>
+          </p:nvPr>
+        </p:nvSpPr>
+        <p:spPr/>
+        <p:txBody>
+          <a:bodyPr/>
+          <a:lstStyle/>
+          <a:p>
+            <a:r>
+              <a:rPr lang="en-US" dirty="0" smtClean="0"/>
+              <a:t>Bibliography</a:t>
+            </a:r>
+            <a:endParaRPr lang="en-US" dirty="0"/>
+          </a:p>
+        </p:txBody>
+      </p:sp>
+      <p:sp>
+        <p:nvSpPr>
+          <p:cNvPr id="3" name="Content Placeholder 2"/>
+          <p:cNvSpPr>
+            <a:spLocks noGrp="1"/>
+          </p:cNvSpPr>
+          <p:nvPr>
+            <p:ph idx="1"/>
+          </p:nvPr>
+        </p:nvSpPr>
+        <p:spPr/>
+        <p:txBody>
+          <a:bodyPr>
+            <a:normAutofit/>
+          </a:bodyPr>
+          <a:lstStyle/>
+          <a:p>
+            <a:pPr marL="0" indent="0" algn="ctr">
+              <a:buNone/>
+            </a:pPr>
+            <a:r>
+              <a:rPr lang="en-US" b="1" dirty="0" smtClean="0"/>
+              <a:t>Processing and Programming Languages</a:t>
+            </a:r>
+          </a:p>
+          <a:p>
+            <a:r>
+              <a:rPr lang="en-US" dirty="0" smtClean="0"/>
+              <a:t>Processing in </a:t>
+            </a:r>
+            <a:r>
+              <a:rPr lang="en-US" dirty="0"/>
+              <a:t>Java </a:t>
+            </a:r>
+            <a:r>
+              <a:rPr lang="en-US" dirty="0" smtClean="0"/>
+              <a:t/>
+            </a:r>
+            <a:br>
+              <a:rPr lang="en-US" dirty="0" smtClean="0"/>
+            </a:br>
+            <a:r>
+              <a:rPr lang="en-US" dirty="0" smtClean="0">
+                <a:hlinkClick r:id="rId2"/>
+              </a:rPr>
+              <a:t>https</a:t>
+            </a:r>
+            <a:r>
+              <a:rPr lang="en-US" dirty="0">
+                <a:hlinkClick r:id="rId2"/>
+              </a:rPr>
+              <a:t>://</a:t>
+            </a:r>
+            <a:r>
+              <a:rPr lang="en-US" dirty="0" smtClean="0">
+                <a:hlinkClick r:id="rId2"/>
+              </a:rPr>
+              <a:t>processing.org</a:t>
+            </a:r>
+            <a:r>
+              <a:rPr lang="en-US" dirty="0" smtClean="0"/>
+              <a:t> </a:t>
+            </a:r>
+            <a:endParaRPr lang="en-US" dirty="0"/>
+          </a:p>
+          <a:p>
+            <a:r>
+              <a:rPr lang="en-US" dirty="0" smtClean="0"/>
+              <a:t>Python mode </a:t>
+            </a:r>
+            <a:r>
+              <a:rPr lang="en-US" dirty="0"/>
+              <a:t>for Processing </a:t>
+            </a:r>
+            <a:r>
+              <a:rPr lang="en-US" dirty="0">
+                <a:hlinkClick r:id="rId3"/>
+              </a:rPr>
+              <a:t>http://</a:t>
+            </a:r>
+            <a:r>
+              <a:rPr lang="en-US" dirty="0" smtClean="0">
+                <a:hlinkClick r:id="rId3"/>
+              </a:rPr>
+              <a:t>py.processing.org</a:t>
+            </a:r>
+            <a:r>
+              <a:rPr lang="en-US" dirty="0" smtClean="0"/>
+              <a:t> </a:t>
+            </a:r>
+          </a:p>
+          <a:p>
+            <a:r>
+              <a:rPr lang="en-US" dirty="0" smtClean="0"/>
+              <a:t>Processing </a:t>
+            </a:r>
+            <a:r>
+              <a:rPr lang="en-US" dirty="0"/>
+              <a:t>and JavaScript </a:t>
+            </a:r>
+            <a:r>
+              <a:rPr lang="en-US" dirty="0">
+                <a:hlinkClick r:id="rId4"/>
+              </a:rPr>
+              <a:t>http://</a:t>
+            </a:r>
+            <a:r>
+              <a:rPr lang="en-US" dirty="0" smtClean="0">
+                <a:hlinkClick r:id="rId4"/>
+              </a:rPr>
+              <a:t>processingjs.org</a:t>
+            </a:r>
+            <a:r>
+              <a:rPr lang="en-US" dirty="0" smtClean="0"/>
+              <a:t> </a:t>
+            </a:r>
+          </a:p>
+          <a:p>
+            <a:endParaRPr lang="en-US" i="1" dirty="0"/>
+          </a:p>
+        </p:txBody>
+      </p:sp>
+    </p:spTree>
+    <p:extLst>
+      <p:ext uri="{BB962C8B-B14F-4D97-AF65-F5344CB8AC3E}">
+        <p14:creationId xmlns:p14="http://schemas.microsoft.com/office/powerpoint/2010/main" val="2197109077"/>
+      </p:ext>
+    </p:extLst>
+  </p:cSld>
+  <p:clrMapOvr>
+    <a:masterClrMapping/>
+  </p:clrMapOvr>
+</p:sld>
+</file>
+
+<file path=ppt/slides/slide41.xml><?xml version="1.0" encoding="utf-8"?>
 <p:sld xmlns:a="http://schemas.openxmlformats.org/drawingml/2006/main" xmlns:r="http://schemas.openxmlformats.org/officeDocument/2006/relationships" xmlns:p="http://schemas.openxmlformats.org/presentationml/2006/main">
   <p:cSld>
     <p:spTree>

</xml_diff>

<commit_message>
Additional changes after the Tech rehearsal
</commit_message>
<xml_diff>
--- a/Processing_Presentation_TF3_DE_notes.pptx
+++ b/Processing_Presentation_TF3_DE_notes.pptx
@@ -491,7 +491,7 @@
               <a:rPr lang="en-US" smtClean="0"/>
               <a:t>8/28/15</a:t>
             </a:fld>
-            <a:endParaRPr lang="en-US"/>
+            <a:endParaRPr lang="en-US" dirty="0"/>
           </a:p>
         </p:txBody>
       </p:sp>
@@ -523,7 +523,7 @@
             </a:lvl1pPr>
           </a:lstStyle>
           <a:p>
-            <a:endParaRPr lang="en-US"/>
+            <a:endParaRPr lang="en-US" dirty="0"/>
           </a:p>
         </p:txBody>
       </p:sp>
@@ -729,10 +729,10 @@
           </a:lstStyle>
           <a:p>
             <a:r>
-              <a:rPr lang="en-US" smtClean="0"/>
+              <a:rPr lang="en-US" dirty="0" smtClean="0"/>
               <a:t>Drag picture to placeholder or click icon to add</a:t>
             </a:r>
-            <a:endParaRPr/>
+            <a:endParaRPr dirty="0"/>
           </a:p>
         </p:txBody>
       </p:sp>
@@ -844,7 +844,7 @@
               <a:rPr lang="en-US" smtClean="0"/>
               <a:t>8/28/15</a:t>
             </a:fld>
-            <a:endParaRPr lang="en-US"/>
+            <a:endParaRPr lang="en-US" dirty="0"/>
           </a:p>
         </p:txBody>
       </p:sp>
@@ -863,7 +863,7 @@
           <a:bodyPr/>
           <a:lstStyle/>
           <a:p>
-            <a:endParaRPr lang="en-US"/>
+            <a:endParaRPr lang="en-US" dirty="0"/>
           </a:p>
         </p:txBody>
       </p:sp>
@@ -886,7 +886,7 @@
               <a:rPr lang="en-US" smtClean="0"/>
               <a:t>‹#›</a:t>
             </a:fld>
-            <a:endParaRPr lang="en-US"/>
+            <a:endParaRPr lang="en-US" dirty="0"/>
           </a:p>
         </p:txBody>
       </p:sp>
@@ -1104,10 +1104,10 @@
           </a:lstStyle>
           <a:p>
             <a:r>
-              <a:rPr lang="en-US" smtClean="0"/>
+              <a:rPr lang="en-US" dirty="0" smtClean="0"/>
               <a:t>Drag picture to placeholder or click icon to add</a:t>
             </a:r>
-            <a:endParaRPr/>
+            <a:endParaRPr dirty="0"/>
           </a:p>
         </p:txBody>
       </p:sp>
@@ -1219,7 +1219,7 @@
               <a:rPr lang="en-US" smtClean="0"/>
               <a:t>8/28/15</a:t>
             </a:fld>
-            <a:endParaRPr lang="en-US"/>
+            <a:endParaRPr lang="en-US" dirty="0"/>
           </a:p>
         </p:txBody>
       </p:sp>
@@ -1238,7 +1238,7 @@
           <a:bodyPr/>
           <a:lstStyle/>
           <a:p>
-            <a:endParaRPr lang="en-US"/>
+            <a:endParaRPr lang="en-US" dirty="0"/>
           </a:p>
         </p:txBody>
       </p:sp>
@@ -1261,7 +1261,7 @@
               <a:rPr lang="en-US" smtClean="0"/>
               <a:t>‹#›</a:t>
             </a:fld>
-            <a:endParaRPr lang="en-US"/>
+            <a:endParaRPr lang="en-US" dirty="0"/>
           </a:p>
         </p:txBody>
       </p:sp>
@@ -1452,7 +1452,7 @@
               <a:rPr lang="en-US" smtClean="0"/>
               <a:t>8/28/15</a:t>
             </a:fld>
-            <a:endParaRPr lang="en-US"/>
+            <a:endParaRPr lang="en-US" dirty="0"/>
           </a:p>
         </p:txBody>
       </p:sp>
@@ -1471,7 +1471,7 @@
           <a:bodyPr/>
           <a:lstStyle/>
           <a:p>
-            <a:endParaRPr lang="en-US"/>
+            <a:endParaRPr lang="en-US" dirty="0"/>
           </a:p>
         </p:txBody>
       </p:sp>
@@ -1494,7 +1494,7 @@
               <a:rPr lang="en-US" smtClean="0"/>
               <a:t>‹#›</a:t>
             </a:fld>
-            <a:endParaRPr lang="en-US"/>
+            <a:endParaRPr lang="en-US" dirty="0"/>
           </a:p>
         </p:txBody>
       </p:sp>
@@ -1695,7 +1695,7 @@
               <a:rPr lang="en-US" smtClean="0"/>
               <a:t>8/28/15</a:t>
             </a:fld>
-            <a:endParaRPr lang="en-US"/>
+            <a:endParaRPr lang="en-US" dirty="0"/>
           </a:p>
         </p:txBody>
       </p:sp>
@@ -1714,7 +1714,7 @@
           <a:bodyPr/>
           <a:lstStyle/>
           <a:p>
-            <a:endParaRPr lang="en-US"/>
+            <a:endParaRPr lang="en-US" dirty="0"/>
           </a:p>
         </p:txBody>
       </p:sp>
@@ -1737,7 +1737,7 @@
               <a:rPr lang="en-US" smtClean="0"/>
               <a:t>‹#›</a:t>
             </a:fld>
-            <a:endParaRPr lang="en-US"/>
+            <a:endParaRPr lang="en-US" dirty="0"/>
           </a:p>
         </p:txBody>
       </p:sp>
@@ -1928,7 +1928,7 @@
               <a:rPr lang="en-US" smtClean="0"/>
               <a:t>8/28/15</a:t>
             </a:fld>
-            <a:endParaRPr lang="en-US"/>
+            <a:endParaRPr lang="en-US" dirty="0"/>
           </a:p>
         </p:txBody>
       </p:sp>
@@ -1947,7 +1947,7 @@
           <a:bodyPr/>
           <a:lstStyle/>
           <a:p>
-            <a:endParaRPr lang="en-US"/>
+            <a:endParaRPr lang="en-US" dirty="0"/>
           </a:p>
         </p:txBody>
       </p:sp>
@@ -1970,7 +1970,7 @@
               <a:rPr lang="en-US" smtClean="0"/>
               <a:t>‹#›</a:t>
             </a:fld>
-            <a:endParaRPr lang="en-US"/>
+            <a:endParaRPr lang="en-US" dirty="0"/>
           </a:p>
         </p:txBody>
       </p:sp>
@@ -2323,7 +2323,7 @@
               <a:rPr lang="en-US" smtClean="0"/>
               <a:t>8/28/15</a:t>
             </a:fld>
-            <a:endParaRPr lang="en-US"/>
+            <a:endParaRPr lang="en-US" dirty="0"/>
           </a:p>
         </p:txBody>
       </p:sp>
@@ -2355,7 +2355,7 @@
             </a:lvl1pPr>
           </a:lstStyle>
           <a:p>
-            <a:endParaRPr lang="en-US"/>
+            <a:endParaRPr lang="en-US" dirty="0"/>
           </a:p>
         </p:txBody>
       </p:sp>
@@ -2448,10 +2448,10 @@
           </a:lstStyle>
           <a:p>
             <a:r>
-              <a:rPr lang="en-US" smtClean="0"/>
+              <a:rPr lang="en-US" dirty="0" smtClean="0"/>
               <a:t>Drag picture to placeholder or click icon to add</a:t>
             </a:r>
-            <a:endParaRPr/>
+            <a:endParaRPr dirty="0"/>
           </a:p>
         </p:txBody>
       </p:sp>
@@ -2663,7 +2663,7 @@
               <a:rPr lang="en-US" smtClean="0"/>
               <a:t>8/28/15</a:t>
             </a:fld>
-            <a:endParaRPr lang="en-US"/>
+            <a:endParaRPr lang="en-US" dirty="0"/>
           </a:p>
         </p:txBody>
       </p:sp>
@@ -2682,7 +2682,7 @@
           <a:bodyPr/>
           <a:lstStyle/>
           <a:p>
-            <a:endParaRPr lang="en-US"/>
+            <a:endParaRPr lang="en-US" dirty="0"/>
           </a:p>
         </p:txBody>
       </p:sp>
@@ -2705,7 +2705,7 @@
               <a:rPr lang="en-US" smtClean="0"/>
               <a:t>‹#›</a:t>
             </a:fld>
-            <a:endParaRPr lang="en-US"/>
+            <a:endParaRPr lang="en-US" dirty="0"/>
           </a:p>
         </p:txBody>
       </p:sp>
@@ -3166,7 +3166,7 @@
               <a:rPr lang="en-US" smtClean="0"/>
               <a:t>8/28/15</a:t>
             </a:fld>
-            <a:endParaRPr lang="en-US"/>
+            <a:endParaRPr lang="en-US" dirty="0"/>
           </a:p>
         </p:txBody>
       </p:sp>
@@ -3185,7 +3185,7 @@
           <a:bodyPr/>
           <a:lstStyle/>
           <a:p>
-            <a:endParaRPr lang="en-US"/>
+            <a:endParaRPr lang="en-US" dirty="0"/>
           </a:p>
         </p:txBody>
       </p:sp>
@@ -3208,7 +3208,7 @@
               <a:rPr lang="en-US" smtClean="0"/>
               <a:t>‹#›</a:t>
             </a:fld>
-            <a:endParaRPr lang="en-US"/>
+            <a:endParaRPr lang="en-US" dirty="0"/>
           </a:p>
         </p:txBody>
       </p:sp>
@@ -3675,7 +3675,7 @@
               <a:rPr lang="en-US" smtClean="0"/>
               <a:t>8/28/15</a:t>
             </a:fld>
-            <a:endParaRPr lang="en-US"/>
+            <a:endParaRPr lang="en-US" dirty="0"/>
           </a:p>
         </p:txBody>
       </p:sp>
@@ -3694,7 +3694,7 @@
           <a:bodyPr/>
           <a:lstStyle/>
           <a:p>
-            <a:endParaRPr lang="en-US"/>
+            <a:endParaRPr lang="en-US" dirty="0"/>
           </a:p>
         </p:txBody>
       </p:sp>
@@ -3717,7 +3717,7 @@
               <a:rPr lang="en-US" smtClean="0"/>
               <a:t>‹#›</a:t>
             </a:fld>
-            <a:endParaRPr lang="en-US"/>
+            <a:endParaRPr lang="en-US" dirty="0"/>
           </a:p>
         </p:txBody>
       </p:sp>
@@ -3914,7 +3914,7 @@
               <a:rPr lang="en-US" smtClean="0"/>
               <a:t>8/28/15</a:t>
             </a:fld>
-            <a:endParaRPr lang="en-US"/>
+            <a:endParaRPr lang="en-US" dirty="0"/>
           </a:p>
         </p:txBody>
       </p:sp>
@@ -3933,7 +3933,7 @@
           <a:bodyPr/>
           <a:lstStyle/>
           <a:p>
-            <a:endParaRPr lang="en-US"/>
+            <a:endParaRPr lang="en-US" dirty="0"/>
           </a:p>
         </p:txBody>
       </p:sp>
@@ -3956,7 +3956,7 @@
               <a:rPr lang="en-US" smtClean="0"/>
               <a:t>‹#›</a:t>
             </a:fld>
-            <a:endParaRPr lang="en-US"/>
+            <a:endParaRPr lang="en-US" dirty="0"/>
           </a:p>
         </p:txBody>
       </p:sp>
@@ -4028,7 +4028,7 @@
               <a:rPr lang="en-US" smtClean="0"/>
               <a:t>8/28/15</a:t>
             </a:fld>
-            <a:endParaRPr lang="en-US"/>
+            <a:endParaRPr lang="en-US" dirty="0"/>
           </a:p>
         </p:txBody>
       </p:sp>
@@ -4047,7 +4047,7 @@
           <a:bodyPr/>
           <a:lstStyle/>
           <a:p>
-            <a:endParaRPr lang="en-US"/>
+            <a:endParaRPr lang="en-US" dirty="0"/>
           </a:p>
         </p:txBody>
       </p:sp>
@@ -4070,7 +4070,7 @@
               <a:rPr lang="en-US" smtClean="0"/>
               <a:t>‹#›</a:t>
             </a:fld>
-            <a:endParaRPr lang="en-US"/>
+            <a:endParaRPr lang="en-US" dirty="0"/>
           </a:p>
         </p:txBody>
       </p:sp>
@@ -4374,7 +4374,7 @@
               <a:rPr lang="en-US" smtClean="0"/>
               <a:t>8/28/15</a:t>
             </a:fld>
-            <a:endParaRPr lang="en-US"/>
+            <a:endParaRPr lang="en-US" dirty="0"/>
           </a:p>
         </p:txBody>
       </p:sp>
@@ -4401,7 +4401,7 @@
             </a:lvl1pPr>
           </a:lstStyle>
           <a:p>
-            <a:endParaRPr lang="en-US"/>
+            <a:endParaRPr lang="en-US" dirty="0"/>
           </a:p>
         </p:txBody>
       </p:sp>
@@ -4440,7 +4440,7 @@
               <a:rPr lang="en-US" smtClean="0"/>
               <a:t>‹#›</a:t>
             </a:fld>
-            <a:endParaRPr lang="en-US"/>
+            <a:endParaRPr lang="en-US" dirty="0"/>
           </a:p>
         </p:txBody>
       </p:sp>
@@ -4607,7 +4607,7 @@
               <a:rPr lang="en-US" smtClean="0"/>
               <a:t>8/28/15</a:t>
             </a:fld>
-            <a:endParaRPr lang="en-US"/>
+            <a:endParaRPr lang="en-US" dirty="0"/>
           </a:p>
         </p:txBody>
       </p:sp>
@@ -4649,7 +4649,7 @@
               <a:rPr lang="en-US" smtClean="0"/>
               <a:t>‹#›</a:t>
             </a:fld>
-            <a:endParaRPr lang="en-US"/>
+            <a:endParaRPr lang="en-US" dirty="0"/>
           </a:p>
         </p:txBody>
       </p:sp>
@@ -4687,7 +4687,7 @@
             </a:lvl1pPr>
           </a:lstStyle>
           <a:p>
-            <a:endParaRPr lang="en-US"/>
+            <a:endParaRPr lang="en-US" dirty="0"/>
           </a:p>
         </p:txBody>
       </p:sp>
@@ -5203,9 +5203,6 @@
               </a:rPr>
               <a:t>Use the square “stop” button before playing a second time.</a:t>
             </a:r>
-            <a:endParaRPr lang="en-US" dirty="0" smtClean="0">
-              <a:cs typeface="Courier New"/>
-            </a:endParaRPr>
           </a:p>
           <a:p>
             <a:pPr marL="0" indent="0">
@@ -5409,7 +5406,7 @@
               <a:t>(</a:t>
             </a:r>
             <a:r>
-              <a:rPr lang="en-US" i="1" dirty="0" err="1"/>
+              <a:rPr lang="en-US" i="1" dirty="0"/>
               <a:t>a,b,c,d</a:t>
             </a:r>
             <a:r>
@@ -5429,7 +5426,7 @@
               <a:t>(</a:t>
             </a:r>
             <a:r>
-              <a:rPr lang="en-US" i="1" dirty="0" err="1"/>
+              <a:rPr lang="en-US" i="1" dirty="0"/>
               <a:t>a,b</a:t>
             </a:r>
             <a:r>
@@ -5446,15 +5443,7 @@
             </a:r>
             <a:r>
               <a:rPr lang="en-US" i="1" dirty="0" smtClean="0"/>
-              <a:t>(</a:t>
-            </a:r>
-            <a:r>
-              <a:rPr lang="en-US" i="1" dirty="0" err="1" smtClean="0"/>
-              <a:t>x,y</a:t>
-            </a:r>
-            <a:r>
-              <a:rPr lang="en-US" i="1" dirty="0" smtClean="0"/>
-              <a:t>)</a:t>
+              <a:t>(x,y)</a:t>
             </a:r>
             <a:r>
               <a:rPr lang="en-US" dirty="0" smtClean="0"/>
@@ -5473,7 +5462,7 @@
               <a:t>(</a:t>
             </a:r>
             <a:r>
-              <a:rPr lang="en-US" i="1" dirty="0" err="1"/>
+              <a:rPr lang="en-US" i="1" dirty="0"/>
               <a:t>c,d</a:t>
             </a:r>
             <a:r>
@@ -5490,15 +5479,7 @@
             </a:r>
             <a:r>
               <a:rPr lang="en-US" i="1" dirty="0" smtClean="0"/>
-              <a:t>(</a:t>
-            </a:r>
-            <a:r>
-              <a:rPr lang="en-US" i="1" dirty="0" err="1" smtClean="0"/>
-              <a:t>x,y</a:t>
-            </a:r>
-            <a:r>
-              <a:rPr lang="en-US" i="1" dirty="0" smtClean="0"/>
-              <a:t>)</a:t>
+              <a:t>(x,y)</a:t>
             </a:r>
             <a:r>
               <a:rPr lang="en-US" dirty="0" smtClean="0"/>
@@ -5722,19 +5703,7 @@
               <a:rPr lang="en-US" dirty="0" smtClean="0">
                 <a:cs typeface="Courier New"/>
               </a:rPr>
-              <a:t>In other words, anytime you want to draw a line, you can call the line function and spell out the (</a:t>
-            </a:r>
-            <a:r>
-              <a:rPr lang="en-US" dirty="0" err="1" smtClean="0">
-                <a:cs typeface="Courier New"/>
-              </a:rPr>
-              <a:t>x,y</a:t>
-            </a:r>
-            <a:r>
-              <a:rPr lang="en-US" dirty="0" smtClean="0">
-                <a:cs typeface="Courier New"/>
-              </a:rPr>
-              <a:t>) coordinates for the two points that define your line.</a:t>
+              <a:t>In other words, anytime you want to draw a line, you can call the line function and spell out the (x,y) coordinates for the two points that define your line.</a:t>
             </a:r>
             <a:endParaRPr lang="en-US" dirty="0"/>
           </a:p>
@@ -5862,15 +5831,7 @@
           <a:p>
             <a:r>
               <a:rPr lang="en-US" dirty="0" smtClean="0"/>
-              <a:t>When you create a sketch, it is saved in a folder along with a .</a:t>
-            </a:r>
-            <a:r>
-              <a:rPr lang="en-US" dirty="0" err="1" smtClean="0"/>
-              <a:t>pde</a:t>
-            </a:r>
-            <a:r>
-              <a:rPr lang="en-US" dirty="0" smtClean="0"/>
-              <a:t> file of the same name. For example, the above drawing is stored in a folder called </a:t>
+              <a:t>When you create a sketch, it is saved in a folder along with a .pde file of the same name. For example, the above drawing is stored in a folder called </a:t>
             </a:r>
             <a:r>
               <a:rPr lang="en-US" dirty="0" smtClean="0">
@@ -6203,16 +6164,11 @@
               <a:rPr lang="en-US" dirty="0" smtClean="0"/>
               <a:t>) and we will measure each of the three colors in a range of 0-255. </a:t>
             </a:r>
-            <a:endParaRPr lang="en-US" dirty="0" smtClean="0"/>
-          </a:p>
-          <a:p>
-            <a:r>
-              <a:rPr lang="en-US" dirty="0" smtClean="0"/>
-              <a:t>Color </a:t>
-            </a:r>
-            <a:r>
-              <a:rPr lang="en-US" dirty="0" smtClean="0"/>
-              <a:t>can be defined for </a:t>
+          </a:p>
+          <a:p>
+            <a:r>
+              <a:rPr lang="en-US" dirty="0" smtClean="0"/>
+              <a:t>Color can be defined for </a:t>
             </a:r>
             <a:r>
               <a:rPr lang="en-US" b="1" i="1" dirty="0" smtClean="0"/>
@@ -6237,7 +6193,7 @@
               <a:t>(Hint: use </a:t>
             </a:r>
             <a:r>
-              <a:rPr lang="en-US" b="1" i="1" dirty="0" err="1" smtClean="0"/>
+              <a:rPr lang="en-US" b="1" i="1" dirty="0" smtClean="0"/>
               <a:t>nofill</a:t>
             </a:r>
             <a:r>
@@ -6925,7 +6881,7 @@
               <a:t>line (</a:t>
             </a:r>
             <a:r>
-              <a:rPr lang="en-US" i="1" dirty="0" err="1" smtClean="0"/>
+              <a:rPr lang="en-US" i="1" dirty="0" smtClean="0"/>
               <a:t>a,b,c,d</a:t>
             </a:r>
             <a:r>
@@ -6941,7 +6897,7 @@
               <a:t>(</a:t>
             </a:r>
             <a:r>
-              <a:rPr lang="en-US" i="1" dirty="0" err="1" smtClean="0"/>
+              <a:rPr lang="en-US" i="1" dirty="0" smtClean="0"/>
               <a:t>a,b</a:t>
             </a:r>
             <a:r>
@@ -6957,7 +6913,7 @@
               <a:t>(</a:t>
             </a:r>
             <a:r>
-              <a:rPr lang="en-US" i="1" dirty="0" err="1" smtClean="0"/>
+              <a:rPr lang="en-US" i="1" dirty="0" smtClean="0"/>
               <a:t>c,d</a:t>
             </a:r>
             <a:r>
@@ -6975,7 +6931,7 @@
               <a:t>Rectangle: </a:t>
             </a:r>
             <a:r>
-              <a:rPr lang="en-US" i="1" dirty="0" err="1" smtClean="0"/>
+              <a:rPr lang="en-US" i="1" dirty="0" smtClean="0"/>
               <a:t>rect</a:t>
             </a:r>
             <a:r>
@@ -6983,7 +6939,7 @@
               <a:t>(</a:t>
             </a:r>
             <a:r>
-              <a:rPr lang="en-US" i="1" dirty="0" err="1" smtClean="0"/>
+              <a:rPr lang="en-US" i="1" dirty="0" smtClean="0"/>
               <a:t>a,b,c,d</a:t>
             </a:r>
             <a:r>
@@ -6999,7 +6955,7 @@
               <a:t>(</a:t>
             </a:r>
             <a:r>
-              <a:rPr lang="en-US" i="1" dirty="0" err="1" smtClean="0"/>
+              <a:rPr lang="en-US" i="1" dirty="0" smtClean="0"/>
               <a:t>a,b</a:t>
             </a:r>
             <a:r>
@@ -7037,7 +6993,7 @@
               <a:t>ellipse(</a:t>
             </a:r>
             <a:r>
-              <a:rPr lang="en-US" i="1" dirty="0" err="1" smtClean="0"/>
+              <a:rPr lang="en-US" i="1" dirty="0" smtClean="0"/>
               <a:t>a,b,c,d</a:t>
             </a:r>
             <a:r>
@@ -7053,7 +7009,7 @@
               <a:t>(</a:t>
             </a:r>
             <a:r>
-              <a:rPr lang="en-US" i="1" dirty="0" err="1" smtClean="0"/>
+              <a:rPr lang="en-US" i="1" dirty="0" smtClean="0"/>
               <a:t>a,b</a:t>
             </a:r>
             <a:r>
@@ -7115,7 +7071,7 @@
               <a:t>triangle(</a:t>
             </a:r>
             <a:r>
-              <a:rPr lang="en-US" i="1" dirty="0" err="1" smtClean="0"/>
+              <a:rPr lang="en-US" i="1" dirty="0" smtClean="0"/>
               <a:t>a,b,c,d,e,f</a:t>
             </a:r>
             <a:r>
@@ -7131,7 +7087,7 @@
               <a:t>(</a:t>
             </a:r>
             <a:r>
-              <a:rPr lang="en-US" i="1" dirty="0" err="1" smtClean="0"/>
+              <a:rPr lang="en-US" i="1" dirty="0" smtClean="0"/>
               <a:t>a,b</a:t>
             </a:r>
             <a:r>
@@ -7147,7 +7103,7 @@
               <a:t>(</a:t>
             </a:r>
             <a:r>
-              <a:rPr lang="en-US" i="1" dirty="0" err="1" smtClean="0"/>
+              <a:rPr lang="en-US" i="1" dirty="0" smtClean="0"/>
               <a:t>c,d</a:t>
             </a:r>
             <a:r>
@@ -7163,7 +7119,7 @@
               <a:t>(</a:t>
             </a:r>
             <a:r>
-              <a:rPr lang="en-US" i="1" dirty="0" err="1" smtClean="0"/>
+              <a:rPr lang="en-US" i="1" dirty="0" smtClean="0"/>
               <a:t>e,f</a:t>
             </a:r>
             <a:r>
@@ -7267,7 +7223,6 @@
               <a:rPr lang="en-US" sz="3300" dirty="0" smtClean="0"/>
               <a:t>Shapes:</a:t>
             </a:r>
-            <a:endParaRPr lang="en-US" sz="3300" dirty="0" smtClean="0"/>
           </a:p>
           <a:p>
             <a:pPr marL="0" indent="0">
@@ -7282,7 +7237,7 @@
               <a:t>line (</a:t>
             </a:r>
             <a:r>
-              <a:rPr lang="en-US" i="1" dirty="0" err="1" smtClean="0"/>
+              <a:rPr lang="en-US" i="1" dirty="0" smtClean="0"/>
               <a:t>a,b,c,d</a:t>
             </a:r>
             <a:r>
@@ -7298,7 +7253,7 @@
               <a:t>(</a:t>
             </a:r>
             <a:r>
-              <a:rPr lang="en-US" i="1" dirty="0" err="1" smtClean="0"/>
+              <a:rPr lang="en-US" i="1" dirty="0" smtClean="0"/>
               <a:t>a,b</a:t>
             </a:r>
             <a:r>
@@ -7314,7 +7269,7 @@
               <a:t>(</a:t>
             </a:r>
             <a:r>
-              <a:rPr lang="en-US" i="1" dirty="0" err="1" smtClean="0"/>
+              <a:rPr lang="en-US" i="1" dirty="0" smtClean="0"/>
               <a:t>c,d</a:t>
             </a:r>
             <a:r>
@@ -7335,7 +7290,7 @@
               <a:t>Rectangle: </a:t>
             </a:r>
             <a:r>
-              <a:rPr lang="en-US" i="1" dirty="0" err="1" smtClean="0"/>
+              <a:rPr lang="en-US" i="1" dirty="0" smtClean="0"/>
               <a:t>rect</a:t>
             </a:r>
             <a:r>
@@ -7343,7 +7298,7 @@
               <a:t>(</a:t>
             </a:r>
             <a:r>
-              <a:rPr lang="en-US" i="1" dirty="0" err="1" smtClean="0"/>
+              <a:rPr lang="en-US" i="1" dirty="0" smtClean="0"/>
               <a:t>a,b,c,d</a:t>
             </a:r>
             <a:r>
@@ -7359,7 +7314,7 @@
               <a:t>(</a:t>
             </a:r>
             <a:r>
-              <a:rPr lang="en-US" i="1" dirty="0" err="1" smtClean="0"/>
+              <a:rPr lang="en-US" i="1" dirty="0" smtClean="0"/>
               <a:t>a,b</a:t>
             </a:r>
             <a:r>
@@ -7400,7 +7355,7 @@
               <a:t>ellipse(</a:t>
             </a:r>
             <a:r>
-              <a:rPr lang="en-US" i="1" dirty="0" err="1" smtClean="0"/>
+              <a:rPr lang="en-US" i="1" dirty="0" smtClean="0"/>
               <a:t>a,b,c,d</a:t>
             </a:r>
             <a:r>
@@ -7416,7 +7371,7 @@
               <a:t>(</a:t>
             </a:r>
             <a:r>
-              <a:rPr lang="en-US" i="1" dirty="0" err="1" smtClean="0"/>
+              <a:rPr lang="en-US" i="1" dirty="0" smtClean="0"/>
               <a:t>a,b</a:t>
             </a:r>
             <a:r>
@@ -7481,7 +7436,7 @@
               <a:t>triangle(</a:t>
             </a:r>
             <a:r>
-              <a:rPr lang="en-US" i="1" dirty="0" err="1" smtClean="0"/>
+              <a:rPr lang="en-US" i="1" dirty="0" smtClean="0"/>
               <a:t>a,b,c,d,e,f</a:t>
             </a:r>
             <a:r>
@@ -7497,7 +7452,7 @@
               <a:t>(</a:t>
             </a:r>
             <a:r>
-              <a:rPr lang="en-US" i="1" dirty="0" err="1" smtClean="0"/>
+              <a:rPr lang="en-US" i="1" dirty="0" smtClean="0"/>
               <a:t>a,b</a:t>
             </a:r>
             <a:r>
@@ -7513,7 +7468,7 @@
               <a:t>(</a:t>
             </a:r>
             <a:r>
-              <a:rPr lang="en-US" i="1" dirty="0" err="1" smtClean="0"/>
+              <a:rPr lang="en-US" i="1" dirty="0" smtClean="0"/>
               <a:t>c,d</a:t>
             </a:r>
             <a:r>
@@ -7529,7 +7484,7 @@
               <a:t>(</a:t>
             </a:r>
             <a:r>
-              <a:rPr lang="en-US" i="1" dirty="0" err="1" smtClean="0"/>
+              <a:rPr lang="en-US" i="1" dirty="0" smtClean="0"/>
               <a:t>e,f</a:t>
             </a:r>
             <a:r>
@@ -8039,7 +7994,7 @@
               <a:t> (</a:t>
             </a:r>
             <a:r>
-              <a:rPr lang="en-US" sz="2000" i="1" dirty="0" err="1"/>
+              <a:rPr lang="en-US" sz="2000" i="1" dirty="0"/>
               <a:t>Reas</a:t>
             </a:r>
             <a:r>
@@ -8130,11 +8085,7 @@
           <a:p>
             <a:r>
               <a:rPr lang="en-US" dirty="0" smtClean="0"/>
-              <a:t>September </a:t>
-            </a:r>
-            <a:r>
-              <a:rPr lang="en-US" dirty="0" smtClean="0"/>
-              <a:t>26, 2015</a:t>
+              <a:t>September 26, 2015</a:t>
             </a:r>
             <a:endParaRPr lang="en-US" dirty="0"/>
           </a:p>
@@ -8526,7 +8477,7 @@
               <a:t>'</a:t>
             </a:r>
             <a:r>
-              <a:rPr lang="en-US" sz="1800" dirty="0" err="1"/>
+              <a:rPr lang="en-US" sz="1800" dirty="0"/>
               <a:t>Hommage</a:t>
             </a:r>
             <a:r>
@@ -8534,7 +8485,7 @@
               <a:t> </a:t>
             </a:r>
             <a:r>
-              <a:rPr lang="en-US" sz="1800" dirty="0" err="1"/>
+              <a:rPr lang="en-US" sz="1800" dirty="0"/>
               <a:t>à</a:t>
             </a:r>
             <a:r>
@@ -8542,7 +8493,7 @@
               <a:t> Paul Klee 13/9/65 Nr.2', a </a:t>
             </a:r>
             <a:r>
-              <a:rPr lang="en-US" sz="1800" dirty="0" err="1"/>
+              <a:rPr lang="en-US" sz="1800" dirty="0"/>
               <a:t>screenprint</a:t>
             </a:r>
             <a:r>
@@ -8550,7 +8501,7 @@
               <a:t> of a plotter drawing created by </a:t>
             </a:r>
             <a:r>
-              <a:rPr lang="en-US" sz="1800" dirty="0" err="1"/>
+              <a:rPr lang="en-US" sz="1800" dirty="0"/>
               <a:t>Frieder</a:t>
             </a:r>
             <a:r>
@@ -8558,7 +8509,7 @@
               <a:t> </a:t>
             </a:r>
             <a:r>
-              <a:rPr lang="en-US" sz="1800" dirty="0" err="1"/>
+              <a:rPr lang="en-US" sz="1800" dirty="0"/>
               <a:t>Nake</a:t>
             </a:r>
             <a:r>
@@ -8796,13 +8747,21 @@
         </p:spPr>
         <p:txBody>
           <a:bodyPr>
-            <a:normAutofit/>
+            <a:normAutofit lnSpcReduction="10000"/>
           </a:bodyPr>
           <a:lstStyle/>
           <a:p>
             <a:r>
               <a:rPr lang="en-US" dirty="0"/>
-              <a:t>What are facets of software art that have gone beyond the realm of traditional media</a:t>
+              <a:t>What </a:t>
+            </a:r>
+            <a:r>
+              <a:rPr lang="en-US" dirty="0" smtClean="0"/>
+              <a:t>are some examples </a:t>
+            </a:r>
+            <a:r>
+              <a:rPr lang="en-US" dirty="0"/>
+              <a:t>of software art that have gone beyond the realm of traditional media</a:t>
             </a:r>
             <a:r>
               <a:rPr lang="en-US" dirty="0" smtClean="0"/>
@@ -8834,7 +8793,11 @@
             <a:pPr lvl="1"/>
             <a:r>
               <a:rPr lang="en-US" dirty="0" smtClean="0"/>
-              <a:t>And more ...</a:t>
+              <a:t>And many </a:t>
+            </a:r>
+            <a:r>
+              <a:rPr lang="en-US" dirty="0" smtClean="0"/>
+              <a:t>more ...</a:t>
             </a:r>
             <a:endParaRPr lang="en-US" dirty="0"/>
           </a:p>
@@ -9164,18 +9127,11 @@
               <a:buNone/>
             </a:pPr>
             <a:r>
-              <a:rPr lang="en-US" sz="2900" dirty="0" err="1">
-                <a:latin typeface="Courier New"/>
-                <a:cs typeface="Courier New"/>
-              </a:rPr>
-              <a:t>int</a:t>
-            </a:r>
-            <a:r>
               <a:rPr lang="en-US" sz="2900" dirty="0">
                 <a:latin typeface="Courier New"/>
                 <a:cs typeface="Courier New"/>
               </a:rPr>
-              <a:t> x = 200;</a:t>
+              <a:t>int x = 200;</a:t>
             </a:r>
           </a:p>
           <a:p>
@@ -9189,18 +9145,11 @@
               <a:buNone/>
             </a:pPr>
             <a:r>
-              <a:rPr lang="en-US" sz="2900" dirty="0" err="1">
-                <a:latin typeface="Courier New"/>
-                <a:cs typeface="Courier New"/>
-              </a:rPr>
-              <a:t>int</a:t>
-            </a:r>
-            <a:r>
               <a:rPr lang="en-US" sz="2900" dirty="0">
                 <a:latin typeface="Courier New"/>
                 <a:cs typeface="Courier New"/>
               </a:rPr>
-              <a:t> y = 200;</a:t>
+              <a:t>int y = 200;</a:t>
             </a:r>
           </a:p>
           <a:p>
@@ -9214,18 +9163,11 @@
               <a:buNone/>
             </a:pPr>
             <a:r>
-              <a:rPr lang="en-US" sz="2900" dirty="0" err="1">
-                <a:latin typeface="Courier New"/>
-                <a:cs typeface="Courier New"/>
-              </a:rPr>
-              <a:t>int</a:t>
-            </a:r>
-            <a:r>
               <a:rPr lang="en-US" sz="2900" dirty="0">
                 <a:latin typeface="Courier New"/>
                 <a:cs typeface="Courier New"/>
               </a:rPr>
-              <a:t> w = 100;</a:t>
+              <a:t>int w = 100;</a:t>
             </a:r>
           </a:p>
           <a:p>
@@ -9239,18 +9181,11 @@
               <a:buNone/>
             </a:pPr>
             <a:r>
-              <a:rPr lang="en-US" sz="2900" dirty="0" err="1">
-                <a:latin typeface="Courier New"/>
-                <a:cs typeface="Courier New"/>
-              </a:rPr>
-              <a:t>int</a:t>
-            </a:r>
-            <a:r>
               <a:rPr lang="en-US" sz="2900" dirty="0">
                 <a:latin typeface="Courier New"/>
                 <a:cs typeface="Courier New"/>
               </a:rPr>
-              <a:t> h = 100;</a:t>
+              <a:t>int h = 100;</a:t>
             </a:r>
           </a:p>
           <a:p>
@@ -9286,27 +9221,13 @@
                 <a:latin typeface="Courier New"/>
                 <a:cs typeface="Courier New"/>
               </a:rPr>
-              <a:t>for (</a:t>
-            </a:r>
-            <a:r>
-              <a:rPr lang="en-US" sz="2900" dirty="0" err="1">
-                <a:latin typeface="Courier New"/>
-                <a:cs typeface="Courier New"/>
-              </a:rPr>
-              <a:t>int</a:t>
+              <a:t>for (int </a:t>
             </a:r>
             <a:r>
               <a:rPr lang="en-US" sz="2900" dirty="0">
                 <a:latin typeface="Courier New"/>
                 <a:cs typeface="Courier New"/>
               </a:rPr>
-              <a:t> </a:t>
-            </a:r>
-            <a:r>
-              <a:rPr lang="en-US" sz="2900" dirty="0" err="1">
-                <a:latin typeface="Courier New"/>
-                <a:cs typeface="Courier New"/>
-              </a:rPr>
               <a:t>i</a:t>
             </a:r>
             <a:r>
@@ -9317,7 +9238,7 @@
               <a:t>=1; </a:t>
             </a:r>
             <a:r>
-              <a:rPr lang="en-US" sz="2900" dirty="0" err="1">
+              <a:rPr lang="en-US" sz="2900" dirty="0">
                 <a:latin typeface="Courier New"/>
                 <a:cs typeface="Courier New"/>
               </a:rPr>
@@ -9331,7 +9252,7 @@
               <a:t>&lt;6; </a:t>
             </a:r>
             <a:r>
-              <a:rPr lang="en-US" sz="2900" dirty="0" err="1">
+              <a:rPr lang="en-US" sz="2900" dirty="0">
                 <a:latin typeface="Courier New"/>
                 <a:cs typeface="Courier New"/>
               </a:rPr>
@@ -9435,7 +9356,7 @@
               <a:t>  ellipse(</a:t>
             </a:r>
             <a:r>
-              <a:rPr lang="en-US" sz="2900" dirty="0" err="1">
+              <a:rPr lang="en-US" sz="2900" dirty="0">
                 <a:latin typeface="Courier New"/>
                 <a:cs typeface="Courier New"/>
               </a:rPr>
@@ -9940,7 +9861,7 @@
               <a:t>By Leonard </a:t>
             </a:r>
             <a:r>
-              <a:rPr lang="en-US" sz="1800" dirty="0" err="1" smtClean="0"/>
+              <a:rPr lang="en-US" sz="1800" dirty="0" smtClean="0"/>
               <a:t>Shlain</a:t>
             </a:r>
             <a:r>
@@ -10475,15 +10396,7 @@
             </a:pPr>
             <a:r>
               <a:rPr lang="en-US" sz="1400" dirty="0" smtClean="0"/>
-              <a:t>  </a:t>
-            </a:r>
-            <a:r>
-              <a:rPr lang="en-US" sz="1400" dirty="0" err="1" smtClean="0"/>
-              <a:t>int</a:t>
-            </a:r>
-            <a:r>
-              <a:rPr lang="en-US" sz="1400" dirty="0" smtClean="0"/>
-              <a:t> x = 200;</a:t>
+              <a:t>  int x = 200;</a:t>
             </a:r>
           </a:p>
           <a:p>
@@ -10499,15 +10412,7 @@
             </a:pPr>
             <a:r>
               <a:rPr lang="en-US" sz="1400" dirty="0" smtClean="0"/>
-              <a:t>  </a:t>
-            </a:r>
-            <a:r>
-              <a:rPr lang="en-US" sz="1400" dirty="0" err="1" smtClean="0"/>
-              <a:t>int</a:t>
-            </a:r>
-            <a:r>
-              <a:rPr lang="en-US" sz="1400" dirty="0" smtClean="0"/>
-              <a:t> y = 200;</a:t>
+              <a:t>  int y = 200;</a:t>
             </a:r>
           </a:p>
           <a:p>
@@ -10523,15 +10428,7 @@
             </a:pPr>
             <a:r>
               <a:rPr lang="en-US" sz="1400" dirty="0" smtClean="0"/>
-              <a:t>  </a:t>
-            </a:r>
-            <a:r>
-              <a:rPr lang="en-US" sz="1400" dirty="0" err="1" smtClean="0"/>
-              <a:t>int</a:t>
-            </a:r>
-            <a:r>
-              <a:rPr lang="en-US" sz="1400" dirty="0" smtClean="0"/>
-              <a:t> w = 100;</a:t>
+              <a:t>  int w = 100;</a:t>
             </a:r>
           </a:p>
           <a:p>
@@ -10547,15 +10444,7 @@
             </a:pPr>
             <a:r>
               <a:rPr lang="en-US" sz="1400" dirty="0" smtClean="0"/>
-              <a:t>  </a:t>
-            </a:r>
-            <a:r>
-              <a:rPr lang="en-US" sz="1400" dirty="0" err="1" smtClean="0"/>
-              <a:t>int</a:t>
-            </a:r>
-            <a:r>
-              <a:rPr lang="en-US" sz="1400" dirty="0" smtClean="0"/>
-              <a:t> h = 100;</a:t>
+              <a:t>  int h = 100;</a:t>
             </a:r>
           </a:p>
           <a:p>
@@ -10587,18 +10476,10 @@
             </a:pPr>
             <a:r>
               <a:rPr lang="en-US" sz="1400" dirty="0" smtClean="0"/>
-              <a:t>  for (</a:t>
-            </a:r>
-            <a:r>
-              <a:rPr lang="en-US" sz="1400" dirty="0" err="1" smtClean="0"/>
-              <a:t>int</a:t>
+              <a:t>  for (int </a:t>
             </a:r>
             <a:r>
               <a:rPr lang="en-US" sz="1400" dirty="0" smtClean="0"/>
-              <a:t> </a:t>
-            </a:r>
-            <a:r>
-              <a:rPr lang="en-US" sz="1400" dirty="0" err="1" smtClean="0"/>
               <a:t>i</a:t>
             </a:r>
             <a:r>
@@ -10606,7 +10487,7 @@
               <a:t>=1; </a:t>
             </a:r>
             <a:r>
-              <a:rPr lang="en-US" sz="1400" dirty="0" err="1" smtClean="0"/>
+              <a:rPr lang="en-US" sz="1400" dirty="0" smtClean="0"/>
               <a:t>i</a:t>
             </a:r>
             <a:r>
@@ -10614,7 +10495,7 @@
               <a:t>&lt;6; </a:t>
             </a:r>
             <a:r>
-              <a:rPr lang="en-US" sz="1400" dirty="0" err="1" smtClean="0"/>
+              <a:rPr lang="en-US" sz="1400" dirty="0" smtClean="0"/>
               <a:t>i</a:t>
             </a:r>
             <a:r>
@@ -10702,7 +10583,7 @@
               <a:t>    ellipse(</a:t>
             </a:r>
             <a:r>
-              <a:rPr lang="en-US" sz="1400" dirty="0" err="1" smtClean="0"/>
+              <a:rPr lang="en-US" sz="1400" dirty="0" smtClean="0"/>
               <a:t>x,y,w,h</a:t>
             </a:r>
             <a:r>
@@ -10959,21 +10840,14 @@
               <a:buNone/>
             </a:pPr>
             <a:r>
-              <a:rPr lang="en-US" dirty="0" err="1">
-                <a:latin typeface="Courier New"/>
-                <a:cs typeface="Courier New"/>
-              </a:rPr>
-              <a:t>int</a:t>
-            </a:r>
-            <a:r>
               <a:rPr lang="en-US" dirty="0">
                 <a:latin typeface="Courier New"/>
                 <a:cs typeface="Courier New"/>
               </a:rPr>
-              <a:t> </a:t>
-            </a:r>
-            <a:r>
-              <a:rPr lang="en-US" dirty="0" err="1">
+              <a:t>int </a:t>
+            </a:r>
+            <a:r>
+              <a:rPr lang="en-US" dirty="0">
                 <a:latin typeface="Courier New"/>
                 <a:cs typeface="Courier New"/>
               </a:rPr>
@@ -11131,7 +11005,7 @@
               <a:t>  </a:t>
             </a:r>
             <a:r>
-              <a:rPr lang="en-US" dirty="0" err="1">
+              <a:rPr lang="en-US" dirty="0">
                 <a:latin typeface="Courier New"/>
                 <a:cs typeface="Courier New"/>
               </a:rPr>
@@ -11163,7 +11037,7 @@
               <a:t>  if (</a:t>
             </a:r>
             <a:r>
-              <a:rPr lang="en-US" dirty="0" err="1">
+              <a:rPr lang="en-US" dirty="0">
                 <a:latin typeface="Courier New"/>
                 <a:cs typeface="Courier New"/>
               </a:rPr>
@@ -11195,7 +11069,7 @@
               <a:t>     </a:t>
             </a:r>
             <a:r>
-              <a:rPr lang="en-US" dirty="0" err="1">
+              <a:rPr lang="en-US" dirty="0">
                 <a:latin typeface="Courier New"/>
                 <a:cs typeface="Courier New"/>
               </a:rPr>
@@ -11332,21 +11206,14 @@
               <a:buNone/>
             </a:pPr>
             <a:r>
-              <a:rPr lang="en-US" dirty="0" err="1">
-                <a:latin typeface="Courier New"/>
-                <a:cs typeface="Courier New"/>
-              </a:rPr>
-              <a:t>int</a:t>
-            </a:r>
-            <a:r>
               <a:rPr lang="en-US" dirty="0">
                 <a:latin typeface="Courier New"/>
                 <a:cs typeface="Courier New"/>
               </a:rPr>
-              <a:t> </a:t>
-            </a:r>
-            <a:r>
-              <a:rPr lang="en-US" dirty="0" err="1">
+              <a:t>int </a:t>
+            </a:r>
+            <a:r>
+              <a:rPr lang="en-US" dirty="0">
                 <a:latin typeface="Courier New"/>
                 <a:cs typeface="Courier New"/>
               </a:rPr>
@@ -11367,7 +11234,7 @@
               <a:t>;			// set up integer </a:t>
             </a:r>
             <a:r>
-              <a:rPr lang="en-US" dirty="0" err="1" smtClean="0">
+              <a:rPr lang="en-US" dirty="0" smtClean="0">
                 <a:latin typeface="Courier New"/>
                 <a:cs typeface="Courier New"/>
               </a:rPr>
@@ -11588,7 +11455,7 @@
               <a:t>  </a:t>
             </a:r>
             <a:r>
-              <a:rPr lang="en-US" dirty="0" err="1">
+              <a:rPr lang="en-US" dirty="0">
                 <a:latin typeface="Courier New"/>
                 <a:cs typeface="Courier New"/>
               </a:rPr>
@@ -11609,7 +11476,7 @@
               <a:t>;			// increment </a:t>
             </a:r>
             <a:r>
-              <a:rPr lang="en-US" dirty="0" err="1" smtClean="0">
+              <a:rPr lang="en-US" dirty="0" smtClean="0">
                 <a:latin typeface="Courier New"/>
                 <a:cs typeface="Courier New"/>
               </a:rPr>
@@ -11645,7 +11512,7 @@
               <a:t>  if (</a:t>
             </a:r>
             <a:r>
-              <a:rPr lang="en-US" dirty="0" err="1">
+              <a:rPr lang="en-US" dirty="0">
                 <a:latin typeface="Courier New"/>
                 <a:cs typeface="Courier New"/>
               </a:rPr>
@@ -11666,7 +11533,7 @@
               <a:t>{		// if </a:t>
             </a:r>
             <a:r>
-              <a:rPr lang="en-US" dirty="0" err="1" smtClean="0">
+              <a:rPr lang="en-US" dirty="0" smtClean="0">
                 <a:latin typeface="Courier New"/>
                 <a:cs typeface="Courier New"/>
               </a:rPr>
@@ -11727,7 +11594,7 @@
               <a:t>     </a:t>
             </a:r>
             <a:r>
-              <a:rPr lang="en-US" dirty="0" err="1">
+              <a:rPr lang="en-US" dirty="0">
                 <a:latin typeface="Courier New"/>
                 <a:cs typeface="Courier New"/>
               </a:rPr>
@@ -11748,7 +11615,7 @@
               <a:t>;			// reset </a:t>
             </a:r>
             <a:r>
-              <a:rPr lang="en-US" dirty="0" err="1" smtClean="0">
+              <a:rPr lang="en-US" dirty="0" smtClean="0">
                 <a:latin typeface="Courier New"/>
                 <a:cs typeface="Courier New"/>
               </a:rPr>
@@ -12123,53 +11990,49 @@
               <a:t>For example, </a:t>
             </a:r>
             <a:r>
+              <a:rPr lang="en-US" dirty="0" smtClean="0">
+                <a:latin typeface="Courier New"/>
+                <a:cs typeface="Courier New"/>
+              </a:rPr>
+              <a:t>mouseX</a:t>
+            </a:r>
+            <a:r>
+              <a:rPr lang="en-US" dirty="0" smtClean="0"/>
+              <a:t> and </a:t>
+            </a:r>
+            <a:r>
+              <a:rPr lang="en-US" dirty="0" smtClean="0">
+                <a:latin typeface="Courier New"/>
+                <a:cs typeface="Courier New"/>
+              </a:rPr>
+              <a:t>mouseY</a:t>
+            </a:r>
+            <a:r>
+              <a:rPr lang="en-US" dirty="0" smtClean="0"/>
+              <a:t> will detect the current </a:t>
+            </a:r>
+            <a:r>
+              <a:rPr lang="en-US" i="1" dirty="0" smtClean="0"/>
+              <a:t>(x,y)</a:t>
+            </a:r>
+            <a:r>
+              <a:rPr lang="en-US" dirty="0" smtClean="0"/>
+              <a:t> coordinates of a mouse and </a:t>
+            </a:r>
+            <a:r>
               <a:rPr lang="en-US" dirty="0" err="1" smtClean="0">
                 <a:latin typeface="Courier New"/>
                 <a:cs typeface="Courier New"/>
               </a:rPr>
-              <a:t>mouseX</a:t>
-            </a:r>
-            <a:r>
-              <a:rPr lang="en-US" dirty="0" smtClean="0"/>
-              <a:t> and </a:t>
-            </a:r>
-            <a:r>
-              <a:rPr lang="en-US" dirty="0" err="1" smtClean="0">
-                <a:latin typeface="Courier New"/>
-                <a:cs typeface="Courier New"/>
-              </a:rPr>
-              <a:t>mouseY</a:t>
-            </a:r>
-            <a:r>
-              <a:rPr lang="en-US" dirty="0" smtClean="0"/>
-              <a:t> will detect the current </a:t>
-            </a:r>
-            <a:r>
-              <a:rPr lang="en-US" i="1" dirty="0" smtClean="0"/>
-              <a:t>(</a:t>
-            </a:r>
-            <a:r>
-              <a:rPr lang="en-US" i="1" dirty="0" err="1" smtClean="0"/>
-              <a:t>x,y</a:t>
-            </a:r>
-            <a:r>
-              <a:rPr lang="en-US" i="1" dirty="0" smtClean="0"/>
-              <a:t>)</a:t>
-            </a:r>
-            <a:r>
-              <a:rPr lang="en-US" dirty="0" smtClean="0"/>
-              <a:t> coordinates of a mouse and </a:t>
-            </a:r>
-            <a:r>
-              <a:rPr lang="en-US" dirty="0" err="1" smtClean="0">
-                <a:latin typeface="Courier New"/>
-                <a:cs typeface="Courier New"/>
-              </a:rPr>
-              <a:t>mousepressed</a:t>
-            </a:r>
-            <a:r>
-              <a:rPr lang="en-US" dirty="0" smtClean="0"/>
-              <a:t> will indicate if the user is currently clicking or pressing the mouse.</a:t>
+              <a:t>mousePressed</a:t>
+            </a:r>
+            <a:r>
+              <a:rPr lang="en-US" dirty="0" smtClean="0"/>
+              <a:t> </a:t>
+            </a:r>
+            <a:r>
+              <a:rPr lang="en-US" dirty="0" smtClean="0"/>
+              <a:t>will indicate if the user is currently clicking or pressing the mouse.</a:t>
             </a:r>
           </a:p>
           <a:p>
@@ -12687,21 +12550,7 @@
                 <a:latin typeface="Courier New"/>
                 <a:cs typeface="Courier New"/>
               </a:rPr>
-              <a:t>  // draw a circle at the (</a:t>
-            </a:r>
-            <a:r>
-              <a:rPr lang="en-US" sz="2400" dirty="0" err="1" smtClean="0">
-                <a:latin typeface="Courier New"/>
-                <a:cs typeface="Courier New"/>
-              </a:rPr>
-              <a:t>x,y</a:t>
-            </a:r>
-            <a:r>
-              <a:rPr lang="en-US" sz="2400" dirty="0" smtClean="0">
-                <a:latin typeface="Courier New"/>
-                <a:cs typeface="Courier New"/>
-              </a:rPr>
-              <a:t>)</a:t>
+              <a:t>  // draw a circle at the (x,y)</a:t>
             </a:r>
           </a:p>
           <a:p>
@@ -13041,7 +12890,7 @@
               <a:t>    if  (</a:t>
             </a:r>
             <a:r>
-              <a:rPr lang="en-US" dirty="0" err="1">
+              <a:rPr lang="en-US" dirty="0">
                 <a:solidFill>
                   <a:schemeClr val="tx1"/>
                 </a:solidFill>
@@ -13265,7 +13114,7 @@
               <a:t>A Sunday on La Grande </a:t>
             </a:r>
             <a:r>
-              <a:rPr lang="en-US" i="1" dirty="0" err="1"/>
+              <a:rPr lang="en-US" i="1" dirty="0"/>
               <a:t>Jatte</a:t>
             </a:r>
             <a:r>
@@ -13536,12 +13385,12 @@
               <a:t>Processing and </a:t>
             </a:r>
             <a:r>
-              <a:rPr lang="en-US" i="1" dirty="0" err="1"/>
-              <a:t>naviage</a:t>
+              <a:rPr lang="en-US" i="1" dirty="0" smtClean="0"/>
+              <a:t>navigate </a:t>
             </a:r>
             <a:r>
               <a:rPr lang="en-US" i="1" dirty="0"/>
-              <a:t> to FILE / </a:t>
+              <a:t>to FILE / </a:t>
             </a:r>
             <a:r>
               <a:rPr lang="en-US" i="1" dirty="0" smtClean="0"/>
@@ -13657,7 +13506,7 @@
           </a:p>
           <a:p>
             <a:r>
-              <a:rPr lang="en-US" dirty="0" err="1" smtClean="0"/>
+              <a:rPr lang="en-US" dirty="0" smtClean="0"/>
               <a:t>OpenProcessing</a:t>
             </a:r>
             <a:r>
@@ -13683,7 +13532,7 @@
           </a:p>
           <a:p>
             <a:r>
-              <a:rPr lang="en-US" dirty="0" err="1" smtClean="0"/>
+              <a:rPr lang="en-US" dirty="0" smtClean="0"/>
               <a:t>OpenProcessing</a:t>
             </a:r>
             <a:r>
@@ -14059,13 +13908,13 @@
               <a:buNone/>
             </a:pPr>
             <a:r>
-              <a:rPr lang="en-US" dirty="0" err="1">
+              <a:rPr lang="en-US" dirty="0">
                 <a:hlinkClick r:id="rId2"/>
               </a:rPr>
               <a:t>d</a:t>
             </a:r>
             <a:r>
-              <a:rPr lang="en-US" dirty="0" err="1" smtClean="0">
+              <a:rPr lang="en-US" dirty="0" smtClean="0">
                 <a:hlinkClick r:id="rId2"/>
               </a:rPr>
               <a:t>eena.engel@nyu.edu</a:t>
@@ -14164,7 +14013,7 @@
               <a:t>A Sunday on La Grande </a:t>
             </a:r>
             <a:r>
-              <a:rPr lang="en-US" i="1" dirty="0" err="1"/>
+              <a:rPr lang="en-US" i="1" dirty="0"/>
               <a:t>Jatte</a:t>
             </a:r>
             <a:r>
@@ -14265,31 +14114,6 @@
           </a:p>
         </p:txBody>
       </p:sp>
-      <p:pic>
-        <p:nvPicPr>
-          <p:cNvPr id="4" name="Content Placeholder 3" descr="signac_papalPalace_pixels.jpg"/>
-          <p:cNvPicPr>
-            <a:picLocks noGrp="1" noChangeAspect="1"/>
-          </p:cNvPicPr>
-          <p:nvPr>
-            <p:ph idx="1"/>
-          </p:nvPr>
-        </p:nvPicPr>
-        <p:blipFill>
-          <a:blip r:embed="rId2">
-            <a:extLst>
-              <a:ext uri="{28A0092B-C50C-407E-A947-70E740481C1C}">
-                <a14:useLocalDpi xmlns:a14="http://schemas.microsoft.com/office/drawing/2010/main" val="0"/>
-              </a:ext>
-            </a:extLst>
-          </a:blip>
-          <a:srcRect l="494" r="494"/>
-          <a:stretch>
-            <a:fillRect/>
-          </a:stretch>
-        </p:blipFill>
-        <p:spPr/>
-      </p:pic>
       <p:sp>
         <p:nvSpPr>
           <p:cNvPr id="5" name="TextBox 4"/>
@@ -14322,7 +14146,7 @@
               <a:t>A Sunday on La Grande </a:t>
             </a:r>
             <a:r>
-              <a:rPr lang="en-US" dirty="0" err="1"/>
+              <a:rPr lang="en-US" dirty="0"/>
               <a:t>Jatte</a:t>
             </a:r>
             <a:r>
@@ -14339,7 +14163,7 @@
           <p:nvPr/>
         </p:nvPicPr>
         <p:blipFill>
-          <a:blip r:embed="rId3">
+          <a:blip r:embed="rId2">
             <a:extLst>
               <a:ext uri="{28A0092B-C50C-407E-A947-70E740481C1C}">
                 <a14:useLocalDpi xmlns:a14="http://schemas.microsoft.com/office/drawing/2010/main" val="0"/>
@@ -14353,8 +14177,8 @@
         </p:blipFill>
         <p:spPr bwMode="auto">
           <a:xfrm>
-            <a:off x="792162" y="1761564"/>
-            <a:ext cx="7570787" cy="4403015"/>
+            <a:off x="1458912" y="1682189"/>
+            <a:ext cx="6303963" cy="4403015"/>
           </a:xfrm>
           <a:prstGeom prst="rect">
             <a:avLst/>

</xml_diff>